<commit_message>
Change startup folder and Start buttons made, but both need to be fully setup
</commit_message>
<xml_diff>
--- a/extra/design.pptx
+++ b/extra/design.pptx
@@ -4364,6 +4364,194 @@
           </a:fontRef>
         </p:style>
       </p:cxnSp>
+      <p:sp>
+        <p:nvSpPr>
+          <p:cNvPr id="21" name="TextBox 20">
+            <a:extLst>
+              <a:ext uri="{FF2B5EF4-FFF2-40B4-BE49-F238E27FC236}">
+                <a16:creationId xmlns:a16="http://schemas.microsoft.com/office/drawing/2014/main" id="{5E1BC35A-D02D-D213-86F6-C83112AFF484}"/>
+              </a:ext>
+            </a:extLst>
+          </p:cNvPr>
+          <p:cNvSpPr txBox="1"/>
+          <p:nvPr/>
+        </p:nvSpPr>
+        <p:spPr>
+          <a:xfrm>
+            <a:off x="8137335" y="3790434"/>
+            <a:ext cx="429768" cy="369332"/>
+          </a:xfrm>
+          <a:prstGeom prst="rect">
+            <a:avLst/>
+          </a:prstGeom>
+          <a:noFill/>
+          <a:ln>
+            <a:solidFill>
+              <a:schemeClr val="tx1"/>
+            </a:solidFill>
+          </a:ln>
+        </p:spPr>
+        <p:txBody>
+          <a:bodyPr wrap="square" rtlCol="0">
+            <a:spAutoFit/>
+          </a:bodyPr>
+          <a:lstStyle/>
+          <a:p>
+            <a:r>
+              <a:rPr lang="en-US" dirty="0"/>
+              <a:t>00</a:t>
+            </a:r>
+          </a:p>
+        </p:txBody>
+      </p:sp>
+      <p:sp>
+        <p:nvSpPr>
+          <p:cNvPr id="25" name="TextBox 24">
+            <a:extLst>
+              <a:ext uri="{FF2B5EF4-FFF2-40B4-BE49-F238E27FC236}">
+                <a16:creationId xmlns:a16="http://schemas.microsoft.com/office/drawing/2014/main" id="{2C162ABC-1987-5850-0B5B-6E5B99503759}"/>
+              </a:ext>
+            </a:extLst>
+          </p:cNvPr>
+          <p:cNvSpPr txBox="1"/>
+          <p:nvPr/>
+        </p:nvSpPr>
+        <p:spPr>
+          <a:xfrm>
+            <a:off x="9185847" y="3781290"/>
+            <a:ext cx="429768" cy="369332"/>
+          </a:xfrm>
+          <a:prstGeom prst="rect">
+            <a:avLst/>
+          </a:prstGeom>
+          <a:noFill/>
+          <a:ln>
+            <a:solidFill>
+              <a:schemeClr val="tx1"/>
+            </a:solidFill>
+          </a:ln>
+        </p:spPr>
+        <p:txBody>
+          <a:bodyPr wrap="square" rtlCol="0">
+            <a:spAutoFit/>
+          </a:bodyPr>
+          <a:lstStyle/>
+          <a:p>
+            <a:r>
+              <a:rPr lang="en-US" dirty="0"/>
+              <a:t>00</a:t>
+            </a:r>
+          </a:p>
+        </p:txBody>
+      </p:sp>
+      <p:sp>
+        <p:nvSpPr>
+          <p:cNvPr id="27" name="TextBox 26">
+            <a:extLst>
+              <a:ext uri="{FF2B5EF4-FFF2-40B4-BE49-F238E27FC236}">
+                <a16:creationId xmlns:a16="http://schemas.microsoft.com/office/drawing/2014/main" id="{9FF84B09-E77D-0CD5-3E7F-0FD4D49C76C9}"/>
+              </a:ext>
+            </a:extLst>
+          </p:cNvPr>
+          <p:cNvSpPr txBox="1"/>
+          <p:nvPr/>
+        </p:nvSpPr>
+        <p:spPr>
+          <a:xfrm>
+            <a:off x="8541576" y="3765034"/>
+            <a:ext cx="304038" cy="369332"/>
+          </a:xfrm>
+          <a:prstGeom prst="rect">
+            <a:avLst/>
+          </a:prstGeom>
+          <a:noFill/>
+        </p:spPr>
+        <p:txBody>
+          <a:bodyPr wrap="square" rtlCol="0">
+            <a:spAutoFit/>
+          </a:bodyPr>
+          <a:lstStyle/>
+          <a:p>
+            <a:pPr algn="ctr"/>
+            <a:r>
+              <a:rPr lang="en-US" dirty="0"/>
+              <a:t>:</a:t>
+            </a:r>
+          </a:p>
+        </p:txBody>
+      </p:sp>
+      <p:sp>
+        <p:nvSpPr>
+          <p:cNvPr id="31" name="TextBox 30">
+            <a:extLst>
+              <a:ext uri="{FF2B5EF4-FFF2-40B4-BE49-F238E27FC236}">
+                <a16:creationId xmlns:a16="http://schemas.microsoft.com/office/drawing/2014/main" id="{0275CBDD-66EE-D5F2-0EB1-3F050FA203DC}"/>
+              </a:ext>
+            </a:extLst>
+          </p:cNvPr>
+          <p:cNvSpPr txBox="1"/>
+          <p:nvPr/>
+        </p:nvSpPr>
+        <p:spPr>
+          <a:xfrm>
+            <a:off x="7629907" y="3814326"/>
+            <a:ext cx="595566" cy="307777"/>
+          </a:xfrm>
+          <a:prstGeom prst="rect">
+            <a:avLst/>
+          </a:prstGeom>
+          <a:noFill/>
+        </p:spPr>
+        <p:txBody>
+          <a:bodyPr wrap="square" rtlCol="0">
+            <a:spAutoFit/>
+          </a:bodyPr>
+          <a:lstStyle/>
+          <a:p>
+            <a:pPr algn="ctr"/>
+            <a:r>
+              <a:rPr lang="en-US" sz="1400" dirty="0"/>
+              <a:t>Hour</a:t>
+            </a:r>
+          </a:p>
+        </p:txBody>
+      </p:sp>
+      <p:sp>
+        <p:nvSpPr>
+          <p:cNvPr id="32" name="TextBox 31">
+            <a:extLst>
+              <a:ext uri="{FF2B5EF4-FFF2-40B4-BE49-F238E27FC236}">
+                <a16:creationId xmlns:a16="http://schemas.microsoft.com/office/drawing/2014/main" id="{B4C26CAA-CF96-5838-A49C-DB5C3EBD9CAF}"/>
+              </a:ext>
+            </a:extLst>
+          </p:cNvPr>
+          <p:cNvSpPr txBox="1"/>
+          <p:nvPr/>
+        </p:nvSpPr>
+        <p:spPr>
+          <a:xfrm>
+            <a:off x="8709756" y="3832614"/>
+            <a:ext cx="595566" cy="307777"/>
+          </a:xfrm>
+          <a:prstGeom prst="rect">
+            <a:avLst/>
+          </a:prstGeom>
+          <a:noFill/>
+        </p:spPr>
+        <p:txBody>
+          <a:bodyPr wrap="square" rtlCol="0">
+            <a:spAutoFit/>
+          </a:bodyPr>
+          <a:lstStyle/>
+          <a:p>
+            <a:pPr algn="ctr"/>
+            <a:r>
+              <a:rPr lang="en-US" sz="1400" dirty="0"/>
+              <a:t>Min</a:t>
+            </a:r>
+          </a:p>
+        </p:txBody>
+      </p:sp>
     </p:spTree>
     <p:extLst>
       <p:ext uri="{BB962C8B-B14F-4D97-AF65-F5344CB8AC3E}">

</xml_diff>

<commit_message>
Finsished making the cleaning the startProgram stuff
</commit_message>
<xml_diff>
--- a/extra/design.pptx
+++ b/extra/design.pptx
@@ -6,6 +6,7 @@
   </p:sldMasterIdLst>
   <p:sldIdLst>
     <p:sldId id="256" r:id="rId2"/>
+    <p:sldId id="257" r:id="rId3"/>
   </p:sldIdLst>
   <p:sldSz cx="12192000" cy="6858000"/>
   <p:notesSz cx="6858000" cy="9144000"/>
@@ -259,7 +260,7 @@
           <a:p>
             <a:fld id="{A280E058-95FB-4393-BC10-FF598184573D}" type="datetimeFigureOut">
               <a:rPr lang="en-US" smtClean="0"/>
-              <a:t>6/10/2024</a:t>
+              <a:t>6/18/2024</a:t>
             </a:fld>
             <a:endParaRPr lang="en-US"/>
           </a:p>
@@ -457,7 +458,7 @@
           <a:p>
             <a:fld id="{A280E058-95FB-4393-BC10-FF598184573D}" type="datetimeFigureOut">
               <a:rPr lang="en-US" smtClean="0"/>
-              <a:t>6/10/2024</a:t>
+              <a:t>6/18/2024</a:t>
             </a:fld>
             <a:endParaRPr lang="en-US"/>
           </a:p>
@@ -665,7 +666,7 @@
           <a:p>
             <a:fld id="{A280E058-95FB-4393-BC10-FF598184573D}" type="datetimeFigureOut">
               <a:rPr lang="en-US" smtClean="0"/>
-              <a:t>6/10/2024</a:t>
+              <a:t>6/18/2024</a:t>
             </a:fld>
             <a:endParaRPr lang="en-US"/>
           </a:p>
@@ -863,7 +864,7 @@
           <a:p>
             <a:fld id="{A280E058-95FB-4393-BC10-FF598184573D}" type="datetimeFigureOut">
               <a:rPr lang="en-US" smtClean="0"/>
-              <a:t>6/10/2024</a:t>
+              <a:t>6/18/2024</a:t>
             </a:fld>
             <a:endParaRPr lang="en-US"/>
           </a:p>
@@ -1138,7 +1139,7 @@
           <a:p>
             <a:fld id="{A280E058-95FB-4393-BC10-FF598184573D}" type="datetimeFigureOut">
               <a:rPr lang="en-US" smtClean="0"/>
-              <a:t>6/10/2024</a:t>
+              <a:t>6/18/2024</a:t>
             </a:fld>
             <a:endParaRPr lang="en-US"/>
           </a:p>
@@ -1403,7 +1404,7 @@
           <a:p>
             <a:fld id="{A280E058-95FB-4393-BC10-FF598184573D}" type="datetimeFigureOut">
               <a:rPr lang="en-US" smtClean="0"/>
-              <a:t>6/10/2024</a:t>
+              <a:t>6/18/2024</a:t>
             </a:fld>
             <a:endParaRPr lang="en-US"/>
           </a:p>
@@ -1815,7 +1816,7 @@
           <a:p>
             <a:fld id="{A280E058-95FB-4393-BC10-FF598184573D}" type="datetimeFigureOut">
               <a:rPr lang="en-US" smtClean="0"/>
-              <a:t>6/10/2024</a:t>
+              <a:t>6/18/2024</a:t>
             </a:fld>
             <a:endParaRPr lang="en-US"/>
           </a:p>
@@ -1956,7 +1957,7 @@
           <a:p>
             <a:fld id="{A280E058-95FB-4393-BC10-FF598184573D}" type="datetimeFigureOut">
               <a:rPr lang="en-US" smtClean="0"/>
-              <a:t>6/10/2024</a:t>
+              <a:t>6/18/2024</a:t>
             </a:fld>
             <a:endParaRPr lang="en-US"/>
           </a:p>
@@ -2069,7 +2070,7 @@
           <a:p>
             <a:fld id="{A280E058-95FB-4393-BC10-FF598184573D}" type="datetimeFigureOut">
               <a:rPr lang="en-US" smtClean="0"/>
-              <a:t>6/10/2024</a:t>
+              <a:t>6/18/2024</a:t>
             </a:fld>
             <a:endParaRPr lang="en-US"/>
           </a:p>
@@ -2380,7 +2381,7 @@
           <a:p>
             <a:fld id="{A280E058-95FB-4393-BC10-FF598184573D}" type="datetimeFigureOut">
               <a:rPr lang="en-US" smtClean="0"/>
-              <a:t>6/10/2024</a:t>
+              <a:t>6/18/2024</a:t>
             </a:fld>
             <a:endParaRPr lang="en-US"/>
           </a:p>
@@ -2668,7 +2669,7 @@
           <a:p>
             <a:fld id="{A280E058-95FB-4393-BC10-FF598184573D}" type="datetimeFigureOut">
               <a:rPr lang="en-US" smtClean="0"/>
-              <a:t>6/10/2024</a:t>
+              <a:t>6/18/2024</a:t>
             </a:fld>
             <a:endParaRPr lang="en-US"/>
           </a:p>
@@ -2909,7 +2910,7 @@
           <a:p>
             <a:fld id="{A280E058-95FB-4393-BC10-FF598184573D}" type="datetimeFigureOut">
               <a:rPr lang="en-US" smtClean="0"/>
-              <a:t>6/10/2024</a:t>
+              <a:t>6/18/2024</a:t>
             </a:fld>
             <a:endParaRPr lang="en-US"/>
           </a:p>
@@ -4565,6 +4566,527 @@
 </p:sld>
 </file>
 
+<file path=ppt/slides/slide2.xml><?xml version="1.0" encoding="utf-8"?>
+<p:sld xmlns:a="http://schemas.openxmlformats.org/drawingml/2006/main" xmlns:r="http://schemas.openxmlformats.org/officeDocument/2006/relationships" xmlns:p="http://schemas.openxmlformats.org/presentationml/2006/main">
+  <p:cSld>
+    <p:spTree>
+      <p:nvGrpSpPr>
+        <p:cNvPr id="1" name=""/>
+        <p:cNvGrpSpPr/>
+        <p:nvPr/>
+      </p:nvGrpSpPr>
+      <p:grpSpPr>
+        <a:xfrm>
+          <a:off x="0" y="0"/>
+          <a:ext cx="0" cy="0"/>
+          <a:chOff x="0" y="0"/>
+          <a:chExt cx="0" cy="0"/>
+        </a:xfrm>
+      </p:grpSpPr>
+      <p:sp>
+        <p:nvSpPr>
+          <p:cNvPr id="2" name="Rectangle 1">
+            <a:extLst>
+              <a:ext uri="{FF2B5EF4-FFF2-40B4-BE49-F238E27FC236}">
+                <a16:creationId xmlns:a16="http://schemas.microsoft.com/office/drawing/2014/main" id="{B4658AFB-B3AA-1F3B-9F0D-EC320D363A53}"/>
+              </a:ext>
+            </a:extLst>
+          </p:cNvPr>
+          <p:cNvSpPr/>
+          <p:nvPr/>
+        </p:nvSpPr>
+        <p:spPr>
+          <a:xfrm>
+            <a:off x="1917700" y="1282700"/>
+            <a:ext cx="4749800" cy="2320036"/>
+          </a:xfrm>
+          <a:prstGeom prst="rect">
+            <a:avLst/>
+          </a:prstGeom>
+          <a:noFill/>
+          <a:ln w="28575">
+            <a:solidFill>
+              <a:schemeClr val="tx1"/>
+            </a:solidFill>
+          </a:ln>
+        </p:spPr>
+        <p:style>
+          <a:lnRef idx="2">
+            <a:schemeClr val="accent1">
+              <a:shade val="15000"/>
+            </a:schemeClr>
+          </a:lnRef>
+          <a:fillRef idx="1">
+            <a:schemeClr val="accent1"/>
+          </a:fillRef>
+          <a:effectRef idx="0">
+            <a:schemeClr val="accent1"/>
+          </a:effectRef>
+          <a:fontRef idx="minor">
+            <a:schemeClr val="lt1"/>
+          </a:fontRef>
+        </p:style>
+        <p:txBody>
+          <a:bodyPr rtlCol="0" anchor="ctr"/>
+          <a:lstStyle/>
+          <a:p>
+            <a:pPr algn="ctr"/>
+            <a:endParaRPr lang="en-US"/>
+          </a:p>
+        </p:txBody>
+      </p:sp>
+      <p:sp>
+        <p:nvSpPr>
+          <p:cNvPr id="3" name="TextBox 2">
+            <a:extLst>
+              <a:ext uri="{FF2B5EF4-FFF2-40B4-BE49-F238E27FC236}">
+                <a16:creationId xmlns:a16="http://schemas.microsoft.com/office/drawing/2014/main" id="{18D9371F-8B20-B496-EA25-E0A3180CF0EB}"/>
+              </a:ext>
+            </a:extLst>
+          </p:cNvPr>
+          <p:cNvSpPr txBox="1"/>
+          <p:nvPr/>
+        </p:nvSpPr>
+        <p:spPr>
+          <a:xfrm>
+            <a:off x="1705167" y="1344955"/>
+            <a:ext cx="3467934" cy="584775"/>
+          </a:xfrm>
+          <a:prstGeom prst="rect">
+            <a:avLst/>
+          </a:prstGeom>
+          <a:noFill/>
+        </p:spPr>
+        <p:txBody>
+          <a:bodyPr wrap="square" rtlCol="0">
+            <a:spAutoFit/>
+          </a:bodyPr>
+          <a:lstStyle/>
+          <a:p>
+            <a:pPr algn="r"/>
+            <a:r>
+              <a:rPr lang="en-US" sz="1600" dirty="0"/>
+              <a:t>Change time for program to run(24 hour clock):</a:t>
+            </a:r>
+          </a:p>
+        </p:txBody>
+      </p:sp>
+      <p:sp>
+        <p:nvSpPr>
+          <p:cNvPr id="4" name="TextBox 3">
+            <a:extLst>
+              <a:ext uri="{FF2B5EF4-FFF2-40B4-BE49-F238E27FC236}">
+                <a16:creationId xmlns:a16="http://schemas.microsoft.com/office/drawing/2014/main" id="{ED313769-CCFC-0B31-661E-AAACCC3F9A3D}"/>
+              </a:ext>
+            </a:extLst>
+          </p:cNvPr>
+          <p:cNvSpPr txBox="1"/>
+          <p:nvPr/>
+        </p:nvSpPr>
+        <p:spPr>
+          <a:xfrm>
+            <a:off x="5276088" y="1439748"/>
+            <a:ext cx="429768" cy="369332"/>
+          </a:xfrm>
+          <a:prstGeom prst="rect">
+            <a:avLst/>
+          </a:prstGeom>
+          <a:noFill/>
+          <a:ln>
+            <a:solidFill>
+              <a:schemeClr val="tx1"/>
+            </a:solidFill>
+          </a:ln>
+        </p:spPr>
+        <p:txBody>
+          <a:bodyPr wrap="square" rtlCol="0">
+            <a:spAutoFit/>
+          </a:bodyPr>
+          <a:lstStyle/>
+          <a:p>
+            <a:r>
+              <a:rPr lang="en-US" dirty="0"/>
+              <a:t>00</a:t>
+            </a:r>
+          </a:p>
+        </p:txBody>
+      </p:sp>
+      <p:sp>
+        <p:nvSpPr>
+          <p:cNvPr id="5" name="TextBox 4">
+            <a:extLst>
+              <a:ext uri="{FF2B5EF4-FFF2-40B4-BE49-F238E27FC236}">
+                <a16:creationId xmlns:a16="http://schemas.microsoft.com/office/drawing/2014/main" id="{40741E40-F733-CA0F-3563-4EDD6482D13A}"/>
+              </a:ext>
+            </a:extLst>
+          </p:cNvPr>
+          <p:cNvSpPr txBox="1"/>
+          <p:nvPr/>
+        </p:nvSpPr>
+        <p:spPr>
+          <a:xfrm>
+            <a:off x="5958840" y="1439748"/>
+            <a:ext cx="429768" cy="369332"/>
+          </a:xfrm>
+          <a:prstGeom prst="rect">
+            <a:avLst/>
+          </a:prstGeom>
+          <a:noFill/>
+          <a:ln>
+            <a:solidFill>
+              <a:schemeClr val="tx1"/>
+            </a:solidFill>
+          </a:ln>
+        </p:spPr>
+        <p:txBody>
+          <a:bodyPr wrap="square" rtlCol="0">
+            <a:spAutoFit/>
+          </a:bodyPr>
+          <a:lstStyle/>
+          <a:p>
+            <a:r>
+              <a:rPr lang="en-US" dirty="0"/>
+              <a:t>00</a:t>
+            </a:r>
+          </a:p>
+        </p:txBody>
+      </p:sp>
+      <p:sp>
+        <p:nvSpPr>
+          <p:cNvPr id="6" name="TextBox 5">
+            <a:extLst>
+              <a:ext uri="{FF2B5EF4-FFF2-40B4-BE49-F238E27FC236}">
+                <a16:creationId xmlns:a16="http://schemas.microsoft.com/office/drawing/2014/main" id="{B12BEFBF-6CAF-7E6E-3CA6-9D93F211CC1A}"/>
+              </a:ext>
+            </a:extLst>
+          </p:cNvPr>
+          <p:cNvSpPr txBox="1"/>
+          <p:nvPr/>
+        </p:nvSpPr>
+        <p:spPr>
+          <a:xfrm>
+            <a:off x="5680329" y="1414348"/>
+            <a:ext cx="304038" cy="369332"/>
+          </a:xfrm>
+          <a:prstGeom prst="rect">
+            <a:avLst/>
+          </a:prstGeom>
+          <a:noFill/>
+        </p:spPr>
+        <p:txBody>
+          <a:bodyPr wrap="square" rtlCol="0">
+            <a:spAutoFit/>
+          </a:bodyPr>
+          <a:lstStyle/>
+          <a:p>
+            <a:pPr algn="ctr"/>
+            <a:r>
+              <a:rPr lang="en-US" dirty="0"/>
+              <a:t>:</a:t>
+            </a:r>
+          </a:p>
+        </p:txBody>
+      </p:sp>
+      <p:sp>
+        <p:nvSpPr>
+          <p:cNvPr id="9" name="TextBox 8">
+            <a:extLst>
+              <a:ext uri="{FF2B5EF4-FFF2-40B4-BE49-F238E27FC236}">
+                <a16:creationId xmlns:a16="http://schemas.microsoft.com/office/drawing/2014/main" id="{4ECE4F19-38F7-1D79-681D-AE822E01AD7B}"/>
+              </a:ext>
+            </a:extLst>
+          </p:cNvPr>
+          <p:cNvSpPr txBox="1"/>
+          <p:nvPr/>
+        </p:nvSpPr>
+        <p:spPr>
+          <a:xfrm>
+            <a:off x="4083486" y="2053048"/>
+            <a:ext cx="415362" cy="338554"/>
+          </a:xfrm>
+          <a:prstGeom prst="rect">
+            <a:avLst/>
+          </a:prstGeom>
+          <a:noFill/>
+        </p:spPr>
+        <p:txBody>
+          <a:bodyPr wrap="square" rtlCol="0">
+            <a:spAutoFit/>
+          </a:bodyPr>
+          <a:lstStyle/>
+          <a:p>
+            <a:pPr algn="r"/>
+            <a:r>
+              <a:rPr lang="en-US" sz="1600" dirty="0"/>
+              <a:t>Or</a:t>
+            </a:r>
+          </a:p>
+        </p:txBody>
+      </p:sp>
+      <p:sp>
+        <p:nvSpPr>
+          <p:cNvPr id="10" name="TextBox 9">
+            <a:extLst>
+              <a:ext uri="{FF2B5EF4-FFF2-40B4-BE49-F238E27FC236}">
+                <a16:creationId xmlns:a16="http://schemas.microsoft.com/office/drawing/2014/main" id="{AD480B46-C672-EA46-BD6A-06450565AB8B}"/>
+              </a:ext>
+            </a:extLst>
+          </p:cNvPr>
+          <p:cNvSpPr txBox="1"/>
+          <p:nvPr/>
+        </p:nvSpPr>
+        <p:spPr>
+          <a:xfrm>
+            <a:off x="5789295" y="3049751"/>
+            <a:ext cx="613410" cy="369332"/>
+          </a:xfrm>
+          <a:prstGeom prst="rect">
+            <a:avLst/>
+          </a:prstGeom>
+          <a:noFill/>
+          <a:ln>
+            <a:solidFill>
+              <a:schemeClr val="tx1"/>
+            </a:solidFill>
+          </a:ln>
+        </p:spPr>
+        <p:txBody>
+          <a:bodyPr wrap="square" rtlCol="0">
+            <a:spAutoFit/>
+          </a:bodyPr>
+          <a:lstStyle/>
+          <a:p>
+            <a:r>
+              <a:rPr lang="en-US" b="1" dirty="0"/>
+              <a:t>Ok</a:t>
+            </a:r>
+          </a:p>
+        </p:txBody>
+      </p:sp>
+      <p:cxnSp>
+        <p:nvCxnSpPr>
+          <p:cNvPr id="12" name="Straight Connector 11">
+            <a:extLst>
+              <a:ext uri="{FF2B5EF4-FFF2-40B4-BE49-F238E27FC236}">
+                <a16:creationId xmlns:a16="http://schemas.microsoft.com/office/drawing/2014/main" id="{CDCE4695-8F20-806E-03FC-01799DC962D3}"/>
+              </a:ext>
+            </a:extLst>
+          </p:cNvPr>
+          <p:cNvCxnSpPr>
+            <a:cxnSpLocks/>
+          </p:cNvCxnSpPr>
+          <p:nvPr/>
+        </p:nvCxnSpPr>
+        <p:spPr>
+          <a:xfrm flipV="1">
+            <a:off x="4498848" y="2234184"/>
+            <a:ext cx="201168" cy="333"/>
+          </a:xfrm>
+          <a:prstGeom prst="line">
+            <a:avLst/>
+          </a:prstGeom>
+          <a:ln w="12700">
+            <a:solidFill>
+              <a:schemeClr val="tx1"/>
+            </a:solidFill>
+          </a:ln>
+        </p:spPr>
+        <p:style>
+          <a:lnRef idx="1">
+            <a:schemeClr val="accent1"/>
+          </a:lnRef>
+          <a:fillRef idx="0">
+            <a:schemeClr val="accent1"/>
+          </a:fillRef>
+          <a:effectRef idx="0">
+            <a:schemeClr val="accent1"/>
+          </a:effectRef>
+          <a:fontRef idx="minor">
+            <a:schemeClr val="tx1"/>
+          </a:fontRef>
+        </p:style>
+      </p:cxnSp>
+      <p:cxnSp>
+        <p:nvCxnSpPr>
+          <p:cNvPr id="13" name="Straight Connector 12">
+            <a:extLst>
+              <a:ext uri="{FF2B5EF4-FFF2-40B4-BE49-F238E27FC236}">
+                <a16:creationId xmlns:a16="http://schemas.microsoft.com/office/drawing/2014/main" id="{7D22EB88-DBF8-E9EF-6B58-5AEC4B7EEF29}"/>
+              </a:ext>
+            </a:extLst>
+          </p:cNvPr>
+          <p:cNvCxnSpPr>
+            <a:cxnSpLocks/>
+          </p:cNvCxnSpPr>
+          <p:nvPr/>
+        </p:nvCxnSpPr>
+        <p:spPr>
+          <a:xfrm flipV="1">
+            <a:off x="3883152" y="2234184"/>
+            <a:ext cx="201168" cy="333"/>
+          </a:xfrm>
+          <a:prstGeom prst="line">
+            <a:avLst/>
+          </a:prstGeom>
+          <a:ln w="12700">
+            <a:solidFill>
+              <a:schemeClr val="tx1"/>
+            </a:solidFill>
+          </a:ln>
+        </p:spPr>
+        <p:style>
+          <a:lnRef idx="1">
+            <a:schemeClr val="accent1"/>
+          </a:lnRef>
+          <a:fillRef idx="0">
+            <a:schemeClr val="accent1"/>
+          </a:fillRef>
+          <a:effectRef idx="0">
+            <a:schemeClr val="accent1"/>
+          </a:effectRef>
+          <a:fontRef idx="minor">
+            <a:schemeClr val="tx1"/>
+          </a:fontRef>
+        </p:style>
+      </p:cxnSp>
+      <p:sp>
+        <p:nvSpPr>
+          <p:cNvPr id="15" name="TextBox 14">
+            <a:extLst>
+              <a:ext uri="{FF2B5EF4-FFF2-40B4-BE49-F238E27FC236}">
+                <a16:creationId xmlns:a16="http://schemas.microsoft.com/office/drawing/2014/main" id="{72E187AB-B2B0-9A25-6A56-4BAAA87D5250}"/>
+              </a:ext>
+            </a:extLst>
+          </p:cNvPr>
+          <p:cNvSpPr txBox="1"/>
+          <p:nvPr/>
+        </p:nvSpPr>
+        <p:spPr>
+          <a:xfrm>
+            <a:off x="3493262" y="2629568"/>
+            <a:ext cx="273812" cy="249352"/>
+          </a:xfrm>
+          <a:prstGeom prst="rect">
+            <a:avLst/>
+          </a:prstGeom>
+          <a:noFill/>
+          <a:ln>
+            <a:solidFill>
+              <a:schemeClr val="tx1"/>
+            </a:solidFill>
+          </a:ln>
+        </p:spPr>
+        <p:txBody>
+          <a:bodyPr wrap="square" rtlCol="0">
+            <a:spAutoFit/>
+          </a:bodyPr>
+          <a:lstStyle/>
+          <a:p>
+            <a:endParaRPr lang="en-US" dirty="0"/>
+          </a:p>
+        </p:txBody>
+      </p:sp>
+      <p:sp>
+        <p:nvSpPr>
+          <p:cNvPr id="16" name="Oval 15">
+            <a:extLst>
+              <a:ext uri="{FF2B5EF4-FFF2-40B4-BE49-F238E27FC236}">
+                <a16:creationId xmlns:a16="http://schemas.microsoft.com/office/drawing/2014/main" id="{0B46FD6A-776E-FE62-2DD2-D93973024349}"/>
+              </a:ext>
+            </a:extLst>
+          </p:cNvPr>
+          <p:cNvSpPr/>
+          <p:nvPr/>
+        </p:nvSpPr>
+        <p:spPr>
+          <a:xfrm>
+            <a:off x="3567003" y="2686250"/>
+            <a:ext cx="126330" cy="126330"/>
+          </a:xfrm>
+          <a:prstGeom prst="ellipse">
+            <a:avLst/>
+          </a:prstGeom>
+          <a:solidFill>
+            <a:schemeClr val="tx1"/>
+          </a:solidFill>
+          <a:ln>
+            <a:noFill/>
+          </a:ln>
+        </p:spPr>
+        <p:style>
+          <a:lnRef idx="2">
+            <a:schemeClr val="accent1">
+              <a:shade val="15000"/>
+            </a:schemeClr>
+          </a:lnRef>
+          <a:fillRef idx="1">
+            <a:schemeClr val="accent1"/>
+          </a:fillRef>
+          <a:effectRef idx="0">
+            <a:schemeClr val="accent1"/>
+          </a:effectRef>
+          <a:fontRef idx="minor">
+            <a:schemeClr val="lt1"/>
+          </a:fontRef>
+        </p:style>
+        <p:txBody>
+          <a:bodyPr rtlCol="0" anchor="ctr"/>
+          <a:lstStyle/>
+          <a:p>
+            <a:pPr algn="ctr"/>
+            <a:endParaRPr lang="en-US"/>
+          </a:p>
+        </p:txBody>
+      </p:sp>
+      <p:sp>
+        <p:nvSpPr>
+          <p:cNvPr id="18" name="TextBox 17">
+            <a:extLst>
+              <a:ext uri="{FF2B5EF4-FFF2-40B4-BE49-F238E27FC236}">
+                <a16:creationId xmlns:a16="http://schemas.microsoft.com/office/drawing/2014/main" id="{BEAEE13A-41F8-AA53-B9D8-13E9749A7FA3}"/>
+              </a:ext>
+            </a:extLst>
+          </p:cNvPr>
+          <p:cNvSpPr txBox="1"/>
+          <p:nvPr/>
+        </p:nvSpPr>
+        <p:spPr>
+          <a:xfrm>
+            <a:off x="1783080" y="2557427"/>
+            <a:ext cx="1655064" cy="338554"/>
+          </a:xfrm>
+          <a:prstGeom prst="rect">
+            <a:avLst/>
+          </a:prstGeom>
+          <a:noFill/>
+        </p:spPr>
+        <p:txBody>
+          <a:bodyPr wrap="square" rtlCol="0">
+            <a:spAutoFit/>
+          </a:bodyPr>
+          <a:lstStyle/>
+          <a:p>
+            <a:pPr algn="r"/>
+            <a:r>
+              <a:rPr lang="en-US" sz="1600" dirty="0"/>
+              <a:t>Stop program</a:t>
+            </a:r>
+          </a:p>
+        </p:txBody>
+      </p:sp>
+    </p:spTree>
+    <p:extLst>
+      <p:ext uri="{BB962C8B-B14F-4D97-AF65-F5344CB8AC3E}">
+        <p14:creationId xmlns:p14="http://schemas.microsoft.com/office/powerpoint/2010/main" val="1817842885"/>
+      </p:ext>
+    </p:extLst>
+  </p:cSld>
+  <p:clrMapOvr>
+    <a:masterClrMapping/>
+  </p:clrMapOvr>
+</p:sld>
+</file>
+
 <file path=ppt/theme/theme1.xml><?xml version="1.0" encoding="utf-8"?>
 <a:theme xmlns:a="http://schemas.openxmlformats.org/drawingml/2006/main" name="Office Theme">
   <a:themeElements>

</xml_diff>

<commit_message>
Completed 'Stop program' function but not cleaned it up yet
</commit_message>
<xml_diff>
--- a/extra/design.pptx
+++ b/extra/design.pptx
@@ -7,6 +7,7 @@
   <p:sldIdLst>
     <p:sldId id="256" r:id="rId2"/>
     <p:sldId id="257" r:id="rId3"/>
+    <p:sldId id="258" r:id="rId4"/>
   </p:sldIdLst>
   <p:sldSz cx="12192000" cy="6858000"/>
   <p:notesSz cx="6858000" cy="9144000"/>
@@ -260,7 +261,7 @@
           <a:p>
             <a:fld id="{A280E058-95FB-4393-BC10-FF598184573D}" type="datetimeFigureOut">
               <a:rPr lang="en-US" smtClean="0"/>
-              <a:t>6/18/2024</a:t>
+              <a:t>6/24/2024</a:t>
             </a:fld>
             <a:endParaRPr lang="en-US"/>
           </a:p>
@@ -458,7 +459,7 @@
           <a:p>
             <a:fld id="{A280E058-95FB-4393-BC10-FF598184573D}" type="datetimeFigureOut">
               <a:rPr lang="en-US" smtClean="0"/>
-              <a:t>6/18/2024</a:t>
+              <a:t>6/24/2024</a:t>
             </a:fld>
             <a:endParaRPr lang="en-US"/>
           </a:p>
@@ -666,7 +667,7 @@
           <a:p>
             <a:fld id="{A280E058-95FB-4393-BC10-FF598184573D}" type="datetimeFigureOut">
               <a:rPr lang="en-US" smtClean="0"/>
-              <a:t>6/18/2024</a:t>
+              <a:t>6/24/2024</a:t>
             </a:fld>
             <a:endParaRPr lang="en-US"/>
           </a:p>
@@ -864,7 +865,7 @@
           <a:p>
             <a:fld id="{A280E058-95FB-4393-BC10-FF598184573D}" type="datetimeFigureOut">
               <a:rPr lang="en-US" smtClean="0"/>
-              <a:t>6/18/2024</a:t>
+              <a:t>6/24/2024</a:t>
             </a:fld>
             <a:endParaRPr lang="en-US"/>
           </a:p>
@@ -1139,7 +1140,7 @@
           <a:p>
             <a:fld id="{A280E058-95FB-4393-BC10-FF598184573D}" type="datetimeFigureOut">
               <a:rPr lang="en-US" smtClean="0"/>
-              <a:t>6/18/2024</a:t>
+              <a:t>6/24/2024</a:t>
             </a:fld>
             <a:endParaRPr lang="en-US"/>
           </a:p>
@@ -1404,7 +1405,7 @@
           <a:p>
             <a:fld id="{A280E058-95FB-4393-BC10-FF598184573D}" type="datetimeFigureOut">
               <a:rPr lang="en-US" smtClean="0"/>
-              <a:t>6/18/2024</a:t>
+              <a:t>6/24/2024</a:t>
             </a:fld>
             <a:endParaRPr lang="en-US"/>
           </a:p>
@@ -1816,7 +1817,7 @@
           <a:p>
             <a:fld id="{A280E058-95FB-4393-BC10-FF598184573D}" type="datetimeFigureOut">
               <a:rPr lang="en-US" smtClean="0"/>
-              <a:t>6/18/2024</a:t>
+              <a:t>6/24/2024</a:t>
             </a:fld>
             <a:endParaRPr lang="en-US"/>
           </a:p>
@@ -1957,7 +1958,7 @@
           <a:p>
             <a:fld id="{A280E058-95FB-4393-BC10-FF598184573D}" type="datetimeFigureOut">
               <a:rPr lang="en-US" smtClean="0"/>
-              <a:t>6/18/2024</a:t>
+              <a:t>6/24/2024</a:t>
             </a:fld>
             <a:endParaRPr lang="en-US"/>
           </a:p>
@@ -2070,7 +2071,7 @@
           <a:p>
             <a:fld id="{A280E058-95FB-4393-BC10-FF598184573D}" type="datetimeFigureOut">
               <a:rPr lang="en-US" smtClean="0"/>
-              <a:t>6/18/2024</a:t>
+              <a:t>6/24/2024</a:t>
             </a:fld>
             <a:endParaRPr lang="en-US"/>
           </a:p>
@@ -2381,7 +2382,7 @@
           <a:p>
             <a:fld id="{A280E058-95FB-4393-BC10-FF598184573D}" type="datetimeFigureOut">
               <a:rPr lang="en-US" smtClean="0"/>
-              <a:t>6/18/2024</a:t>
+              <a:t>6/24/2024</a:t>
             </a:fld>
             <a:endParaRPr lang="en-US"/>
           </a:p>
@@ -2669,7 +2670,7 @@
           <a:p>
             <a:fld id="{A280E058-95FB-4393-BC10-FF598184573D}" type="datetimeFigureOut">
               <a:rPr lang="en-US" smtClean="0"/>
-              <a:t>6/18/2024</a:t>
+              <a:t>6/24/2024</a:t>
             </a:fld>
             <a:endParaRPr lang="en-US"/>
           </a:p>
@@ -2910,7 +2911,7 @@
           <a:p>
             <a:fld id="{A280E058-95FB-4393-BC10-FF598184573D}" type="datetimeFigureOut">
               <a:rPr lang="en-US" smtClean="0"/>
-              <a:t>6/18/2024</a:t>
+              <a:t>6/24/2024</a:t>
             </a:fld>
             <a:endParaRPr lang="en-US"/>
           </a:p>
@@ -5087,6 +5088,36 @@
 </p:sld>
 </file>
 
+<file path=ppt/slides/slide3.xml><?xml version="1.0" encoding="utf-8"?>
+<p:sld xmlns:a="http://schemas.openxmlformats.org/drawingml/2006/main" xmlns:r="http://schemas.openxmlformats.org/officeDocument/2006/relationships" xmlns:p="http://schemas.openxmlformats.org/presentationml/2006/main">
+  <p:cSld>
+    <p:spTree>
+      <p:nvGrpSpPr>
+        <p:cNvPr id="1" name=""/>
+        <p:cNvGrpSpPr/>
+        <p:nvPr/>
+      </p:nvGrpSpPr>
+      <p:grpSpPr>
+        <a:xfrm>
+          <a:off x="0" y="0"/>
+          <a:ext cx="0" cy="0"/>
+          <a:chOff x="0" y="0"/>
+          <a:chExt cx="0" cy="0"/>
+        </a:xfrm>
+      </p:grpSpPr>
+    </p:spTree>
+    <p:extLst>
+      <p:ext uri="{BB962C8B-B14F-4D97-AF65-F5344CB8AC3E}">
+        <p14:creationId xmlns:p14="http://schemas.microsoft.com/office/powerpoint/2010/main" val="2664945876"/>
+      </p:ext>
+    </p:extLst>
+  </p:cSld>
+  <p:clrMapOvr>
+    <a:masterClrMapping/>
+  </p:clrMapOvr>
+</p:sld>
+</file>
+
 <file path=ppt/theme/theme1.xml><?xml version="1.0" encoding="utf-8"?>
 <a:theme xmlns:a="http://schemas.openxmlformats.org/drawingml/2006/main" name="Office Theme">
   <a:themeElements>

</xml_diff>

<commit_message>
Making progress on PresentWordsAndDefinitions
</commit_message>
<xml_diff>
--- a/extra/design.pptx
+++ b/extra/design.pptx
@@ -261,7 +261,7 @@
           <a:p>
             <a:fld id="{A280E058-95FB-4393-BC10-FF598184573D}" type="datetimeFigureOut">
               <a:rPr lang="en-US" smtClean="0"/>
-              <a:t>6/24/2024</a:t>
+              <a:t>8/24/2024</a:t>
             </a:fld>
             <a:endParaRPr lang="en-US"/>
           </a:p>
@@ -459,7 +459,7 @@
           <a:p>
             <a:fld id="{A280E058-95FB-4393-BC10-FF598184573D}" type="datetimeFigureOut">
               <a:rPr lang="en-US" smtClean="0"/>
-              <a:t>6/24/2024</a:t>
+              <a:t>8/24/2024</a:t>
             </a:fld>
             <a:endParaRPr lang="en-US"/>
           </a:p>
@@ -667,7 +667,7 @@
           <a:p>
             <a:fld id="{A280E058-95FB-4393-BC10-FF598184573D}" type="datetimeFigureOut">
               <a:rPr lang="en-US" smtClean="0"/>
-              <a:t>6/24/2024</a:t>
+              <a:t>8/24/2024</a:t>
             </a:fld>
             <a:endParaRPr lang="en-US"/>
           </a:p>
@@ -865,7 +865,7 @@
           <a:p>
             <a:fld id="{A280E058-95FB-4393-BC10-FF598184573D}" type="datetimeFigureOut">
               <a:rPr lang="en-US" smtClean="0"/>
-              <a:t>6/24/2024</a:t>
+              <a:t>8/24/2024</a:t>
             </a:fld>
             <a:endParaRPr lang="en-US"/>
           </a:p>
@@ -1140,7 +1140,7 @@
           <a:p>
             <a:fld id="{A280E058-95FB-4393-BC10-FF598184573D}" type="datetimeFigureOut">
               <a:rPr lang="en-US" smtClean="0"/>
-              <a:t>6/24/2024</a:t>
+              <a:t>8/24/2024</a:t>
             </a:fld>
             <a:endParaRPr lang="en-US"/>
           </a:p>
@@ -1405,7 +1405,7 @@
           <a:p>
             <a:fld id="{A280E058-95FB-4393-BC10-FF598184573D}" type="datetimeFigureOut">
               <a:rPr lang="en-US" smtClean="0"/>
-              <a:t>6/24/2024</a:t>
+              <a:t>8/24/2024</a:t>
             </a:fld>
             <a:endParaRPr lang="en-US"/>
           </a:p>
@@ -1817,7 +1817,7 @@
           <a:p>
             <a:fld id="{A280E058-95FB-4393-BC10-FF598184573D}" type="datetimeFigureOut">
               <a:rPr lang="en-US" smtClean="0"/>
-              <a:t>6/24/2024</a:t>
+              <a:t>8/24/2024</a:t>
             </a:fld>
             <a:endParaRPr lang="en-US"/>
           </a:p>
@@ -1958,7 +1958,7 @@
           <a:p>
             <a:fld id="{A280E058-95FB-4393-BC10-FF598184573D}" type="datetimeFigureOut">
               <a:rPr lang="en-US" smtClean="0"/>
-              <a:t>6/24/2024</a:t>
+              <a:t>8/24/2024</a:t>
             </a:fld>
             <a:endParaRPr lang="en-US"/>
           </a:p>
@@ -2071,7 +2071,7 @@
           <a:p>
             <a:fld id="{A280E058-95FB-4393-BC10-FF598184573D}" type="datetimeFigureOut">
               <a:rPr lang="en-US" smtClean="0"/>
-              <a:t>6/24/2024</a:t>
+              <a:t>8/24/2024</a:t>
             </a:fld>
             <a:endParaRPr lang="en-US"/>
           </a:p>
@@ -2382,7 +2382,7 @@
           <a:p>
             <a:fld id="{A280E058-95FB-4393-BC10-FF598184573D}" type="datetimeFigureOut">
               <a:rPr lang="en-US" smtClean="0"/>
-              <a:t>6/24/2024</a:t>
+              <a:t>8/24/2024</a:t>
             </a:fld>
             <a:endParaRPr lang="en-US"/>
           </a:p>
@@ -2670,7 +2670,7 @@
           <a:p>
             <a:fld id="{A280E058-95FB-4393-BC10-FF598184573D}" type="datetimeFigureOut">
               <a:rPr lang="en-US" smtClean="0"/>
-              <a:t>6/24/2024</a:t>
+              <a:t>8/24/2024</a:t>
             </a:fld>
             <a:endParaRPr lang="en-US"/>
           </a:p>
@@ -2911,7 +2911,7 @@
           <a:p>
             <a:fld id="{A280E058-95FB-4393-BC10-FF598184573D}" type="datetimeFigureOut">
               <a:rPr lang="en-US" smtClean="0"/>
-              <a:t>6/24/2024</a:t>
+              <a:t>8/24/2024</a:t>
             </a:fld>
             <a:endParaRPr lang="en-US"/>
           </a:p>
@@ -5105,6 +5105,724 @@
           <a:chExt cx="0" cy="0"/>
         </a:xfrm>
       </p:grpSpPr>
+      <p:sp>
+        <p:nvSpPr>
+          <p:cNvPr id="2" name="Rectangle 1">
+            <a:extLst>
+              <a:ext uri="{FF2B5EF4-FFF2-40B4-BE49-F238E27FC236}">
+                <a16:creationId xmlns:a16="http://schemas.microsoft.com/office/drawing/2014/main" id="{9803F185-AD2B-0841-C924-96B886AE8825}"/>
+              </a:ext>
+            </a:extLst>
+          </p:cNvPr>
+          <p:cNvSpPr/>
+          <p:nvPr/>
+        </p:nvSpPr>
+        <p:spPr>
+          <a:xfrm>
+            <a:off x="3472180" y="368300"/>
+            <a:ext cx="4749800" cy="5099812"/>
+          </a:xfrm>
+          <a:prstGeom prst="rect">
+            <a:avLst/>
+          </a:prstGeom>
+          <a:noFill/>
+          <a:ln w="28575">
+            <a:solidFill>
+              <a:schemeClr val="tx1"/>
+            </a:solidFill>
+          </a:ln>
+        </p:spPr>
+        <p:style>
+          <a:lnRef idx="2">
+            <a:schemeClr val="accent1">
+              <a:shade val="15000"/>
+            </a:schemeClr>
+          </a:lnRef>
+          <a:fillRef idx="1">
+            <a:schemeClr val="accent1"/>
+          </a:fillRef>
+          <a:effectRef idx="0">
+            <a:schemeClr val="accent1"/>
+          </a:effectRef>
+          <a:fontRef idx="minor">
+            <a:schemeClr val="lt1"/>
+          </a:fontRef>
+        </p:style>
+        <p:txBody>
+          <a:bodyPr rtlCol="0" anchor="ctr"/>
+          <a:lstStyle/>
+          <a:p>
+            <a:pPr algn="ctr"/>
+            <a:endParaRPr lang="en-US"/>
+          </a:p>
+        </p:txBody>
+      </p:sp>
+      <p:sp>
+        <p:nvSpPr>
+          <p:cNvPr id="3" name="TextBox 2">
+            <a:extLst>
+              <a:ext uri="{FF2B5EF4-FFF2-40B4-BE49-F238E27FC236}">
+                <a16:creationId xmlns:a16="http://schemas.microsoft.com/office/drawing/2014/main" id="{C4B95347-73C0-3C7D-B6F7-933BED24B10E}"/>
+              </a:ext>
+            </a:extLst>
+          </p:cNvPr>
+          <p:cNvSpPr txBox="1"/>
+          <p:nvPr/>
+        </p:nvSpPr>
+        <p:spPr>
+          <a:xfrm>
+            <a:off x="4795839" y="393979"/>
+            <a:ext cx="1851849" cy="461665"/>
+          </a:xfrm>
+          <a:prstGeom prst="rect">
+            <a:avLst/>
+          </a:prstGeom>
+          <a:noFill/>
+        </p:spPr>
+        <p:txBody>
+          <a:bodyPr wrap="square" rtlCol="0">
+            <a:spAutoFit/>
+          </a:bodyPr>
+          <a:lstStyle/>
+          <a:p>
+            <a:pPr algn="ctr"/>
+            <a:r>
+              <a:rPr lang="en-US" sz="2400" b="1" dirty="0"/>
+              <a:t>Word of day</a:t>
+            </a:r>
+          </a:p>
+        </p:txBody>
+      </p:sp>
+      <p:sp>
+        <p:nvSpPr>
+          <p:cNvPr id="4" name="TextBox 3">
+            <a:extLst>
+              <a:ext uri="{FF2B5EF4-FFF2-40B4-BE49-F238E27FC236}">
+                <a16:creationId xmlns:a16="http://schemas.microsoft.com/office/drawing/2014/main" id="{F4D514F2-16AC-23F6-6E0C-B822300DC08D}"/>
+              </a:ext>
+            </a:extLst>
+          </p:cNvPr>
+          <p:cNvSpPr txBox="1"/>
+          <p:nvPr/>
+        </p:nvSpPr>
+        <p:spPr>
+          <a:xfrm>
+            <a:off x="3576639" y="1040155"/>
+            <a:ext cx="3894009" cy="1015663"/>
+          </a:xfrm>
+          <a:prstGeom prst="rect">
+            <a:avLst/>
+          </a:prstGeom>
+          <a:noFill/>
+        </p:spPr>
+        <p:txBody>
+          <a:bodyPr wrap="square" rtlCol="0">
+            <a:spAutoFit/>
+          </a:bodyPr>
+          <a:lstStyle/>
+          <a:p>
+            <a:r>
+              <a:rPr lang="en-US" sz="2000" dirty="0"/>
+              <a:t>Word:  definition, definition, definition, definition, definition, definition, definition, definition</a:t>
+            </a:r>
+          </a:p>
+        </p:txBody>
+      </p:sp>
+      <p:sp>
+        <p:nvSpPr>
+          <p:cNvPr id="5" name="TextBox 4">
+            <a:extLst>
+              <a:ext uri="{FF2B5EF4-FFF2-40B4-BE49-F238E27FC236}">
+                <a16:creationId xmlns:a16="http://schemas.microsoft.com/office/drawing/2014/main" id="{DE15DFBB-9642-C1D2-F7E1-3A9C91E039BE}"/>
+              </a:ext>
+            </a:extLst>
+          </p:cNvPr>
+          <p:cNvSpPr txBox="1"/>
+          <p:nvPr/>
+        </p:nvSpPr>
+        <p:spPr>
+          <a:xfrm>
+            <a:off x="3576638" y="2240329"/>
+            <a:ext cx="2604706" cy="400110"/>
+          </a:xfrm>
+          <a:prstGeom prst="rect">
+            <a:avLst/>
+          </a:prstGeom>
+          <a:noFill/>
+          <a:ln>
+            <a:solidFill>
+              <a:schemeClr val="tx1"/>
+            </a:solidFill>
+          </a:ln>
+        </p:spPr>
+        <p:txBody>
+          <a:bodyPr wrap="square" rtlCol="0">
+            <a:spAutoFit/>
+          </a:bodyPr>
+          <a:lstStyle/>
+          <a:p>
+            <a:pPr algn="ctr"/>
+            <a:r>
+              <a:rPr lang="en-US" sz="2000" dirty="0"/>
+              <a:t>Reveal word definition</a:t>
+            </a:r>
+          </a:p>
+        </p:txBody>
+      </p:sp>
+      <p:sp>
+        <p:nvSpPr>
+          <p:cNvPr id="6" name="TextBox 5">
+            <a:extLst>
+              <a:ext uri="{FF2B5EF4-FFF2-40B4-BE49-F238E27FC236}">
+                <a16:creationId xmlns:a16="http://schemas.microsoft.com/office/drawing/2014/main" id="{02D93D4F-8A17-FA23-1BBB-8266F349353F}"/>
+              </a:ext>
+            </a:extLst>
+          </p:cNvPr>
+          <p:cNvSpPr txBox="1"/>
+          <p:nvPr/>
+        </p:nvSpPr>
+        <p:spPr>
+          <a:xfrm>
+            <a:off x="289878" y="1040155"/>
+            <a:ext cx="2842450" cy="338554"/>
+          </a:xfrm>
+          <a:prstGeom prst="rect">
+            <a:avLst/>
+          </a:prstGeom>
+          <a:noFill/>
+        </p:spPr>
+        <p:txBody>
+          <a:bodyPr wrap="square" rtlCol="0">
+            <a:spAutoFit/>
+          </a:bodyPr>
+          <a:lstStyle/>
+          <a:p>
+            <a:r>
+              <a:rPr lang="en-US" sz="1600" dirty="0"/>
+              <a:t>Include word and colon first</a:t>
+            </a:r>
+          </a:p>
+        </p:txBody>
+      </p:sp>
+      <p:cxnSp>
+        <p:nvCxnSpPr>
+          <p:cNvPr id="8" name="Straight Arrow Connector 7">
+            <a:extLst>
+              <a:ext uri="{FF2B5EF4-FFF2-40B4-BE49-F238E27FC236}">
+                <a16:creationId xmlns:a16="http://schemas.microsoft.com/office/drawing/2014/main" id="{CBA1F67F-6490-2276-7FAD-099E213B9262}"/>
+              </a:ext>
+            </a:extLst>
+          </p:cNvPr>
+          <p:cNvCxnSpPr/>
+          <p:nvPr/>
+        </p:nvCxnSpPr>
+        <p:spPr>
+          <a:xfrm>
+            <a:off x="2788920" y="1236864"/>
+            <a:ext cx="815150" cy="0"/>
+          </a:xfrm>
+          <a:prstGeom prst="straightConnector1">
+            <a:avLst/>
+          </a:prstGeom>
+          <a:ln>
+            <a:tailEnd type="triangle"/>
+          </a:ln>
+        </p:spPr>
+        <p:style>
+          <a:lnRef idx="1">
+            <a:schemeClr val="dk1"/>
+          </a:lnRef>
+          <a:fillRef idx="0">
+            <a:schemeClr val="dk1"/>
+          </a:fillRef>
+          <a:effectRef idx="0">
+            <a:schemeClr val="dk1"/>
+          </a:effectRef>
+          <a:fontRef idx="minor">
+            <a:schemeClr val="tx1"/>
+          </a:fontRef>
+        </p:style>
+      </p:cxnSp>
+      <p:sp>
+        <p:nvSpPr>
+          <p:cNvPr id="9" name="TextBox 8">
+            <a:extLst>
+              <a:ext uri="{FF2B5EF4-FFF2-40B4-BE49-F238E27FC236}">
+                <a16:creationId xmlns:a16="http://schemas.microsoft.com/office/drawing/2014/main" id="{1009E68B-2F4B-E37C-4D31-12E5BBCFC374}"/>
+              </a:ext>
+            </a:extLst>
+          </p:cNvPr>
+          <p:cNvSpPr txBox="1"/>
+          <p:nvPr/>
+        </p:nvSpPr>
+        <p:spPr>
+          <a:xfrm>
+            <a:off x="4341686" y="2918206"/>
+            <a:ext cx="2760153" cy="1323439"/>
+          </a:xfrm>
+          <a:prstGeom prst="rect">
+            <a:avLst/>
+          </a:prstGeom>
+          <a:noFill/>
+        </p:spPr>
+        <p:txBody>
+          <a:bodyPr wrap="square" rtlCol="0">
+            <a:spAutoFit/>
+          </a:bodyPr>
+          <a:lstStyle/>
+          <a:p>
+            <a:pPr algn="ctr"/>
+            <a:r>
+              <a:rPr lang="en-US" sz="1600" b="1" i="1" dirty="0"/>
+              <a:t>Daily priority word</a:t>
+            </a:r>
+          </a:p>
+          <a:p>
+            <a:pPr algn="ctr"/>
+            <a:r>
+              <a:rPr lang="en-US" sz="1600" i="1" dirty="0"/>
+              <a:t>Word: definition, definition, definition, definition , definition , definition , definition , definition</a:t>
+            </a:r>
+          </a:p>
+        </p:txBody>
+      </p:sp>
+      <p:sp>
+        <p:nvSpPr>
+          <p:cNvPr id="11" name="Rectangle 10">
+            <a:extLst>
+              <a:ext uri="{FF2B5EF4-FFF2-40B4-BE49-F238E27FC236}">
+                <a16:creationId xmlns:a16="http://schemas.microsoft.com/office/drawing/2014/main" id="{860161E2-280E-5A74-3AA7-6D652615875B}"/>
+              </a:ext>
+            </a:extLst>
+          </p:cNvPr>
+          <p:cNvSpPr/>
+          <p:nvPr/>
+        </p:nvSpPr>
+        <p:spPr>
+          <a:xfrm>
+            <a:off x="7501127" y="3934072"/>
+            <a:ext cx="339852" cy="318458"/>
+          </a:xfrm>
+          <a:prstGeom prst="rect">
+            <a:avLst/>
+          </a:prstGeom>
+          <a:noFill/>
+        </p:spPr>
+        <p:style>
+          <a:lnRef idx="2">
+            <a:schemeClr val="accent1">
+              <a:shade val="15000"/>
+            </a:schemeClr>
+          </a:lnRef>
+          <a:fillRef idx="1">
+            <a:schemeClr val="accent1"/>
+          </a:fillRef>
+          <a:effectRef idx="0">
+            <a:schemeClr val="accent1"/>
+          </a:effectRef>
+          <a:fontRef idx="minor">
+            <a:schemeClr val="lt1"/>
+          </a:fontRef>
+        </p:style>
+        <p:txBody>
+          <a:bodyPr rtlCol="0" anchor="ctr"/>
+          <a:lstStyle/>
+          <a:p>
+            <a:pPr algn="ctr"/>
+            <a:endParaRPr lang="en-US"/>
+          </a:p>
+        </p:txBody>
+      </p:sp>
+      <p:sp>
+        <p:nvSpPr>
+          <p:cNvPr id="12" name="Oval 11">
+            <a:extLst>
+              <a:ext uri="{FF2B5EF4-FFF2-40B4-BE49-F238E27FC236}">
+                <a16:creationId xmlns:a16="http://schemas.microsoft.com/office/drawing/2014/main" id="{595C0787-C266-9C19-8DF1-F9F7FF2D64F3}"/>
+              </a:ext>
+            </a:extLst>
+          </p:cNvPr>
+          <p:cNvSpPr/>
+          <p:nvPr/>
+        </p:nvSpPr>
+        <p:spPr>
+          <a:xfrm>
+            <a:off x="7543037" y="3979792"/>
+            <a:ext cx="237744" cy="237744"/>
+          </a:xfrm>
+          <a:prstGeom prst="ellipse">
+            <a:avLst/>
+          </a:prstGeom>
+          <a:solidFill>
+            <a:schemeClr val="tx1"/>
+          </a:solidFill>
+        </p:spPr>
+        <p:style>
+          <a:lnRef idx="2">
+            <a:schemeClr val="accent1">
+              <a:shade val="15000"/>
+            </a:schemeClr>
+          </a:lnRef>
+          <a:fillRef idx="1">
+            <a:schemeClr val="accent1"/>
+          </a:fillRef>
+          <a:effectRef idx="0">
+            <a:schemeClr val="accent1"/>
+          </a:effectRef>
+          <a:fontRef idx="minor">
+            <a:schemeClr val="lt1"/>
+          </a:fontRef>
+        </p:style>
+        <p:txBody>
+          <a:bodyPr rtlCol="0" anchor="ctr"/>
+          <a:lstStyle/>
+          <a:p>
+            <a:pPr algn="ctr"/>
+            <a:endParaRPr lang="en-US"/>
+          </a:p>
+        </p:txBody>
+      </p:sp>
+      <p:sp>
+        <p:nvSpPr>
+          <p:cNvPr id="13" name="TextBox 12">
+            <a:extLst>
+              <a:ext uri="{FF2B5EF4-FFF2-40B4-BE49-F238E27FC236}">
+                <a16:creationId xmlns:a16="http://schemas.microsoft.com/office/drawing/2014/main" id="{50F7CEFD-71DA-4567-1225-4869705CF223}"/>
+              </a:ext>
+            </a:extLst>
+          </p:cNvPr>
+          <p:cNvSpPr txBox="1"/>
+          <p:nvPr/>
+        </p:nvSpPr>
+        <p:spPr>
+          <a:xfrm>
+            <a:off x="8452104" y="2942590"/>
+            <a:ext cx="2760153" cy="1569660"/>
+          </a:xfrm>
+          <a:prstGeom prst="rect">
+            <a:avLst/>
+          </a:prstGeom>
+          <a:noFill/>
+        </p:spPr>
+        <p:txBody>
+          <a:bodyPr wrap="square" rtlCol="0">
+            <a:spAutoFit/>
+          </a:bodyPr>
+          <a:lstStyle/>
+          <a:p>
+            <a:pPr algn="ctr"/>
+            <a:r>
+              <a:rPr lang="en-US" sz="1600" dirty="0"/>
+              <a:t>If there are no words in the priority word list, print this instead:</a:t>
+            </a:r>
+          </a:p>
+          <a:p>
+            <a:pPr algn="ctr"/>
+            <a:endParaRPr lang="en-US" sz="1600" b="1" i="1" dirty="0"/>
+          </a:p>
+          <a:p>
+            <a:pPr algn="ctr"/>
+            <a:r>
+              <a:rPr lang="en-US" sz="1600" b="1" i="1" dirty="0"/>
+              <a:t>Daily priority word</a:t>
+            </a:r>
+          </a:p>
+          <a:p>
+            <a:pPr algn="ctr"/>
+            <a:r>
+              <a:rPr lang="en-US" sz="1600" i="1" dirty="0"/>
+              <a:t>Currently no words</a:t>
+            </a:r>
+          </a:p>
+        </p:txBody>
+      </p:sp>
+      <p:sp>
+        <p:nvSpPr>
+          <p:cNvPr id="14" name="TextBox 13">
+            <a:extLst>
+              <a:ext uri="{FF2B5EF4-FFF2-40B4-BE49-F238E27FC236}">
+                <a16:creationId xmlns:a16="http://schemas.microsoft.com/office/drawing/2014/main" id="{FDCB3C9E-64A1-4B2A-4868-09B80BA7FAB7}"/>
+              </a:ext>
+            </a:extLst>
+          </p:cNvPr>
+          <p:cNvSpPr txBox="1"/>
+          <p:nvPr/>
+        </p:nvSpPr>
+        <p:spPr>
+          <a:xfrm>
+            <a:off x="7101840" y="3298467"/>
+            <a:ext cx="1120140" cy="646331"/>
+          </a:xfrm>
+          <a:prstGeom prst="rect">
+            <a:avLst/>
+          </a:prstGeom>
+          <a:noFill/>
+        </p:spPr>
+        <p:txBody>
+          <a:bodyPr wrap="square" rtlCol="0">
+            <a:spAutoFit/>
+          </a:bodyPr>
+          <a:lstStyle/>
+          <a:p>
+            <a:pPr algn="ctr"/>
+            <a:r>
+              <a:rPr lang="en-US" sz="1200" dirty="0"/>
+              <a:t>Remove word from priority word list</a:t>
+            </a:r>
+          </a:p>
+        </p:txBody>
+      </p:sp>
+      <p:cxnSp>
+        <p:nvCxnSpPr>
+          <p:cNvPr id="15" name="Straight Arrow Connector 14">
+            <a:extLst>
+              <a:ext uri="{FF2B5EF4-FFF2-40B4-BE49-F238E27FC236}">
+                <a16:creationId xmlns:a16="http://schemas.microsoft.com/office/drawing/2014/main" id="{BC43A57F-B54B-F02D-6A75-A64031C1A6EB}"/>
+              </a:ext>
+            </a:extLst>
+          </p:cNvPr>
+          <p:cNvCxnSpPr>
+            <a:cxnSpLocks/>
+          </p:cNvCxnSpPr>
+          <p:nvPr/>
+        </p:nvCxnSpPr>
+        <p:spPr>
+          <a:xfrm>
+            <a:off x="6647688" y="3108336"/>
+            <a:ext cx="1984248" cy="0"/>
+          </a:xfrm>
+          <a:prstGeom prst="straightConnector1">
+            <a:avLst/>
+          </a:prstGeom>
+          <a:ln>
+            <a:tailEnd type="triangle"/>
+          </a:ln>
+        </p:spPr>
+        <p:style>
+          <a:lnRef idx="1">
+            <a:schemeClr val="dk1"/>
+          </a:lnRef>
+          <a:fillRef idx="0">
+            <a:schemeClr val="dk1"/>
+          </a:fillRef>
+          <a:effectRef idx="0">
+            <a:schemeClr val="dk1"/>
+          </a:effectRef>
+          <a:fontRef idx="minor">
+            <a:schemeClr val="tx1"/>
+          </a:fontRef>
+        </p:style>
+      </p:cxnSp>
+      <p:sp>
+        <p:nvSpPr>
+          <p:cNvPr id="17" name="TextBox 16">
+            <a:extLst>
+              <a:ext uri="{FF2B5EF4-FFF2-40B4-BE49-F238E27FC236}">
+                <a16:creationId xmlns:a16="http://schemas.microsoft.com/office/drawing/2014/main" id="{3079BFEA-28C1-81F4-2E70-2DAF261BFFAE}"/>
+              </a:ext>
+            </a:extLst>
+          </p:cNvPr>
+          <p:cNvSpPr txBox="1"/>
+          <p:nvPr/>
+        </p:nvSpPr>
+        <p:spPr>
+          <a:xfrm>
+            <a:off x="8424672" y="5504688"/>
+            <a:ext cx="2760153" cy="830997"/>
+          </a:xfrm>
+          <a:prstGeom prst="rect">
+            <a:avLst/>
+          </a:prstGeom>
+          <a:noFill/>
+        </p:spPr>
+        <p:txBody>
+          <a:bodyPr wrap="square" rtlCol="0">
+            <a:spAutoFit/>
+          </a:bodyPr>
+          <a:lstStyle/>
+          <a:p>
+            <a:pPr algn="ctr"/>
+            <a:r>
+              <a:rPr lang="en-US" sz="1600" dirty="0"/>
+              <a:t>Only appear if there is a priority word on the list, and therefore presented.</a:t>
+            </a:r>
+            <a:endParaRPr lang="en-US" sz="1600" i="1" dirty="0"/>
+          </a:p>
+        </p:txBody>
+      </p:sp>
+      <p:cxnSp>
+        <p:nvCxnSpPr>
+          <p:cNvPr id="18" name="Straight Arrow Connector 17">
+            <a:extLst>
+              <a:ext uri="{FF2B5EF4-FFF2-40B4-BE49-F238E27FC236}">
+                <a16:creationId xmlns:a16="http://schemas.microsoft.com/office/drawing/2014/main" id="{2F16BFF7-E4D0-1837-9268-3B0E3335AA2D}"/>
+              </a:ext>
+            </a:extLst>
+          </p:cNvPr>
+          <p:cNvCxnSpPr>
+            <a:cxnSpLocks/>
+          </p:cNvCxnSpPr>
+          <p:nvPr/>
+        </p:nvCxnSpPr>
+        <p:spPr>
+          <a:xfrm flipH="1" flipV="1">
+            <a:off x="7870761" y="4334256"/>
+            <a:ext cx="880047" cy="1225296"/>
+          </a:xfrm>
+          <a:prstGeom prst="straightConnector1">
+            <a:avLst/>
+          </a:prstGeom>
+          <a:ln>
+            <a:tailEnd type="triangle"/>
+          </a:ln>
+        </p:spPr>
+        <p:style>
+          <a:lnRef idx="1">
+            <a:schemeClr val="dk1"/>
+          </a:lnRef>
+          <a:fillRef idx="0">
+            <a:schemeClr val="dk1"/>
+          </a:fillRef>
+          <a:effectRef idx="0">
+            <a:schemeClr val="dk1"/>
+          </a:effectRef>
+          <a:fontRef idx="minor">
+            <a:schemeClr val="tx1"/>
+          </a:fontRef>
+        </p:style>
+      </p:cxnSp>
+      <p:sp>
+        <p:nvSpPr>
+          <p:cNvPr id="21" name="Rectangle 20">
+            <a:extLst>
+              <a:ext uri="{FF2B5EF4-FFF2-40B4-BE49-F238E27FC236}">
+                <a16:creationId xmlns:a16="http://schemas.microsoft.com/office/drawing/2014/main" id="{64021489-EFFE-1552-D6E8-27D14D3B8FE3}"/>
+              </a:ext>
+            </a:extLst>
+          </p:cNvPr>
+          <p:cNvSpPr/>
+          <p:nvPr/>
+        </p:nvSpPr>
+        <p:spPr>
+          <a:xfrm>
+            <a:off x="7501126" y="1660316"/>
+            <a:ext cx="339852" cy="318458"/>
+          </a:xfrm>
+          <a:prstGeom prst="rect">
+            <a:avLst/>
+          </a:prstGeom>
+          <a:noFill/>
+        </p:spPr>
+        <p:style>
+          <a:lnRef idx="2">
+            <a:schemeClr val="accent1">
+              <a:shade val="15000"/>
+            </a:schemeClr>
+          </a:lnRef>
+          <a:fillRef idx="1">
+            <a:schemeClr val="accent1"/>
+          </a:fillRef>
+          <a:effectRef idx="0">
+            <a:schemeClr val="accent1"/>
+          </a:effectRef>
+          <a:fontRef idx="minor">
+            <a:schemeClr val="lt1"/>
+          </a:fontRef>
+        </p:style>
+        <p:txBody>
+          <a:bodyPr rtlCol="0" anchor="ctr"/>
+          <a:lstStyle/>
+          <a:p>
+            <a:pPr algn="ctr"/>
+            <a:endParaRPr lang="en-US"/>
+          </a:p>
+        </p:txBody>
+      </p:sp>
+      <p:sp>
+        <p:nvSpPr>
+          <p:cNvPr id="22" name="Oval 21">
+            <a:extLst>
+              <a:ext uri="{FF2B5EF4-FFF2-40B4-BE49-F238E27FC236}">
+                <a16:creationId xmlns:a16="http://schemas.microsoft.com/office/drawing/2014/main" id="{AB7E6832-4BB9-37EC-F0B1-D5266E16E28E}"/>
+              </a:ext>
+            </a:extLst>
+          </p:cNvPr>
+          <p:cNvSpPr/>
+          <p:nvPr/>
+        </p:nvSpPr>
+        <p:spPr>
+          <a:xfrm>
+            <a:off x="7543036" y="1706036"/>
+            <a:ext cx="237744" cy="237744"/>
+          </a:xfrm>
+          <a:prstGeom prst="ellipse">
+            <a:avLst/>
+          </a:prstGeom>
+          <a:solidFill>
+            <a:schemeClr val="tx1"/>
+          </a:solidFill>
+        </p:spPr>
+        <p:style>
+          <a:lnRef idx="2">
+            <a:schemeClr val="accent1">
+              <a:shade val="15000"/>
+            </a:schemeClr>
+          </a:lnRef>
+          <a:fillRef idx="1">
+            <a:schemeClr val="accent1"/>
+          </a:fillRef>
+          <a:effectRef idx="0">
+            <a:schemeClr val="accent1"/>
+          </a:effectRef>
+          <a:fontRef idx="minor">
+            <a:schemeClr val="lt1"/>
+          </a:fontRef>
+        </p:style>
+        <p:txBody>
+          <a:bodyPr rtlCol="0" anchor="ctr"/>
+          <a:lstStyle/>
+          <a:p>
+            <a:pPr algn="ctr"/>
+            <a:endParaRPr lang="en-US"/>
+          </a:p>
+        </p:txBody>
+      </p:sp>
+      <p:sp>
+        <p:nvSpPr>
+          <p:cNvPr id="23" name="TextBox 22">
+            <a:extLst>
+              <a:ext uri="{FF2B5EF4-FFF2-40B4-BE49-F238E27FC236}">
+                <a16:creationId xmlns:a16="http://schemas.microsoft.com/office/drawing/2014/main" id="{87DC048E-718B-3F15-A4FE-020DE3773BA6}"/>
+              </a:ext>
+            </a:extLst>
+          </p:cNvPr>
+          <p:cNvSpPr txBox="1"/>
+          <p:nvPr/>
+        </p:nvSpPr>
+        <p:spPr>
+          <a:xfrm>
+            <a:off x="7202423" y="1024711"/>
+            <a:ext cx="944881" cy="646331"/>
+          </a:xfrm>
+          <a:prstGeom prst="rect">
+            <a:avLst/>
+          </a:prstGeom>
+          <a:noFill/>
+        </p:spPr>
+        <p:txBody>
+          <a:bodyPr wrap="square" rtlCol="0">
+            <a:spAutoFit/>
+          </a:bodyPr>
+          <a:lstStyle/>
+          <a:p>
+            <a:pPr algn="ctr"/>
+            <a:r>
+              <a:rPr lang="en-US" sz="1200" dirty="0"/>
+              <a:t>Add word to priority word list</a:t>
+            </a:r>
+          </a:p>
+        </p:txBody>
+      </p:sp>
     </p:spTree>
     <p:extLst>
       <p:ext uri="{BB962C8B-B14F-4D97-AF65-F5344CB8AC3E}">

</xml_diff>

<commit_message>
First row of PresentWordsAndDefinition complete
</commit_message>
<xml_diff>
--- a/extra/design.pptx
+++ b/extra/design.pptx
@@ -261,7 +261,7 @@
           <a:p>
             <a:fld id="{A280E058-95FB-4393-BC10-FF598184573D}" type="datetimeFigureOut">
               <a:rPr lang="en-US" smtClean="0"/>
-              <a:t>8/24/2024</a:t>
+              <a:t>9/2/2024</a:t>
             </a:fld>
             <a:endParaRPr lang="en-US"/>
           </a:p>
@@ -459,7 +459,7 @@
           <a:p>
             <a:fld id="{A280E058-95FB-4393-BC10-FF598184573D}" type="datetimeFigureOut">
               <a:rPr lang="en-US" smtClean="0"/>
-              <a:t>8/24/2024</a:t>
+              <a:t>9/2/2024</a:t>
             </a:fld>
             <a:endParaRPr lang="en-US"/>
           </a:p>
@@ -667,7 +667,7 @@
           <a:p>
             <a:fld id="{A280E058-95FB-4393-BC10-FF598184573D}" type="datetimeFigureOut">
               <a:rPr lang="en-US" smtClean="0"/>
-              <a:t>8/24/2024</a:t>
+              <a:t>9/2/2024</a:t>
             </a:fld>
             <a:endParaRPr lang="en-US"/>
           </a:p>
@@ -865,7 +865,7 @@
           <a:p>
             <a:fld id="{A280E058-95FB-4393-BC10-FF598184573D}" type="datetimeFigureOut">
               <a:rPr lang="en-US" smtClean="0"/>
-              <a:t>8/24/2024</a:t>
+              <a:t>9/2/2024</a:t>
             </a:fld>
             <a:endParaRPr lang="en-US"/>
           </a:p>
@@ -1140,7 +1140,7 @@
           <a:p>
             <a:fld id="{A280E058-95FB-4393-BC10-FF598184573D}" type="datetimeFigureOut">
               <a:rPr lang="en-US" smtClean="0"/>
-              <a:t>8/24/2024</a:t>
+              <a:t>9/2/2024</a:t>
             </a:fld>
             <a:endParaRPr lang="en-US"/>
           </a:p>
@@ -1405,7 +1405,7 @@
           <a:p>
             <a:fld id="{A280E058-95FB-4393-BC10-FF598184573D}" type="datetimeFigureOut">
               <a:rPr lang="en-US" smtClean="0"/>
-              <a:t>8/24/2024</a:t>
+              <a:t>9/2/2024</a:t>
             </a:fld>
             <a:endParaRPr lang="en-US"/>
           </a:p>
@@ -1817,7 +1817,7 @@
           <a:p>
             <a:fld id="{A280E058-95FB-4393-BC10-FF598184573D}" type="datetimeFigureOut">
               <a:rPr lang="en-US" smtClean="0"/>
-              <a:t>8/24/2024</a:t>
+              <a:t>9/2/2024</a:t>
             </a:fld>
             <a:endParaRPr lang="en-US"/>
           </a:p>
@@ -1958,7 +1958,7 @@
           <a:p>
             <a:fld id="{A280E058-95FB-4393-BC10-FF598184573D}" type="datetimeFigureOut">
               <a:rPr lang="en-US" smtClean="0"/>
-              <a:t>8/24/2024</a:t>
+              <a:t>9/2/2024</a:t>
             </a:fld>
             <a:endParaRPr lang="en-US"/>
           </a:p>
@@ -2071,7 +2071,7 @@
           <a:p>
             <a:fld id="{A280E058-95FB-4393-BC10-FF598184573D}" type="datetimeFigureOut">
               <a:rPr lang="en-US" smtClean="0"/>
-              <a:t>8/24/2024</a:t>
+              <a:t>9/2/2024</a:t>
             </a:fld>
             <a:endParaRPr lang="en-US"/>
           </a:p>
@@ -2382,7 +2382,7 @@
           <a:p>
             <a:fld id="{A280E058-95FB-4393-BC10-FF598184573D}" type="datetimeFigureOut">
               <a:rPr lang="en-US" smtClean="0"/>
-              <a:t>8/24/2024</a:t>
+              <a:t>9/2/2024</a:t>
             </a:fld>
             <a:endParaRPr lang="en-US"/>
           </a:p>
@@ -2670,7 +2670,7 @@
           <a:p>
             <a:fld id="{A280E058-95FB-4393-BC10-FF598184573D}" type="datetimeFigureOut">
               <a:rPr lang="en-US" smtClean="0"/>
-              <a:t>8/24/2024</a:t>
+              <a:t>9/2/2024</a:t>
             </a:fld>
             <a:endParaRPr lang="en-US"/>
           </a:p>
@@ -2911,7 +2911,7 @@
           <a:p>
             <a:fld id="{A280E058-95FB-4393-BC10-FF598184573D}" type="datetimeFigureOut">
               <a:rPr lang="en-US" smtClean="0"/>
-              <a:t>8/24/2024</a:t>
+              <a:t>9/2/2024</a:t>
             </a:fld>
             <a:endParaRPr lang="en-US"/>
           </a:p>
@@ -5400,7 +5400,7 @@
         </p:nvSpPr>
         <p:spPr>
           <a:xfrm>
-            <a:off x="7501127" y="3934072"/>
+            <a:off x="7501127" y="3403720"/>
             <a:ext cx="339852" cy="318458"/>
           </a:xfrm>
           <a:prstGeom prst="rect">
@@ -5447,7 +5447,7 @@
         </p:nvSpPr>
         <p:spPr>
           <a:xfrm>
-            <a:off x="7543037" y="3979792"/>
+            <a:off x="7543037" y="3449440"/>
             <a:ext cx="237744" cy="237744"/>
           </a:xfrm>
           <a:prstGeom prst="ellipse">
@@ -5550,7 +5550,7 @@
         </p:nvSpPr>
         <p:spPr>
           <a:xfrm>
-            <a:off x="7101840" y="3298467"/>
+            <a:off x="7101840" y="3709947"/>
             <a:ext cx="1120140" cy="646331"/>
           </a:xfrm>
           <a:prstGeom prst="rect">
@@ -5705,7 +5705,7 @@
         </p:nvSpPr>
         <p:spPr>
           <a:xfrm>
-            <a:off x="7501126" y="1660316"/>
+            <a:off x="7501126" y="1385996"/>
             <a:ext cx="339852" cy="318458"/>
           </a:xfrm>
           <a:prstGeom prst="rect">
@@ -5752,7 +5752,7 @@
         </p:nvSpPr>
         <p:spPr>
           <a:xfrm>
-            <a:off x="7543036" y="1706036"/>
+            <a:off x="7543036" y="1431716"/>
             <a:ext cx="237744" cy="237744"/>
           </a:xfrm>
           <a:prstGeom prst="ellipse">
@@ -5801,7 +5801,7 @@
         </p:nvSpPr>
         <p:spPr>
           <a:xfrm>
-            <a:off x="7202423" y="1024711"/>
+            <a:off x="7202423" y="1692223"/>
             <a:ext cx="944881" cy="646331"/>
           </a:xfrm>
           <a:prstGeom prst="rect">
@@ -5819,6 +5819,47 @@
             <a:r>
               <a:rPr lang="en-US" sz="1200" dirty="0"/>
               <a:t>Add word to priority word list</a:t>
+            </a:r>
+          </a:p>
+        </p:txBody>
+      </p:sp>
+      <p:sp>
+        <p:nvSpPr>
+          <p:cNvPr id="7" name="TextBox 6">
+            <a:extLst>
+              <a:ext uri="{FF2B5EF4-FFF2-40B4-BE49-F238E27FC236}">
+                <a16:creationId xmlns:a16="http://schemas.microsoft.com/office/drawing/2014/main" id="{10D1FD36-EA7E-19AD-FFEC-AD8EDE22AACC}"/>
+              </a:ext>
+            </a:extLst>
+          </p:cNvPr>
+          <p:cNvSpPr txBox="1"/>
+          <p:nvPr/>
+        </p:nvSpPr>
+        <p:spPr>
+          <a:xfrm>
+            <a:off x="6204871" y="4685739"/>
+            <a:ext cx="1756504" cy="400110"/>
+          </a:xfrm>
+          <a:prstGeom prst="rect">
+            <a:avLst/>
+          </a:prstGeom>
+          <a:noFill/>
+          <a:ln>
+            <a:solidFill>
+              <a:schemeClr val="tx1"/>
+            </a:solidFill>
+          </a:ln>
+        </p:spPr>
+        <p:txBody>
+          <a:bodyPr wrap="square" rtlCol="0">
+            <a:spAutoFit/>
+          </a:bodyPr>
+          <a:lstStyle/>
+          <a:p>
+            <a:pPr algn="ctr"/>
+            <a:r>
+              <a:rPr lang="en-US" sz="2000" dirty="0"/>
+              <a:t>Save choices</a:t>
             </a:r>
           </a:p>
         </p:txBody>

</xml_diff>

<commit_message>
Made initial start on add/edit API
</commit_message>
<xml_diff>
--- a/extra/design.pptx
+++ b/extra/design.pptx
@@ -8,6 +8,7 @@
     <p:sldId id="256" r:id="rId2"/>
     <p:sldId id="257" r:id="rId3"/>
     <p:sldId id="258" r:id="rId4"/>
+    <p:sldId id="259" r:id="rId5"/>
   </p:sldIdLst>
   <p:sldSz cx="12192000" cy="6858000"/>
   <p:notesSz cx="6858000" cy="9144000"/>
@@ -261,7 +262,7 @@
           <a:p>
             <a:fld id="{A280E058-95FB-4393-BC10-FF598184573D}" type="datetimeFigureOut">
               <a:rPr lang="en-US" smtClean="0"/>
-              <a:t>9/2/2024</a:t>
+              <a:t>9/23/2024</a:t>
             </a:fld>
             <a:endParaRPr lang="en-US"/>
           </a:p>
@@ -459,7 +460,7 @@
           <a:p>
             <a:fld id="{A280E058-95FB-4393-BC10-FF598184573D}" type="datetimeFigureOut">
               <a:rPr lang="en-US" smtClean="0"/>
-              <a:t>9/2/2024</a:t>
+              <a:t>9/23/2024</a:t>
             </a:fld>
             <a:endParaRPr lang="en-US"/>
           </a:p>
@@ -667,7 +668,7 @@
           <a:p>
             <a:fld id="{A280E058-95FB-4393-BC10-FF598184573D}" type="datetimeFigureOut">
               <a:rPr lang="en-US" smtClean="0"/>
-              <a:t>9/2/2024</a:t>
+              <a:t>9/23/2024</a:t>
             </a:fld>
             <a:endParaRPr lang="en-US"/>
           </a:p>
@@ -865,7 +866,7 @@
           <a:p>
             <a:fld id="{A280E058-95FB-4393-BC10-FF598184573D}" type="datetimeFigureOut">
               <a:rPr lang="en-US" smtClean="0"/>
-              <a:t>9/2/2024</a:t>
+              <a:t>9/23/2024</a:t>
             </a:fld>
             <a:endParaRPr lang="en-US"/>
           </a:p>
@@ -1140,7 +1141,7 @@
           <a:p>
             <a:fld id="{A280E058-95FB-4393-BC10-FF598184573D}" type="datetimeFigureOut">
               <a:rPr lang="en-US" smtClean="0"/>
-              <a:t>9/2/2024</a:t>
+              <a:t>9/23/2024</a:t>
             </a:fld>
             <a:endParaRPr lang="en-US"/>
           </a:p>
@@ -1405,7 +1406,7 @@
           <a:p>
             <a:fld id="{A280E058-95FB-4393-BC10-FF598184573D}" type="datetimeFigureOut">
               <a:rPr lang="en-US" smtClean="0"/>
-              <a:t>9/2/2024</a:t>
+              <a:t>9/23/2024</a:t>
             </a:fld>
             <a:endParaRPr lang="en-US"/>
           </a:p>
@@ -1817,7 +1818,7 @@
           <a:p>
             <a:fld id="{A280E058-95FB-4393-BC10-FF598184573D}" type="datetimeFigureOut">
               <a:rPr lang="en-US" smtClean="0"/>
-              <a:t>9/2/2024</a:t>
+              <a:t>9/23/2024</a:t>
             </a:fld>
             <a:endParaRPr lang="en-US"/>
           </a:p>
@@ -1958,7 +1959,7 @@
           <a:p>
             <a:fld id="{A280E058-95FB-4393-BC10-FF598184573D}" type="datetimeFigureOut">
               <a:rPr lang="en-US" smtClean="0"/>
-              <a:t>9/2/2024</a:t>
+              <a:t>9/23/2024</a:t>
             </a:fld>
             <a:endParaRPr lang="en-US"/>
           </a:p>
@@ -2071,7 +2072,7 @@
           <a:p>
             <a:fld id="{A280E058-95FB-4393-BC10-FF598184573D}" type="datetimeFigureOut">
               <a:rPr lang="en-US" smtClean="0"/>
-              <a:t>9/2/2024</a:t>
+              <a:t>9/23/2024</a:t>
             </a:fld>
             <a:endParaRPr lang="en-US"/>
           </a:p>
@@ -2382,7 +2383,7 @@
           <a:p>
             <a:fld id="{A280E058-95FB-4393-BC10-FF598184573D}" type="datetimeFigureOut">
               <a:rPr lang="en-US" smtClean="0"/>
-              <a:t>9/2/2024</a:t>
+              <a:t>9/23/2024</a:t>
             </a:fld>
             <a:endParaRPr lang="en-US"/>
           </a:p>
@@ -2670,7 +2671,7 @@
           <a:p>
             <a:fld id="{A280E058-95FB-4393-BC10-FF598184573D}" type="datetimeFigureOut">
               <a:rPr lang="en-US" smtClean="0"/>
-              <a:t>9/2/2024</a:t>
+              <a:t>9/23/2024</a:t>
             </a:fld>
             <a:endParaRPr lang="en-US"/>
           </a:p>
@@ -2911,7 +2912,7 @@
           <a:p>
             <a:fld id="{A280E058-95FB-4393-BC10-FF598184573D}" type="datetimeFigureOut">
               <a:rPr lang="en-US" smtClean="0"/>
-              <a:t>9/2/2024</a:t>
+              <a:t>9/23/2024</a:t>
             </a:fld>
             <a:endParaRPr lang="en-US"/>
           </a:p>
@@ -5877,6 +5878,1038 @@
 </p:sld>
 </file>
 
+<file path=ppt/slides/slide4.xml><?xml version="1.0" encoding="utf-8"?>
+<p:sld xmlns:a="http://schemas.openxmlformats.org/drawingml/2006/main" xmlns:r="http://schemas.openxmlformats.org/officeDocument/2006/relationships" xmlns:p="http://schemas.openxmlformats.org/presentationml/2006/main">
+  <p:cSld>
+    <p:spTree>
+      <p:nvGrpSpPr>
+        <p:cNvPr id="1" name=""/>
+        <p:cNvGrpSpPr/>
+        <p:nvPr/>
+      </p:nvGrpSpPr>
+      <p:grpSpPr>
+        <a:xfrm>
+          <a:off x="0" y="0"/>
+          <a:ext cx="0" cy="0"/>
+          <a:chOff x="0" y="0"/>
+          <a:chExt cx="0" cy="0"/>
+        </a:xfrm>
+      </p:grpSpPr>
+      <p:sp>
+        <p:nvSpPr>
+          <p:cNvPr id="2" name="Rectangle 1">
+            <a:extLst>
+              <a:ext uri="{FF2B5EF4-FFF2-40B4-BE49-F238E27FC236}">
+                <a16:creationId xmlns:a16="http://schemas.microsoft.com/office/drawing/2014/main" id="{6BE85CAA-7BF8-7DFB-685C-739A9FAB31CC}"/>
+              </a:ext>
+            </a:extLst>
+          </p:cNvPr>
+          <p:cNvSpPr/>
+          <p:nvPr/>
+        </p:nvSpPr>
+        <p:spPr>
+          <a:xfrm>
+            <a:off x="1536192" y="715772"/>
+            <a:ext cx="9363456" cy="5099812"/>
+          </a:xfrm>
+          <a:prstGeom prst="rect">
+            <a:avLst/>
+          </a:prstGeom>
+          <a:noFill/>
+          <a:ln w="28575">
+            <a:solidFill>
+              <a:schemeClr val="tx1"/>
+            </a:solidFill>
+          </a:ln>
+        </p:spPr>
+        <p:style>
+          <a:lnRef idx="2">
+            <a:schemeClr val="accent1">
+              <a:shade val="15000"/>
+            </a:schemeClr>
+          </a:lnRef>
+          <a:fillRef idx="1">
+            <a:schemeClr val="accent1"/>
+          </a:fillRef>
+          <a:effectRef idx="0">
+            <a:schemeClr val="accent1"/>
+          </a:effectRef>
+          <a:fontRef idx="minor">
+            <a:schemeClr val="lt1"/>
+          </a:fontRef>
+        </p:style>
+        <p:txBody>
+          <a:bodyPr rtlCol="0" anchor="ctr"/>
+          <a:lstStyle/>
+          <a:p>
+            <a:pPr algn="ctr"/>
+            <a:endParaRPr lang="en-US"/>
+          </a:p>
+        </p:txBody>
+      </p:sp>
+      <p:sp>
+        <p:nvSpPr>
+          <p:cNvPr id="4" name="Rectangle 3">
+            <a:extLst>
+              <a:ext uri="{FF2B5EF4-FFF2-40B4-BE49-F238E27FC236}">
+                <a16:creationId xmlns:a16="http://schemas.microsoft.com/office/drawing/2014/main" id="{B0A55FC7-37ED-0076-2D8D-EB2A4289122A}"/>
+              </a:ext>
+            </a:extLst>
+          </p:cNvPr>
+          <p:cNvSpPr/>
+          <p:nvPr/>
+        </p:nvSpPr>
+        <p:spPr>
+          <a:xfrm>
+            <a:off x="1792224" y="1581912"/>
+            <a:ext cx="1444752" cy="310896"/>
+          </a:xfrm>
+          <a:prstGeom prst="rect">
+            <a:avLst/>
+          </a:prstGeom>
+          <a:noFill/>
+          <a:ln>
+            <a:solidFill>
+              <a:schemeClr val="tx1"/>
+            </a:solidFill>
+          </a:ln>
+        </p:spPr>
+        <p:style>
+          <a:lnRef idx="2">
+            <a:schemeClr val="accent1">
+              <a:shade val="15000"/>
+            </a:schemeClr>
+          </a:lnRef>
+          <a:fillRef idx="1">
+            <a:schemeClr val="accent1"/>
+          </a:fillRef>
+          <a:effectRef idx="0">
+            <a:schemeClr val="accent1"/>
+          </a:effectRef>
+          <a:fontRef idx="minor">
+            <a:schemeClr val="lt1"/>
+          </a:fontRef>
+        </p:style>
+        <p:txBody>
+          <a:bodyPr rtlCol="0" anchor="ctr"/>
+          <a:lstStyle/>
+          <a:p>
+            <a:pPr algn="ctr"/>
+            <a:endParaRPr lang="en-US"/>
+          </a:p>
+        </p:txBody>
+      </p:sp>
+      <p:sp>
+        <p:nvSpPr>
+          <p:cNvPr id="5" name="TextBox 4">
+            <a:extLst>
+              <a:ext uri="{FF2B5EF4-FFF2-40B4-BE49-F238E27FC236}">
+                <a16:creationId xmlns:a16="http://schemas.microsoft.com/office/drawing/2014/main" id="{824C90C0-6B64-BA56-7BD9-90F25460D646}"/>
+              </a:ext>
+            </a:extLst>
+          </p:cNvPr>
+          <p:cNvSpPr txBox="1"/>
+          <p:nvPr/>
+        </p:nvSpPr>
+        <p:spPr>
+          <a:xfrm>
+            <a:off x="1719072" y="1276588"/>
+            <a:ext cx="1097929" cy="369332"/>
+          </a:xfrm>
+          <a:prstGeom prst="rect">
+            <a:avLst/>
+          </a:prstGeom>
+          <a:noFill/>
+        </p:spPr>
+        <p:txBody>
+          <a:bodyPr wrap="none" rtlCol="0">
+            <a:spAutoFit/>
+          </a:bodyPr>
+          <a:lstStyle/>
+          <a:p>
+            <a:r>
+              <a:rPr lang="en-US" dirty="0"/>
+              <a:t>Add word</a:t>
+            </a:r>
+          </a:p>
+        </p:txBody>
+      </p:sp>
+      <p:sp>
+        <p:nvSpPr>
+          <p:cNvPr id="6" name="Rectangle 5">
+            <a:extLst>
+              <a:ext uri="{FF2B5EF4-FFF2-40B4-BE49-F238E27FC236}">
+                <a16:creationId xmlns:a16="http://schemas.microsoft.com/office/drawing/2014/main" id="{DB4FF070-F116-3EB0-ED92-FE769F97E619}"/>
+              </a:ext>
+            </a:extLst>
+          </p:cNvPr>
+          <p:cNvSpPr/>
+          <p:nvPr/>
+        </p:nvSpPr>
+        <p:spPr>
+          <a:xfrm>
+            <a:off x="3364992" y="1581912"/>
+            <a:ext cx="7254240" cy="310896"/>
+          </a:xfrm>
+          <a:prstGeom prst="rect">
+            <a:avLst/>
+          </a:prstGeom>
+          <a:noFill/>
+          <a:ln>
+            <a:solidFill>
+              <a:schemeClr val="tx1"/>
+            </a:solidFill>
+          </a:ln>
+        </p:spPr>
+        <p:style>
+          <a:lnRef idx="2">
+            <a:schemeClr val="accent1">
+              <a:shade val="15000"/>
+            </a:schemeClr>
+          </a:lnRef>
+          <a:fillRef idx="1">
+            <a:schemeClr val="accent1"/>
+          </a:fillRef>
+          <a:effectRef idx="0">
+            <a:schemeClr val="accent1"/>
+          </a:effectRef>
+          <a:fontRef idx="minor">
+            <a:schemeClr val="lt1"/>
+          </a:fontRef>
+        </p:style>
+        <p:txBody>
+          <a:bodyPr rtlCol="0" anchor="ctr"/>
+          <a:lstStyle/>
+          <a:p>
+            <a:pPr algn="ctr"/>
+            <a:endParaRPr lang="en-US"/>
+          </a:p>
+        </p:txBody>
+      </p:sp>
+      <p:sp>
+        <p:nvSpPr>
+          <p:cNvPr id="7" name="TextBox 6">
+            <a:extLst>
+              <a:ext uri="{FF2B5EF4-FFF2-40B4-BE49-F238E27FC236}">
+                <a16:creationId xmlns:a16="http://schemas.microsoft.com/office/drawing/2014/main" id="{C9E72318-EEC1-D80A-F2D4-0FCC39562875}"/>
+              </a:ext>
+            </a:extLst>
+          </p:cNvPr>
+          <p:cNvSpPr txBox="1"/>
+          <p:nvPr/>
+        </p:nvSpPr>
+        <p:spPr>
+          <a:xfrm>
+            <a:off x="3364992" y="1276588"/>
+            <a:ext cx="2057679" cy="369332"/>
+          </a:xfrm>
+          <a:prstGeom prst="rect">
+            <a:avLst/>
+          </a:prstGeom>
+          <a:noFill/>
+        </p:spPr>
+        <p:txBody>
+          <a:bodyPr wrap="none" rtlCol="0">
+            <a:spAutoFit/>
+          </a:bodyPr>
+          <a:lstStyle/>
+          <a:p>
+            <a:r>
+              <a:rPr lang="en-US" dirty="0"/>
+              <a:t>Add word definition</a:t>
+            </a:r>
+          </a:p>
+        </p:txBody>
+      </p:sp>
+      <p:sp>
+        <p:nvSpPr>
+          <p:cNvPr id="8" name="TextBox 7">
+            <a:extLst>
+              <a:ext uri="{FF2B5EF4-FFF2-40B4-BE49-F238E27FC236}">
+                <a16:creationId xmlns:a16="http://schemas.microsoft.com/office/drawing/2014/main" id="{6D8D4971-FFCA-5A77-8401-61401695097B}"/>
+              </a:ext>
+            </a:extLst>
+          </p:cNvPr>
+          <p:cNvSpPr txBox="1"/>
+          <p:nvPr/>
+        </p:nvSpPr>
+        <p:spPr>
+          <a:xfrm>
+            <a:off x="1727892" y="797528"/>
+            <a:ext cx="1519262" cy="461665"/>
+          </a:xfrm>
+          <a:prstGeom prst="rect">
+            <a:avLst/>
+          </a:prstGeom>
+          <a:noFill/>
+        </p:spPr>
+        <p:txBody>
+          <a:bodyPr wrap="none" rtlCol="0">
+            <a:spAutoFit/>
+          </a:bodyPr>
+          <a:lstStyle/>
+          <a:p>
+            <a:r>
+              <a:rPr lang="en-US" sz="2400" dirty="0"/>
+              <a:t>Add words</a:t>
+            </a:r>
+          </a:p>
+        </p:txBody>
+      </p:sp>
+      <p:cxnSp>
+        <p:nvCxnSpPr>
+          <p:cNvPr id="10" name="Straight Connector 9">
+            <a:extLst>
+              <a:ext uri="{FF2B5EF4-FFF2-40B4-BE49-F238E27FC236}">
+                <a16:creationId xmlns:a16="http://schemas.microsoft.com/office/drawing/2014/main" id="{29864617-8655-A9DE-9860-5A6F990D4273}"/>
+              </a:ext>
+            </a:extLst>
+          </p:cNvPr>
+          <p:cNvCxnSpPr/>
+          <p:nvPr/>
+        </p:nvCxnSpPr>
+        <p:spPr>
+          <a:xfrm>
+            <a:off x="1645920" y="2578608"/>
+            <a:ext cx="9134856" cy="0"/>
+          </a:xfrm>
+          <a:prstGeom prst="line">
+            <a:avLst/>
+          </a:prstGeom>
+          <a:ln w="57150">
+            <a:solidFill>
+              <a:srgbClr val="7F7F7F">
+                <a:alpha val="50196"/>
+              </a:srgbClr>
+            </a:solidFill>
+          </a:ln>
+        </p:spPr>
+        <p:style>
+          <a:lnRef idx="1">
+            <a:schemeClr val="accent1"/>
+          </a:lnRef>
+          <a:fillRef idx="0">
+            <a:schemeClr val="accent1"/>
+          </a:fillRef>
+          <a:effectRef idx="0">
+            <a:schemeClr val="accent1"/>
+          </a:effectRef>
+          <a:fontRef idx="minor">
+            <a:schemeClr val="tx1"/>
+          </a:fontRef>
+        </p:style>
+      </p:cxnSp>
+      <p:sp>
+        <p:nvSpPr>
+          <p:cNvPr id="14" name="TextBox 13">
+            <a:extLst>
+              <a:ext uri="{FF2B5EF4-FFF2-40B4-BE49-F238E27FC236}">
+                <a16:creationId xmlns:a16="http://schemas.microsoft.com/office/drawing/2014/main" id="{5F713709-3D12-D78E-0865-D8071577AE27}"/>
+              </a:ext>
+            </a:extLst>
+          </p:cNvPr>
+          <p:cNvSpPr txBox="1"/>
+          <p:nvPr/>
+        </p:nvSpPr>
+        <p:spPr>
+          <a:xfrm>
+            <a:off x="1727892" y="2602021"/>
+            <a:ext cx="1498744" cy="461665"/>
+          </a:xfrm>
+          <a:prstGeom prst="rect">
+            <a:avLst/>
+          </a:prstGeom>
+          <a:noFill/>
+        </p:spPr>
+        <p:txBody>
+          <a:bodyPr wrap="none" rtlCol="0">
+            <a:spAutoFit/>
+          </a:bodyPr>
+          <a:lstStyle/>
+          <a:p>
+            <a:r>
+              <a:rPr lang="en-US" sz="2400" dirty="0"/>
+              <a:t>Edit words</a:t>
+            </a:r>
+          </a:p>
+        </p:txBody>
+      </p:sp>
+      <p:sp>
+        <p:nvSpPr>
+          <p:cNvPr id="16" name="TextBox 15">
+            <a:extLst>
+              <a:ext uri="{FF2B5EF4-FFF2-40B4-BE49-F238E27FC236}">
+                <a16:creationId xmlns:a16="http://schemas.microsoft.com/office/drawing/2014/main" id="{42B6063A-33C1-BFC8-ADAE-D8085F1152B8}"/>
+              </a:ext>
+            </a:extLst>
+          </p:cNvPr>
+          <p:cNvSpPr txBox="1"/>
+          <p:nvPr/>
+        </p:nvSpPr>
+        <p:spPr>
+          <a:xfrm>
+            <a:off x="2967155" y="3414266"/>
+            <a:ext cx="467372" cy="307777"/>
+          </a:xfrm>
+          <a:prstGeom prst="rect">
+            <a:avLst/>
+          </a:prstGeom>
+          <a:noFill/>
+          <a:ln>
+            <a:solidFill>
+              <a:schemeClr val="tx1"/>
+            </a:solidFill>
+          </a:ln>
+        </p:spPr>
+        <p:txBody>
+          <a:bodyPr wrap="none" rtlCol="0">
+            <a:spAutoFit/>
+          </a:bodyPr>
+          <a:lstStyle/>
+          <a:p>
+            <a:r>
+              <a:rPr lang="en-US" sz="1400" dirty="0"/>
+              <a:t>Edit</a:t>
+            </a:r>
+          </a:p>
+        </p:txBody>
+      </p:sp>
+      <p:sp>
+        <p:nvSpPr>
+          <p:cNvPr id="18" name="TextBox 17">
+            <a:extLst>
+              <a:ext uri="{FF2B5EF4-FFF2-40B4-BE49-F238E27FC236}">
+                <a16:creationId xmlns:a16="http://schemas.microsoft.com/office/drawing/2014/main" id="{1F4600EE-B47A-1E81-3B4C-DF0AA763B976}"/>
+              </a:ext>
+            </a:extLst>
+          </p:cNvPr>
+          <p:cNvSpPr txBox="1"/>
+          <p:nvPr/>
+        </p:nvSpPr>
+        <p:spPr>
+          <a:xfrm>
+            <a:off x="3529334" y="3414265"/>
+            <a:ext cx="7089897" cy="307776"/>
+          </a:xfrm>
+          <a:prstGeom prst="rect">
+            <a:avLst/>
+          </a:prstGeom>
+          <a:noFill/>
+          <a:ln>
+            <a:solidFill>
+              <a:schemeClr val="tx1"/>
+            </a:solidFill>
+          </a:ln>
+        </p:spPr>
+        <p:txBody>
+          <a:bodyPr wrap="square" rtlCol="0">
+            <a:spAutoFit/>
+          </a:bodyPr>
+          <a:lstStyle/>
+          <a:p>
+            <a:r>
+              <a:rPr lang="en-US" sz="1400" dirty="0"/>
+              <a:t>Word: definition………………………………</a:t>
+            </a:r>
+          </a:p>
+        </p:txBody>
+      </p:sp>
+      <p:sp>
+        <p:nvSpPr>
+          <p:cNvPr id="19" name="Oval 18">
+            <a:extLst>
+              <a:ext uri="{FF2B5EF4-FFF2-40B4-BE49-F238E27FC236}">
+                <a16:creationId xmlns:a16="http://schemas.microsoft.com/office/drawing/2014/main" id="{A0831FF8-79F1-CD1C-F12F-B88185E44FF9}"/>
+              </a:ext>
+            </a:extLst>
+          </p:cNvPr>
+          <p:cNvSpPr/>
+          <p:nvPr/>
+        </p:nvSpPr>
+        <p:spPr>
+          <a:xfrm>
+            <a:off x="1822135" y="3515970"/>
+            <a:ext cx="137160" cy="137160"/>
+          </a:xfrm>
+          <a:prstGeom prst="ellipse">
+            <a:avLst/>
+          </a:prstGeom>
+          <a:noFill/>
+          <a:ln>
+            <a:solidFill>
+              <a:schemeClr val="tx1"/>
+            </a:solidFill>
+          </a:ln>
+        </p:spPr>
+        <p:style>
+          <a:lnRef idx="2">
+            <a:schemeClr val="accent1">
+              <a:shade val="15000"/>
+            </a:schemeClr>
+          </a:lnRef>
+          <a:fillRef idx="1">
+            <a:schemeClr val="accent1"/>
+          </a:fillRef>
+          <a:effectRef idx="0">
+            <a:schemeClr val="accent1"/>
+          </a:effectRef>
+          <a:fontRef idx="minor">
+            <a:schemeClr val="lt1"/>
+          </a:fontRef>
+        </p:style>
+        <p:txBody>
+          <a:bodyPr rtlCol="0" anchor="ctr"/>
+          <a:lstStyle/>
+          <a:p>
+            <a:pPr algn="ctr"/>
+            <a:endParaRPr lang="en-US"/>
+          </a:p>
+        </p:txBody>
+      </p:sp>
+      <p:sp>
+        <p:nvSpPr>
+          <p:cNvPr id="22" name="TextBox 21">
+            <a:extLst>
+              <a:ext uri="{FF2B5EF4-FFF2-40B4-BE49-F238E27FC236}">
+                <a16:creationId xmlns:a16="http://schemas.microsoft.com/office/drawing/2014/main" id="{E50A89EE-6DAD-E50E-D7DD-8C731610F8C3}"/>
+              </a:ext>
+            </a:extLst>
+          </p:cNvPr>
+          <p:cNvSpPr txBox="1"/>
+          <p:nvPr/>
+        </p:nvSpPr>
+        <p:spPr>
+          <a:xfrm>
+            <a:off x="1556138" y="3082035"/>
+            <a:ext cx="687443" cy="430887"/>
+          </a:xfrm>
+          <a:prstGeom prst="rect">
+            <a:avLst/>
+          </a:prstGeom>
+          <a:noFill/>
+          <a:ln>
+            <a:noFill/>
+          </a:ln>
+        </p:spPr>
+        <p:txBody>
+          <a:bodyPr wrap="square" rtlCol="0">
+            <a:spAutoFit/>
+          </a:bodyPr>
+          <a:lstStyle/>
+          <a:p>
+            <a:pPr algn="ctr"/>
+            <a:r>
+              <a:rPr lang="en-US" sz="1100" dirty="0"/>
+              <a:t>Priority word</a:t>
+            </a:r>
+          </a:p>
+        </p:txBody>
+      </p:sp>
+      <p:cxnSp>
+        <p:nvCxnSpPr>
+          <p:cNvPr id="24" name="Straight Arrow Connector 23">
+            <a:extLst>
+              <a:ext uri="{FF2B5EF4-FFF2-40B4-BE49-F238E27FC236}">
+                <a16:creationId xmlns:a16="http://schemas.microsoft.com/office/drawing/2014/main" id="{BA4F65D6-04F2-EC9E-EBA0-D2ABA9548FE8}"/>
+              </a:ext>
+            </a:extLst>
+          </p:cNvPr>
+          <p:cNvCxnSpPr>
+            <a:cxnSpLocks/>
+          </p:cNvCxnSpPr>
+          <p:nvPr/>
+        </p:nvCxnSpPr>
+        <p:spPr>
+          <a:xfrm flipV="1">
+            <a:off x="929465" y="1938528"/>
+            <a:ext cx="743887" cy="96565"/>
+          </a:xfrm>
+          <a:prstGeom prst="straightConnector1">
+            <a:avLst/>
+          </a:prstGeom>
+          <a:ln w="19050">
+            <a:solidFill>
+              <a:schemeClr val="tx1"/>
+            </a:solidFill>
+            <a:tailEnd type="triangle"/>
+          </a:ln>
+        </p:spPr>
+        <p:style>
+          <a:lnRef idx="1">
+            <a:schemeClr val="accent1"/>
+          </a:lnRef>
+          <a:fillRef idx="0">
+            <a:schemeClr val="accent1"/>
+          </a:fillRef>
+          <a:effectRef idx="0">
+            <a:schemeClr val="accent1"/>
+          </a:effectRef>
+          <a:fontRef idx="minor">
+            <a:schemeClr val="tx1"/>
+          </a:fontRef>
+        </p:style>
+      </p:cxnSp>
+      <p:cxnSp>
+        <p:nvCxnSpPr>
+          <p:cNvPr id="26" name="Straight Arrow Connector 25">
+            <a:extLst>
+              <a:ext uri="{FF2B5EF4-FFF2-40B4-BE49-F238E27FC236}">
+                <a16:creationId xmlns:a16="http://schemas.microsoft.com/office/drawing/2014/main" id="{F83D1C01-107F-B750-C4BA-EC337F0132FA}"/>
+              </a:ext>
+            </a:extLst>
+          </p:cNvPr>
+          <p:cNvCxnSpPr>
+            <a:cxnSpLocks/>
+          </p:cNvCxnSpPr>
+          <p:nvPr/>
+        </p:nvCxnSpPr>
+        <p:spPr>
+          <a:xfrm>
+            <a:off x="944705" y="2406949"/>
+            <a:ext cx="646027" cy="372976"/>
+          </a:xfrm>
+          <a:prstGeom prst="straightConnector1">
+            <a:avLst/>
+          </a:prstGeom>
+          <a:ln w="19050">
+            <a:solidFill>
+              <a:schemeClr val="tx1"/>
+            </a:solidFill>
+            <a:tailEnd type="triangle"/>
+          </a:ln>
+        </p:spPr>
+        <p:style>
+          <a:lnRef idx="1">
+            <a:schemeClr val="accent1"/>
+          </a:lnRef>
+          <a:fillRef idx="0">
+            <a:schemeClr val="accent1"/>
+          </a:fillRef>
+          <a:effectRef idx="0">
+            <a:schemeClr val="accent1"/>
+          </a:effectRef>
+          <a:fontRef idx="minor">
+            <a:schemeClr val="tx1"/>
+          </a:fontRef>
+        </p:style>
+      </p:cxnSp>
+      <p:sp>
+        <p:nvSpPr>
+          <p:cNvPr id="28" name="TextBox 27">
+            <a:extLst>
+              <a:ext uri="{FF2B5EF4-FFF2-40B4-BE49-F238E27FC236}">
+                <a16:creationId xmlns:a16="http://schemas.microsoft.com/office/drawing/2014/main" id="{705EA82A-BCCF-C055-DA1E-E7F51F2AC020}"/>
+              </a:ext>
+            </a:extLst>
+          </p:cNvPr>
+          <p:cNvSpPr txBox="1"/>
+          <p:nvPr/>
+        </p:nvSpPr>
+        <p:spPr>
+          <a:xfrm>
+            <a:off x="-690721" y="1854362"/>
+            <a:ext cx="1751250" cy="738664"/>
+          </a:xfrm>
+          <a:prstGeom prst="rect">
+            <a:avLst/>
+          </a:prstGeom>
+          <a:noFill/>
+        </p:spPr>
+        <p:txBody>
+          <a:bodyPr wrap="square" rtlCol="0">
+            <a:spAutoFit/>
+          </a:bodyPr>
+          <a:lstStyle/>
+          <a:p>
+            <a:r>
+              <a:rPr lang="en-US" sz="1400" dirty="0"/>
+              <a:t>A new word gets added to the top of the edit word list</a:t>
+            </a:r>
+          </a:p>
+        </p:txBody>
+      </p:sp>
+      <p:sp>
+        <p:nvSpPr>
+          <p:cNvPr id="29" name="TextBox 28">
+            <a:extLst>
+              <a:ext uri="{FF2B5EF4-FFF2-40B4-BE49-F238E27FC236}">
+                <a16:creationId xmlns:a16="http://schemas.microsoft.com/office/drawing/2014/main" id="{A81D13CC-87C0-2067-1BBA-A1B0EE2CD3D7}"/>
+              </a:ext>
+            </a:extLst>
+          </p:cNvPr>
+          <p:cNvSpPr txBox="1"/>
+          <p:nvPr/>
+        </p:nvSpPr>
+        <p:spPr>
+          <a:xfrm>
+            <a:off x="3446595" y="3199610"/>
+            <a:ext cx="1298887" cy="260373"/>
+          </a:xfrm>
+          <a:prstGeom prst="rect">
+            <a:avLst/>
+          </a:prstGeom>
+          <a:noFill/>
+          <a:ln>
+            <a:noFill/>
+          </a:ln>
+        </p:spPr>
+        <p:txBody>
+          <a:bodyPr wrap="square" rtlCol="0">
+            <a:spAutoFit/>
+          </a:bodyPr>
+          <a:lstStyle/>
+          <a:p>
+            <a:r>
+              <a:rPr lang="en-US" sz="1100" dirty="0"/>
+              <a:t>Word: definition</a:t>
+            </a:r>
+          </a:p>
+        </p:txBody>
+      </p:sp>
+      <p:cxnSp>
+        <p:nvCxnSpPr>
+          <p:cNvPr id="30" name="Straight Arrow Connector 29">
+            <a:extLst>
+              <a:ext uri="{FF2B5EF4-FFF2-40B4-BE49-F238E27FC236}">
+                <a16:creationId xmlns:a16="http://schemas.microsoft.com/office/drawing/2014/main" id="{D32ED109-BC8B-F292-E1D9-E2981E8EB154}"/>
+              </a:ext>
+            </a:extLst>
+          </p:cNvPr>
+          <p:cNvCxnSpPr>
+            <a:cxnSpLocks/>
+          </p:cNvCxnSpPr>
+          <p:nvPr/>
+        </p:nvCxnSpPr>
+        <p:spPr>
+          <a:xfrm flipV="1">
+            <a:off x="1218518" y="3653130"/>
+            <a:ext cx="538060" cy="112566"/>
+          </a:xfrm>
+          <a:prstGeom prst="straightConnector1">
+            <a:avLst/>
+          </a:prstGeom>
+          <a:ln w="19050">
+            <a:solidFill>
+              <a:schemeClr val="tx1"/>
+            </a:solidFill>
+            <a:tailEnd type="triangle"/>
+          </a:ln>
+        </p:spPr>
+        <p:style>
+          <a:lnRef idx="1">
+            <a:schemeClr val="accent1"/>
+          </a:lnRef>
+          <a:fillRef idx="0">
+            <a:schemeClr val="accent1"/>
+          </a:fillRef>
+          <a:effectRef idx="0">
+            <a:schemeClr val="accent1"/>
+          </a:effectRef>
+          <a:fontRef idx="minor">
+            <a:schemeClr val="tx1"/>
+          </a:fontRef>
+        </p:style>
+      </p:cxnSp>
+      <p:sp>
+        <p:nvSpPr>
+          <p:cNvPr id="32" name="TextBox 31">
+            <a:extLst>
+              <a:ext uri="{FF2B5EF4-FFF2-40B4-BE49-F238E27FC236}">
+                <a16:creationId xmlns:a16="http://schemas.microsoft.com/office/drawing/2014/main" id="{FEFAD47E-37BC-F77D-D620-DDBF81476748}"/>
+              </a:ext>
+            </a:extLst>
+          </p:cNvPr>
+          <p:cNvSpPr txBox="1"/>
+          <p:nvPr/>
+        </p:nvSpPr>
+        <p:spPr>
+          <a:xfrm>
+            <a:off x="-1382233" y="3585550"/>
+            <a:ext cx="2505945" cy="738664"/>
+          </a:xfrm>
+          <a:prstGeom prst="rect">
+            <a:avLst/>
+          </a:prstGeom>
+          <a:noFill/>
+        </p:spPr>
+        <p:txBody>
+          <a:bodyPr wrap="square" rtlCol="0">
+            <a:spAutoFit/>
+          </a:bodyPr>
+          <a:lstStyle/>
+          <a:p>
+            <a:r>
+              <a:rPr lang="en-US" sz="1400" dirty="0"/>
+              <a:t>Toggled on for current priority words – immediately changes the </a:t>
+            </a:r>
+            <a:r>
+              <a:rPr lang="en-US" sz="1400" dirty="0" err="1"/>
+              <a:t>json</a:t>
+            </a:r>
+            <a:r>
+              <a:rPr lang="en-US" sz="1400" dirty="0"/>
+              <a:t> file.</a:t>
+            </a:r>
+          </a:p>
+        </p:txBody>
+      </p:sp>
+      <p:cxnSp>
+        <p:nvCxnSpPr>
+          <p:cNvPr id="33" name="Straight Arrow Connector 32">
+            <a:extLst>
+              <a:ext uri="{FF2B5EF4-FFF2-40B4-BE49-F238E27FC236}">
+                <a16:creationId xmlns:a16="http://schemas.microsoft.com/office/drawing/2014/main" id="{825B8FCB-2402-3EBF-73EE-D9BB0E38028D}"/>
+              </a:ext>
+            </a:extLst>
+          </p:cNvPr>
+          <p:cNvCxnSpPr>
+            <a:cxnSpLocks/>
+          </p:cNvCxnSpPr>
+          <p:nvPr/>
+        </p:nvCxnSpPr>
+        <p:spPr>
+          <a:xfrm flipV="1">
+            <a:off x="1218518" y="3834609"/>
+            <a:ext cx="1845163" cy="1106091"/>
+          </a:xfrm>
+          <a:prstGeom prst="straightConnector1">
+            <a:avLst/>
+          </a:prstGeom>
+          <a:ln w="19050">
+            <a:solidFill>
+              <a:schemeClr val="tx1"/>
+            </a:solidFill>
+            <a:tailEnd type="triangle"/>
+          </a:ln>
+        </p:spPr>
+        <p:style>
+          <a:lnRef idx="1">
+            <a:schemeClr val="accent1"/>
+          </a:lnRef>
+          <a:fillRef idx="0">
+            <a:schemeClr val="accent1"/>
+          </a:fillRef>
+          <a:effectRef idx="0">
+            <a:schemeClr val="accent1"/>
+          </a:effectRef>
+          <a:fontRef idx="minor">
+            <a:schemeClr val="tx1"/>
+          </a:fontRef>
+        </p:style>
+      </p:cxnSp>
+      <p:sp>
+        <p:nvSpPr>
+          <p:cNvPr id="35" name="TextBox 34">
+            <a:extLst>
+              <a:ext uri="{FF2B5EF4-FFF2-40B4-BE49-F238E27FC236}">
+                <a16:creationId xmlns:a16="http://schemas.microsoft.com/office/drawing/2014/main" id="{DA7AF72A-1380-90CC-EAA5-329272B8AC12}"/>
+              </a:ext>
+            </a:extLst>
+          </p:cNvPr>
+          <p:cNvSpPr txBox="1"/>
+          <p:nvPr/>
+        </p:nvSpPr>
+        <p:spPr>
+          <a:xfrm>
+            <a:off x="-260681" y="4888716"/>
+            <a:ext cx="1751250" cy="1384995"/>
+          </a:xfrm>
+          <a:prstGeom prst="rect">
+            <a:avLst/>
+          </a:prstGeom>
+          <a:noFill/>
+        </p:spPr>
+        <p:txBody>
+          <a:bodyPr wrap="square" rtlCol="0">
+            <a:spAutoFit/>
+          </a:bodyPr>
+          <a:lstStyle/>
+          <a:p>
+            <a:r>
+              <a:rPr lang="en-US" sz="1400" dirty="0"/>
+              <a:t>Opens a dialog box</a:t>
+            </a:r>
+          </a:p>
+          <a:p>
+            <a:r>
+              <a:rPr lang="en-US" sz="1400" dirty="0"/>
+              <a:t>(next slide), with two text boxes that can be edited (1) word and 2) def), and a ‘Save’ button.</a:t>
+            </a:r>
+          </a:p>
+        </p:txBody>
+      </p:sp>
+      <p:sp>
+        <p:nvSpPr>
+          <p:cNvPr id="36" name="TextBox 35">
+            <a:extLst>
+              <a:ext uri="{FF2B5EF4-FFF2-40B4-BE49-F238E27FC236}">
+                <a16:creationId xmlns:a16="http://schemas.microsoft.com/office/drawing/2014/main" id="{2C17E688-2537-7052-83C0-C9F87E291BF5}"/>
+              </a:ext>
+            </a:extLst>
+          </p:cNvPr>
+          <p:cNvSpPr txBox="1"/>
+          <p:nvPr/>
+        </p:nvSpPr>
+        <p:spPr>
+          <a:xfrm>
+            <a:off x="1792224" y="2033714"/>
+            <a:ext cx="570990" cy="369332"/>
+          </a:xfrm>
+          <a:prstGeom prst="rect">
+            <a:avLst/>
+          </a:prstGeom>
+          <a:noFill/>
+          <a:ln>
+            <a:solidFill>
+              <a:schemeClr val="tx1"/>
+            </a:solidFill>
+          </a:ln>
+        </p:spPr>
+        <p:txBody>
+          <a:bodyPr wrap="none" rtlCol="0">
+            <a:spAutoFit/>
+          </a:bodyPr>
+          <a:lstStyle/>
+          <a:p>
+            <a:r>
+              <a:rPr lang="en-US" b="1" dirty="0"/>
+              <a:t>Add</a:t>
+            </a:r>
+          </a:p>
+        </p:txBody>
+      </p:sp>
+      <p:sp>
+        <p:nvSpPr>
+          <p:cNvPr id="38" name="TextBox 37">
+            <a:extLst>
+              <a:ext uri="{FF2B5EF4-FFF2-40B4-BE49-F238E27FC236}">
+                <a16:creationId xmlns:a16="http://schemas.microsoft.com/office/drawing/2014/main" id="{F826FE0F-E577-B93F-CFDE-69DF8181617D}"/>
+              </a:ext>
+            </a:extLst>
+          </p:cNvPr>
+          <p:cNvSpPr txBox="1"/>
+          <p:nvPr/>
+        </p:nvSpPr>
+        <p:spPr>
+          <a:xfrm>
+            <a:off x="2209208" y="3414266"/>
+            <a:ext cx="664284" cy="307777"/>
+          </a:xfrm>
+          <a:prstGeom prst="rect">
+            <a:avLst/>
+          </a:prstGeom>
+          <a:noFill/>
+          <a:ln>
+            <a:solidFill>
+              <a:schemeClr val="tx1"/>
+            </a:solidFill>
+          </a:ln>
+        </p:spPr>
+        <p:txBody>
+          <a:bodyPr wrap="none" rtlCol="0">
+            <a:spAutoFit/>
+          </a:bodyPr>
+          <a:lstStyle/>
+          <a:p>
+            <a:r>
+              <a:rPr lang="en-US" sz="1400" dirty="0"/>
+              <a:t>Delete</a:t>
+            </a:r>
+          </a:p>
+        </p:txBody>
+      </p:sp>
+      <p:sp>
+        <p:nvSpPr>
+          <p:cNvPr id="43" name="TextBox 42">
+            <a:extLst>
+              <a:ext uri="{FF2B5EF4-FFF2-40B4-BE49-F238E27FC236}">
+                <a16:creationId xmlns:a16="http://schemas.microsoft.com/office/drawing/2014/main" id="{39BFAD7A-A269-D179-1292-637D8CC82C82}"/>
+              </a:ext>
+            </a:extLst>
+          </p:cNvPr>
+          <p:cNvSpPr txBox="1"/>
+          <p:nvPr/>
+        </p:nvSpPr>
+        <p:spPr>
+          <a:xfrm>
+            <a:off x="-770563" y="4324214"/>
+            <a:ext cx="1751250" cy="523220"/>
+          </a:xfrm>
+          <a:prstGeom prst="rect">
+            <a:avLst/>
+          </a:prstGeom>
+          <a:noFill/>
+        </p:spPr>
+        <p:txBody>
+          <a:bodyPr wrap="square" rtlCol="0">
+            <a:spAutoFit/>
+          </a:bodyPr>
+          <a:lstStyle/>
+          <a:p>
+            <a:r>
+              <a:rPr lang="en-US" sz="1400" dirty="0"/>
+              <a:t>Opens a dialog box to confirm delete</a:t>
+            </a:r>
+          </a:p>
+        </p:txBody>
+      </p:sp>
+      <p:cxnSp>
+        <p:nvCxnSpPr>
+          <p:cNvPr id="44" name="Straight Arrow Connector 43">
+            <a:extLst>
+              <a:ext uri="{FF2B5EF4-FFF2-40B4-BE49-F238E27FC236}">
+                <a16:creationId xmlns:a16="http://schemas.microsoft.com/office/drawing/2014/main" id="{08149BAD-F064-C59D-5377-3605F48EC63B}"/>
+              </a:ext>
+            </a:extLst>
+          </p:cNvPr>
+          <p:cNvCxnSpPr>
+            <a:cxnSpLocks/>
+          </p:cNvCxnSpPr>
+          <p:nvPr/>
+        </p:nvCxnSpPr>
+        <p:spPr>
+          <a:xfrm flipV="1">
+            <a:off x="980687" y="3869311"/>
+            <a:ext cx="1287349" cy="567469"/>
+          </a:xfrm>
+          <a:prstGeom prst="straightConnector1">
+            <a:avLst/>
+          </a:prstGeom>
+          <a:ln w="19050">
+            <a:solidFill>
+              <a:schemeClr val="tx1"/>
+            </a:solidFill>
+            <a:tailEnd type="triangle"/>
+          </a:ln>
+        </p:spPr>
+        <p:style>
+          <a:lnRef idx="1">
+            <a:schemeClr val="accent1"/>
+          </a:lnRef>
+          <a:fillRef idx="0">
+            <a:schemeClr val="accent1"/>
+          </a:fillRef>
+          <a:effectRef idx="0">
+            <a:schemeClr val="accent1"/>
+          </a:effectRef>
+          <a:fontRef idx="minor">
+            <a:schemeClr val="tx1"/>
+          </a:fontRef>
+        </p:style>
+      </p:cxnSp>
+    </p:spTree>
+    <p:extLst>
+      <p:ext uri="{BB962C8B-B14F-4D97-AF65-F5344CB8AC3E}">
+        <p14:creationId xmlns:p14="http://schemas.microsoft.com/office/powerpoint/2010/main" val="1007272561"/>
+      </p:ext>
+    </p:extLst>
+  </p:cSld>
+  <p:clrMapOvr>
+    <a:masterClrMapping/>
+  </p:clrMapOvr>
+</p:sld>
+</file>
+
 <file path=ppt/theme/theme1.xml><?xml version="1.0" encoding="utf-8"?>
 <a:theme xmlns:a="http://schemas.openxmlformats.org/drawingml/2006/main" name="Office Theme">
   <a:themeElements>

</xml_diff>

<commit_message>
About to start making the list of words/defs, and their buttons/etc
</commit_message>
<xml_diff>
--- a/extra/design.pptx
+++ b/extra/design.pptx
@@ -262,7 +262,7 @@
           <a:p>
             <a:fld id="{A280E058-95FB-4393-BC10-FF598184573D}" type="datetimeFigureOut">
               <a:rPr lang="en-US" smtClean="0"/>
-              <a:t>9/23/2024</a:t>
+              <a:t>10/4/2024</a:t>
             </a:fld>
             <a:endParaRPr lang="en-US"/>
           </a:p>
@@ -460,7 +460,7 @@
           <a:p>
             <a:fld id="{A280E058-95FB-4393-BC10-FF598184573D}" type="datetimeFigureOut">
               <a:rPr lang="en-US" smtClean="0"/>
-              <a:t>9/23/2024</a:t>
+              <a:t>10/4/2024</a:t>
             </a:fld>
             <a:endParaRPr lang="en-US"/>
           </a:p>
@@ -668,7 +668,7 @@
           <a:p>
             <a:fld id="{A280E058-95FB-4393-BC10-FF598184573D}" type="datetimeFigureOut">
               <a:rPr lang="en-US" smtClean="0"/>
-              <a:t>9/23/2024</a:t>
+              <a:t>10/4/2024</a:t>
             </a:fld>
             <a:endParaRPr lang="en-US"/>
           </a:p>
@@ -866,7 +866,7 @@
           <a:p>
             <a:fld id="{A280E058-95FB-4393-BC10-FF598184573D}" type="datetimeFigureOut">
               <a:rPr lang="en-US" smtClean="0"/>
-              <a:t>9/23/2024</a:t>
+              <a:t>10/4/2024</a:t>
             </a:fld>
             <a:endParaRPr lang="en-US"/>
           </a:p>
@@ -1141,7 +1141,7 @@
           <a:p>
             <a:fld id="{A280E058-95FB-4393-BC10-FF598184573D}" type="datetimeFigureOut">
               <a:rPr lang="en-US" smtClean="0"/>
-              <a:t>9/23/2024</a:t>
+              <a:t>10/4/2024</a:t>
             </a:fld>
             <a:endParaRPr lang="en-US"/>
           </a:p>
@@ -1406,7 +1406,7 @@
           <a:p>
             <a:fld id="{A280E058-95FB-4393-BC10-FF598184573D}" type="datetimeFigureOut">
               <a:rPr lang="en-US" smtClean="0"/>
-              <a:t>9/23/2024</a:t>
+              <a:t>10/4/2024</a:t>
             </a:fld>
             <a:endParaRPr lang="en-US"/>
           </a:p>
@@ -1818,7 +1818,7 @@
           <a:p>
             <a:fld id="{A280E058-95FB-4393-BC10-FF598184573D}" type="datetimeFigureOut">
               <a:rPr lang="en-US" smtClean="0"/>
-              <a:t>9/23/2024</a:t>
+              <a:t>10/4/2024</a:t>
             </a:fld>
             <a:endParaRPr lang="en-US"/>
           </a:p>
@@ -1959,7 +1959,7 @@
           <a:p>
             <a:fld id="{A280E058-95FB-4393-BC10-FF598184573D}" type="datetimeFigureOut">
               <a:rPr lang="en-US" smtClean="0"/>
-              <a:t>9/23/2024</a:t>
+              <a:t>10/4/2024</a:t>
             </a:fld>
             <a:endParaRPr lang="en-US"/>
           </a:p>
@@ -2072,7 +2072,7 @@
           <a:p>
             <a:fld id="{A280E058-95FB-4393-BC10-FF598184573D}" type="datetimeFigureOut">
               <a:rPr lang="en-US" smtClean="0"/>
-              <a:t>9/23/2024</a:t>
+              <a:t>10/4/2024</a:t>
             </a:fld>
             <a:endParaRPr lang="en-US"/>
           </a:p>
@@ -2383,7 +2383,7 @@
           <a:p>
             <a:fld id="{A280E058-95FB-4393-BC10-FF598184573D}" type="datetimeFigureOut">
               <a:rPr lang="en-US" smtClean="0"/>
-              <a:t>9/23/2024</a:t>
+              <a:t>10/4/2024</a:t>
             </a:fld>
             <a:endParaRPr lang="en-US"/>
           </a:p>
@@ -2671,7 +2671,7 @@
           <a:p>
             <a:fld id="{A280E058-95FB-4393-BC10-FF598184573D}" type="datetimeFigureOut">
               <a:rPr lang="en-US" smtClean="0"/>
-              <a:t>9/23/2024</a:t>
+              <a:t>10/4/2024</a:t>
             </a:fld>
             <a:endParaRPr lang="en-US"/>
           </a:p>
@@ -2912,7 +2912,7 @@
           <a:p>
             <a:fld id="{A280E058-95FB-4393-BC10-FF598184573D}" type="datetimeFigureOut">
               <a:rPr lang="en-US" smtClean="0"/>
-              <a:t>9/23/2024</a:t>
+              <a:t>10/4/2024</a:t>
             </a:fld>
             <a:endParaRPr lang="en-US"/>
           </a:p>
@@ -6165,7 +6165,9 @@
               </a:ext>
             </a:extLst>
           </p:cNvPr>
-          <p:cNvCxnSpPr/>
+          <p:cNvCxnSpPr>
+            <a:cxnSpLocks/>
+          </p:cNvCxnSpPr>
           <p:nvPr/>
         </p:nvCxnSpPr>
         <p:spPr>
@@ -6871,6 +6873,125 @@
           <a:xfrm flipV="1">
             <a:off x="980687" y="3869311"/>
             <a:ext cx="1287349" cy="567469"/>
+          </a:xfrm>
+          <a:prstGeom prst="straightConnector1">
+            <a:avLst/>
+          </a:prstGeom>
+          <a:ln w="19050">
+            <a:solidFill>
+              <a:schemeClr val="tx1"/>
+            </a:solidFill>
+            <a:tailEnd type="triangle"/>
+          </a:ln>
+        </p:spPr>
+        <p:style>
+          <a:lnRef idx="1">
+            <a:schemeClr val="accent1"/>
+          </a:lnRef>
+          <a:fillRef idx="0">
+            <a:schemeClr val="accent1"/>
+          </a:fillRef>
+          <a:effectRef idx="0">
+            <a:schemeClr val="accent1"/>
+          </a:effectRef>
+          <a:fontRef idx="minor">
+            <a:schemeClr val="tx1"/>
+          </a:fontRef>
+        </p:style>
+      </p:cxnSp>
+      <p:sp>
+        <p:nvSpPr>
+          <p:cNvPr id="3" name="TextBox 2">
+            <a:extLst>
+              <a:ext uri="{FF2B5EF4-FFF2-40B4-BE49-F238E27FC236}">
+                <a16:creationId xmlns:a16="http://schemas.microsoft.com/office/drawing/2014/main" id="{61BB2099-3654-EBC0-1049-8985890B0840}"/>
+              </a:ext>
+            </a:extLst>
+          </p:cNvPr>
+          <p:cNvSpPr txBox="1"/>
+          <p:nvPr/>
+        </p:nvSpPr>
+        <p:spPr>
+          <a:xfrm>
+            <a:off x="9254396" y="2693094"/>
+            <a:ext cx="1526380" cy="338554"/>
+          </a:xfrm>
+          <a:prstGeom prst="rect">
+            <a:avLst/>
+          </a:prstGeom>
+          <a:noFill/>
+          <a:ln>
+            <a:solidFill>
+              <a:schemeClr val="tx1"/>
+            </a:solidFill>
+          </a:ln>
+        </p:spPr>
+        <p:txBody>
+          <a:bodyPr wrap="none" rtlCol="0">
+            <a:spAutoFit/>
+          </a:bodyPr>
+          <a:lstStyle/>
+          <a:p>
+            <a:r>
+              <a:rPr lang="en-US" sz="1600" dirty="0"/>
+              <a:t>Delete all words</a:t>
+            </a:r>
+          </a:p>
+        </p:txBody>
+      </p:sp>
+      <p:sp>
+        <p:nvSpPr>
+          <p:cNvPr id="9" name="TextBox 8">
+            <a:extLst>
+              <a:ext uri="{FF2B5EF4-FFF2-40B4-BE49-F238E27FC236}">
+                <a16:creationId xmlns:a16="http://schemas.microsoft.com/office/drawing/2014/main" id="{A7E2D57C-C5A7-453E-B220-AF1FB2EFCA00}"/>
+              </a:ext>
+            </a:extLst>
+          </p:cNvPr>
+          <p:cNvSpPr txBox="1"/>
+          <p:nvPr/>
+        </p:nvSpPr>
+        <p:spPr>
+          <a:xfrm>
+            <a:off x="10947441" y="3516926"/>
+            <a:ext cx="1190215" cy="954107"/>
+          </a:xfrm>
+          <a:prstGeom prst="rect">
+            <a:avLst/>
+          </a:prstGeom>
+          <a:noFill/>
+        </p:spPr>
+        <p:txBody>
+          <a:bodyPr wrap="square" rtlCol="0">
+            <a:spAutoFit/>
+          </a:bodyPr>
+          <a:lstStyle/>
+          <a:p>
+            <a:r>
+              <a:rPr lang="en-US" sz="1400" dirty="0"/>
+              <a:t>Opens a dialog box to confirm delete</a:t>
+            </a:r>
+          </a:p>
+        </p:txBody>
+      </p:sp>
+      <p:cxnSp>
+        <p:nvCxnSpPr>
+          <p:cNvPr id="11" name="Straight Arrow Connector 10">
+            <a:extLst>
+              <a:ext uri="{FF2B5EF4-FFF2-40B4-BE49-F238E27FC236}">
+                <a16:creationId xmlns:a16="http://schemas.microsoft.com/office/drawing/2014/main" id="{305CDBB1-271D-CED7-EDC0-344C81252505}"/>
+              </a:ext>
+            </a:extLst>
+          </p:cNvPr>
+          <p:cNvCxnSpPr>
+            <a:cxnSpLocks/>
+          </p:cNvCxnSpPr>
+          <p:nvPr/>
+        </p:nvCxnSpPr>
+        <p:spPr>
+          <a:xfrm flipH="1" flipV="1">
+            <a:off x="10800356" y="3063686"/>
+            <a:ext cx="364061" cy="507066"/>
           </a:xfrm>
           <a:prstGeom prst="straightConnector1">
             <a:avLst/>

</xml_diff>

<commit_message>
working on current words/defs list
</commit_message>
<xml_diff>
--- a/extra/design.pptx
+++ b/extra/design.pptx
@@ -262,7 +262,7 @@
           <a:p>
             <a:fld id="{A280E058-95FB-4393-BC10-FF598184573D}" type="datetimeFigureOut">
               <a:rPr lang="en-US" smtClean="0"/>
-              <a:t>10/4/2024</a:t>
+              <a:t>10/9/2024</a:t>
             </a:fld>
             <a:endParaRPr lang="en-US"/>
           </a:p>
@@ -460,7 +460,7 @@
           <a:p>
             <a:fld id="{A280E058-95FB-4393-BC10-FF598184573D}" type="datetimeFigureOut">
               <a:rPr lang="en-US" smtClean="0"/>
-              <a:t>10/4/2024</a:t>
+              <a:t>10/9/2024</a:t>
             </a:fld>
             <a:endParaRPr lang="en-US"/>
           </a:p>
@@ -668,7 +668,7 @@
           <a:p>
             <a:fld id="{A280E058-95FB-4393-BC10-FF598184573D}" type="datetimeFigureOut">
               <a:rPr lang="en-US" smtClean="0"/>
-              <a:t>10/4/2024</a:t>
+              <a:t>10/9/2024</a:t>
             </a:fld>
             <a:endParaRPr lang="en-US"/>
           </a:p>
@@ -866,7 +866,7 @@
           <a:p>
             <a:fld id="{A280E058-95FB-4393-BC10-FF598184573D}" type="datetimeFigureOut">
               <a:rPr lang="en-US" smtClean="0"/>
-              <a:t>10/4/2024</a:t>
+              <a:t>10/9/2024</a:t>
             </a:fld>
             <a:endParaRPr lang="en-US"/>
           </a:p>
@@ -1141,7 +1141,7 @@
           <a:p>
             <a:fld id="{A280E058-95FB-4393-BC10-FF598184573D}" type="datetimeFigureOut">
               <a:rPr lang="en-US" smtClean="0"/>
-              <a:t>10/4/2024</a:t>
+              <a:t>10/9/2024</a:t>
             </a:fld>
             <a:endParaRPr lang="en-US"/>
           </a:p>
@@ -1406,7 +1406,7 @@
           <a:p>
             <a:fld id="{A280E058-95FB-4393-BC10-FF598184573D}" type="datetimeFigureOut">
               <a:rPr lang="en-US" smtClean="0"/>
-              <a:t>10/4/2024</a:t>
+              <a:t>10/9/2024</a:t>
             </a:fld>
             <a:endParaRPr lang="en-US"/>
           </a:p>
@@ -1818,7 +1818,7 @@
           <a:p>
             <a:fld id="{A280E058-95FB-4393-BC10-FF598184573D}" type="datetimeFigureOut">
               <a:rPr lang="en-US" smtClean="0"/>
-              <a:t>10/4/2024</a:t>
+              <a:t>10/9/2024</a:t>
             </a:fld>
             <a:endParaRPr lang="en-US"/>
           </a:p>
@@ -1959,7 +1959,7 @@
           <a:p>
             <a:fld id="{A280E058-95FB-4393-BC10-FF598184573D}" type="datetimeFigureOut">
               <a:rPr lang="en-US" smtClean="0"/>
-              <a:t>10/4/2024</a:t>
+              <a:t>10/9/2024</a:t>
             </a:fld>
             <a:endParaRPr lang="en-US"/>
           </a:p>
@@ -2072,7 +2072,7 @@
           <a:p>
             <a:fld id="{A280E058-95FB-4393-BC10-FF598184573D}" type="datetimeFigureOut">
               <a:rPr lang="en-US" smtClean="0"/>
-              <a:t>10/4/2024</a:t>
+              <a:t>10/9/2024</a:t>
             </a:fld>
             <a:endParaRPr lang="en-US"/>
           </a:p>
@@ -2383,7 +2383,7 @@
           <a:p>
             <a:fld id="{A280E058-95FB-4393-BC10-FF598184573D}" type="datetimeFigureOut">
               <a:rPr lang="en-US" smtClean="0"/>
-              <a:t>10/4/2024</a:t>
+              <a:t>10/9/2024</a:t>
             </a:fld>
             <a:endParaRPr lang="en-US"/>
           </a:p>
@@ -2671,7 +2671,7 @@
           <a:p>
             <a:fld id="{A280E058-95FB-4393-BC10-FF598184573D}" type="datetimeFigureOut">
               <a:rPr lang="en-US" smtClean="0"/>
-              <a:t>10/4/2024</a:t>
+              <a:t>10/9/2024</a:t>
             </a:fld>
             <a:endParaRPr lang="en-US"/>
           </a:p>
@@ -2912,7 +2912,7 @@
           <a:p>
             <a:fld id="{A280E058-95FB-4393-BC10-FF598184573D}" type="datetimeFigureOut">
               <a:rPr lang="en-US" smtClean="0"/>
-              <a:t>10/4/2024</a:t>
+              <a:t>10/9/2024</a:t>
             </a:fld>
             <a:endParaRPr lang="en-US"/>
           </a:p>
@@ -4668,7 +4668,7 @@
             <a:pPr algn="r"/>
             <a:r>
               <a:rPr lang="en-US" sz="1600" dirty="0"/>
-              <a:t>Change time for program to run(24 hour clock):</a:t>
+              <a:t>Change time for program to run (24 hour clock):</a:t>
             </a:r>
           </a:p>
         </p:txBody>

</xml_diff>

<commit_message>
Starting the edit button pressed stuff
</commit_message>
<xml_diff>
--- a/extra/design.pptx
+++ b/extra/design.pptx
@@ -9,6 +9,7 @@
     <p:sldId id="257" r:id="rId3"/>
     <p:sldId id="258" r:id="rId4"/>
     <p:sldId id="259" r:id="rId5"/>
+    <p:sldId id="260" r:id="rId6"/>
   </p:sldIdLst>
   <p:sldSz cx="12192000" cy="6858000"/>
   <p:notesSz cx="6858000" cy="9144000"/>
@@ -262,7 +263,7 @@
           <a:p>
             <a:fld id="{A280E058-95FB-4393-BC10-FF598184573D}" type="datetimeFigureOut">
               <a:rPr lang="en-US" smtClean="0"/>
-              <a:t>10/9/2024</a:t>
+              <a:t>10/29/2024</a:t>
             </a:fld>
             <a:endParaRPr lang="en-US"/>
           </a:p>
@@ -460,7 +461,7 @@
           <a:p>
             <a:fld id="{A280E058-95FB-4393-BC10-FF598184573D}" type="datetimeFigureOut">
               <a:rPr lang="en-US" smtClean="0"/>
-              <a:t>10/9/2024</a:t>
+              <a:t>10/29/2024</a:t>
             </a:fld>
             <a:endParaRPr lang="en-US"/>
           </a:p>
@@ -668,7 +669,7 @@
           <a:p>
             <a:fld id="{A280E058-95FB-4393-BC10-FF598184573D}" type="datetimeFigureOut">
               <a:rPr lang="en-US" smtClean="0"/>
-              <a:t>10/9/2024</a:t>
+              <a:t>10/29/2024</a:t>
             </a:fld>
             <a:endParaRPr lang="en-US"/>
           </a:p>
@@ -866,7 +867,7 @@
           <a:p>
             <a:fld id="{A280E058-95FB-4393-BC10-FF598184573D}" type="datetimeFigureOut">
               <a:rPr lang="en-US" smtClean="0"/>
-              <a:t>10/9/2024</a:t>
+              <a:t>10/29/2024</a:t>
             </a:fld>
             <a:endParaRPr lang="en-US"/>
           </a:p>
@@ -1141,7 +1142,7 @@
           <a:p>
             <a:fld id="{A280E058-95FB-4393-BC10-FF598184573D}" type="datetimeFigureOut">
               <a:rPr lang="en-US" smtClean="0"/>
-              <a:t>10/9/2024</a:t>
+              <a:t>10/29/2024</a:t>
             </a:fld>
             <a:endParaRPr lang="en-US"/>
           </a:p>
@@ -1406,7 +1407,7 @@
           <a:p>
             <a:fld id="{A280E058-95FB-4393-BC10-FF598184573D}" type="datetimeFigureOut">
               <a:rPr lang="en-US" smtClean="0"/>
-              <a:t>10/9/2024</a:t>
+              <a:t>10/29/2024</a:t>
             </a:fld>
             <a:endParaRPr lang="en-US"/>
           </a:p>
@@ -1818,7 +1819,7 @@
           <a:p>
             <a:fld id="{A280E058-95FB-4393-BC10-FF598184573D}" type="datetimeFigureOut">
               <a:rPr lang="en-US" smtClean="0"/>
-              <a:t>10/9/2024</a:t>
+              <a:t>10/29/2024</a:t>
             </a:fld>
             <a:endParaRPr lang="en-US"/>
           </a:p>
@@ -1959,7 +1960,7 @@
           <a:p>
             <a:fld id="{A280E058-95FB-4393-BC10-FF598184573D}" type="datetimeFigureOut">
               <a:rPr lang="en-US" smtClean="0"/>
-              <a:t>10/9/2024</a:t>
+              <a:t>10/29/2024</a:t>
             </a:fld>
             <a:endParaRPr lang="en-US"/>
           </a:p>
@@ -2072,7 +2073,7 @@
           <a:p>
             <a:fld id="{A280E058-95FB-4393-BC10-FF598184573D}" type="datetimeFigureOut">
               <a:rPr lang="en-US" smtClean="0"/>
-              <a:t>10/9/2024</a:t>
+              <a:t>10/29/2024</a:t>
             </a:fld>
             <a:endParaRPr lang="en-US"/>
           </a:p>
@@ -2383,7 +2384,7 @@
           <a:p>
             <a:fld id="{A280E058-95FB-4393-BC10-FF598184573D}" type="datetimeFigureOut">
               <a:rPr lang="en-US" smtClean="0"/>
-              <a:t>10/9/2024</a:t>
+              <a:t>10/29/2024</a:t>
             </a:fld>
             <a:endParaRPr lang="en-US"/>
           </a:p>
@@ -2671,7 +2672,7 @@
           <a:p>
             <a:fld id="{A280E058-95FB-4393-BC10-FF598184573D}" type="datetimeFigureOut">
               <a:rPr lang="en-US" smtClean="0"/>
-              <a:t>10/9/2024</a:t>
+              <a:t>10/29/2024</a:t>
             </a:fld>
             <a:endParaRPr lang="en-US"/>
           </a:p>
@@ -2912,7 +2913,7 @@
           <a:p>
             <a:fld id="{A280E058-95FB-4393-BC10-FF598184573D}" type="datetimeFigureOut">
               <a:rPr lang="en-US" smtClean="0"/>
-              <a:t>10/9/2024</a:t>
+              <a:t>10/29/2024</a:t>
             </a:fld>
             <a:endParaRPr lang="en-US"/>
           </a:p>
@@ -7031,6 +7032,1290 @@
 </p:sld>
 </file>
 
+<file path=ppt/slides/slide5.xml><?xml version="1.0" encoding="utf-8"?>
+<p:sld xmlns:a="http://schemas.openxmlformats.org/drawingml/2006/main" xmlns:r="http://schemas.openxmlformats.org/officeDocument/2006/relationships" xmlns:p="http://schemas.openxmlformats.org/presentationml/2006/main">
+  <p:cSld>
+    <p:spTree>
+      <p:nvGrpSpPr>
+        <p:cNvPr id="1" name=""/>
+        <p:cNvGrpSpPr/>
+        <p:nvPr/>
+      </p:nvGrpSpPr>
+      <p:grpSpPr>
+        <a:xfrm>
+          <a:off x="0" y="0"/>
+          <a:ext cx="0" cy="0"/>
+          <a:chOff x="0" y="0"/>
+          <a:chExt cx="0" cy="0"/>
+        </a:xfrm>
+      </p:grpSpPr>
+      <p:sp>
+        <p:nvSpPr>
+          <p:cNvPr id="2" name="Rectangle 1">
+            <a:extLst>
+              <a:ext uri="{FF2B5EF4-FFF2-40B4-BE49-F238E27FC236}">
+                <a16:creationId xmlns:a16="http://schemas.microsoft.com/office/drawing/2014/main" id="{8F82538F-5555-FAE4-1F65-6ABF9D17C562}"/>
+              </a:ext>
+            </a:extLst>
+          </p:cNvPr>
+          <p:cNvSpPr/>
+          <p:nvPr/>
+        </p:nvSpPr>
+        <p:spPr>
+          <a:xfrm>
+            <a:off x="915811" y="1461808"/>
+            <a:ext cx="4859177" cy="3336435"/>
+          </a:xfrm>
+          <a:prstGeom prst="rect">
+            <a:avLst/>
+          </a:prstGeom>
+          <a:noFill/>
+          <a:ln w="28575">
+            <a:solidFill>
+              <a:schemeClr val="tx1"/>
+            </a:solidFill>
+          </a:ln>
+        </p:spPr>
+        <p:style>
+          <a:lnRef idx="2">
+            <a:schemeClr val="accent1">
+              <a:shade val="15000"/>
+            </a:schemeClr>
+          </a:lnRef>
+          <a:fillRef idx="1">
+            <a:schemeClr val="accent1"/>
+          </a:fillRef>
+          <a:effectRef idx="0">
+            <a:schemeClr val="accent1"/>
+          </a:effectRef>
+          <a:fontRef idx="minor">
+            <a:schemeClr val="lt1"/>
+          </a:fontRef>
+        </p:style>
+        <p:txBody>
+          <a:bodyPr rtlCol="0" anchor="ctr"/>
+          <a:lstStyle/>
+          <a:p>
+            <a:pPr algn="ctr"/>
+            <a:endParaRPr lang="en-US"/>
+          </a:p>
+        </p:txBody>
+      </p:sp>
+      <p:sp>
+        <p:nvSpPr>
+          <p:cNvPr id="3" name="TextBox 2">
+            <a:extLst>
+              <a:ext uri="{FF2B5EF4-FFF2-40B4-BE49-F238E27FC236}">
+                <a16:creationId xmlns:a16="http://schemas.microsoft.com/office/drawing/2014/main" id="{404CFB26-8ABC-9A11-7123-920020639B65}"/>
+              </a:ext>
+            </a:extLst>
+          </p:cNvPr>
+          <p:cNvSpPr txBox="1"/>
+          <p:nvPr/>
+        </p:nvSpPr>
+        <p:spPr>
+          <a:xfrm>
+            <a:off x="1905698" y="1533490"/>
+            <a:ext cx="2879402" cy="369332"/>
+          </a:xfrm>
+          <a:prstGeom prst="rect">
+            <a:avLst/>
+          </a:prstGeom>
+          <a:noFill/>
+        </p:spPr>
+        <p:txBody>
+          <a:bodyPr wrap="square" rtlCol="0">
+            <a:spAutoFit/>
+          </a:bodyPr>
+          <a:lstStyle/>
+          <a:p>
+            <a:pPr algn="ctr"/>
+            <a:r>
+              <a:rPr lang="en-US" i="1" dirty="0"/>
+              <a:t>Program currently running</a:t>
+            </a:r>
+          </a:p>
+        </p:txBody>
+      </p:sp>
+      <p:sp>
+        <p:nvSpPr>
+          <p:cNvPr id="5" name="TextBox 4">
+            <a:extLst>
+              <a:ext uri="{FF2B5EF4-FFF2-40B4-BE49-F238E27FC236}">
+                <a16:creationId xmlns:a16="http://schemas.microsoft.com/office/drawing/2014/main" id="{A8ECA426-E6F6-7BF7-7739-7F317FDBF216}"/>
+              </a:ext>
+            </a:extLst>
+          </p:cNvPr>
+          <p:cNvSpPr txBox="1"/>
+          <p:nvPr/>
+        </p:nvSpPr>
+        <p:spPr>
+          <a:xfrm>
+            <a:off x="847326" y="2253580"/>
+            <a:ext cx="3467934" cy="584775"/>
+          </a:xfrm>
+          <a:prstGeom prst="rect">
+            <a:avLst/>
+          </a:prstGeom>
+          <a:noFill/>
+        </p:spPr>
+        <p:txBody>
+          <a:bodyPr wrap="square" rtlCol="0">
+            <a:spAutoFit/>
+          </a:bodyPr>
+          <a:lstStyle/>
+          <a:p>
+            <a:pPr algn="r"/>
+            <a:r>
+              <a:rPr lang="en-US" sz="1600" dirty="0"/>
+              <a:t>Change time for program to run (24 hour clock):</a:t>
+            </a:r>
+          </a:p>
+        </p:txBody>
+      </p:sp>
+      <p:sp>
+        <p:nvSpPr>
+          <p:cNvPr id="6" name="TextBox 5">
+            <a:extLst>
+              <a:ext uri="{FF2B5EF4-FFF2-40B4-BE49-F238E27FC236}">
+                <a16:creationId xmlns:a16="http://schemas.microsoft.com/office/drawing/2014/main" id="{02092153-F755-87C9-19B4-ADE8EC01A21D}"/>
+              </a:ext>
+            </a:extLst>
+          </p:cNvPr>
+          <p:cNvSpPr txBox="1"/>
+          <p:nvPr/>
+        </p:nvSpPr>
+        <p:spPr>
+          <a:xfrm>
+            <a:off x="4418247" y="2348373"/>
+            <a:ext cx="429768" cy="369332"/>
+          </a:xfrm>
+          <a:prstGeom prst="rect">
+            <a:avLst/>
+          </a:prstGeom>
+          <a:noFill/>
+          <a:ln>
+            <a:solidFill>
+              <a:schemeClr val="tx1"/>
+            </a:solidFill>
+          </a:ln>
+        </p:spPr>
+        <p:txBody>
+          <a:bodyPr wrap="square" rtlCol="0">
+            <a:spAutoFit/>
+          </a:bodyPr>
+          <a:lstStyle/>
+          <a:p>
+            <a:r>
+              <a:rPr lang="en-US" dirty="0"/>
+              <a:t>00</a:t>
+            </a:r>
+          </a:p>
+        </p:txBody>
+      </p:sp>
+      <p:sp>
+        <p:nvSpPr>
+          <p:cNvPr id="7" name="TextBox 6">
+            <a:extLst>
+              <a:ext uri="{FF2B5EF4-FFF2-40B4-BE49-F238E27FC236}">
+                <a16:creationId xmlns:a16="http://schemas.microsoft.com/office/drawing/2014/main" id="{908828F5-921F-A0A5-BE31-534E624CEF0D}"/>
+              </a:ext>
+            </a:extLst>
+          </p:cNvPr>
+          <p:cNvSpPr txBox="1"/>
+          <p:nvPr/>
+        </p:nvSpPr>
+        <p:spPr>
+          <a:xfrm>
+            <a:off x="5100999" y="2348373"/>
+            <a:ext cx="429768" cy="369332"/>
+          </a:xfrm>
+          <a:prstGeom prst="rect">
+            <a:avLst/>
+          </a:prstGeom>
+          <a:noFill/>
+          <a:ln>
+            <a:solidFill>
+              <a:schemeClr val="tx1"/>
+            </a:solidFill>
+          </a:ln>
+        </p:spPr>
+        <p:txBody>
+          <a:bodyPr wrap="square" rtlCol="0">
+            <a:spAutoFit/>
+          </a:bodyPr>
+          <a:lstStyle/>
+          <a:p>
+            <a:r>
+              <a:rPr lang="en-US" dirty="0"/>
+              <a:t>00</a:t>
+            </a:r>
+          </a:p>
+        </p:txBody>
+      </p:sp>
+      <p:sp>
+        <p:nvSpPr>
+          <p:cNvPr id="8" name="TextBox 7">
+            <a:extLst>
+              <a:ext uri="{FF2B5EF4-FFF2-40B4-BE49-F238E27FC236}">
+                <a16:creationId xmlns:a16="http://schemas.microsoft.com/office/drawing/2014/main" id="{75AE7D4E-0DBC-43AF-A00E-4F0690E816A5}"/>
+              </a:ext>
+            </a:extLst>
+          </p:cNvPr>
+          <p:cNvSpPr txBox="1"/>
+          <p:nvPr/>
+        </p:nvSpPr>
+        <p:spPr>
+          <a:xfrm>
+            <a:off x="4822488" y="2322973"/>
+            <a:ext cx="304038" cy="369332"/>
+          </a:xfrm>
+          <a:prstGeom prst="rect">
+            <a:avLst/>
+          </a:prstGeom>
+          <a:noFill/>
+        </p:spPr>
+        <p:txBody>
+          <a:bodyPr wrap="square" rtlCol="0">
+            <a:spAutoFit/>
+          </a:bodyPr>
+          <a:lstStyle/>
+          <a:p>
+            <a:pPr algn="ctr"/>
+            <a:r>
+              <a:rPr lang="en-US" dirty="0"/>
+              <a:t>:</a:t>
+            </a:r>
+          </a:p>
+        </p:txBody>
+      </p:sp>
+      <p:sp>
+        <p:nvSpPr>
+          <p:cNvPr id="9" name="TextBox 8">
+            <a:extLst>
+              <a:ext uri="{FF2B5EF4-FFF2-40B4-BE49-F238E27FC236}">
+                <a16:creationId xmlns:a16="http://schemas.microsoft.com/office/drawing/2014/main" id="{7819A6AA-95F8-F99E-C2AF-DA1B11B621C9}"/>
+              </a:ext>
+            </a:extLst>
+          </p:cNvPr>
+          <p:cNvSpPr txBox="1"/>
+          <p:nvPr/>
+        </p:nvSpPr>
+        <p:spPr>
+          <a:xfrm>
+            <a:off x="3225645" y="2961673"/>
+            <a:ext cx="415362" cy="338554"/>
+          </a:xfrm>
+          <a:prstGeom prst="rect">
+            <a:avLst/>
+          </a:prstGeom>
+          <a:noFill/>
+        </p:spPr>
+        <p:txBody>
+          <a:bodyPr wrap="square" rtlCol="0">
+            <a:spAutoFit/>
+          </a:bodyPr>
+          <a:lstStyle/>
+          <a:p>
+            <a:pPr algn="r"/>
+            <a:r>
+              <a:rPr lang="en-US" sz="1600" dirty="0"/>
+              <a:t>Or</a:t>
+            </a:r>
+          </a:p>
+        </p:txBody>
+      </p:sp>
+      <p:sp>
+        <p:nvSpPr>
+          <p:cNvPr id="10" name="TextBox 9">
+            <a:extLst>
+              <a:ext uri="{FF2B5EF4-FFF2-40B4-BE49-F238E27FC236}">
+                <a16:creationId xmlns:a16="http://schemas.microsoft.com/office/drawing/2014/main" id="{B68CD544-9AC5-1919-11F4-4441C12BAC54}"/>
+              </a:ext>
+            </a:extLst>
+          </p:cNvPr>
+          <p:cNvSpPr txBox="1"/>
+          <p:nvPr/>
+        </p:nvSpPr>
+        <p:spPr>
+          <a:xfrm>
+            <a:off x="5046886" y="4294653"/>
+            <a:ext cx="613410" cy="369332"/>
+          </a:xfrm>
+          <a:prstGeom prst="rect">
+            <a:avLst/>
+          </a:prstGeom>
+          <a:noFill/>
+          <a:ln>
+            <a:solidFill>
+              <a:schemeClr val="tx1"/>
+            </a:solidFill>
+          </a:ln>
+        </p:spPr>
+        <p:txBody>
+          <a:bodyPr wrap="square" rtlCol="0">
+            <a:spAutoFit/>
+          </a:bodyPr>
+          <a:lstStyle/>
+          <a:p>
+            <a:pPr algn="ctr"/>
+            <a:r>
+              <a:rPr lang="en-US" b="1" dirty="0"/>
+              <a:t>Ok</a:t>
+            </a:r>
+          </a:p>
+        </p:txBody>
+      </p:sp>
+      <p:cxnSp>
+        <p:nvCxnSpPr>
+          <p:cNvPr id="11" name="Straight Connector 10">
+            <a:extLst>
+              <a:ext uri="{FF2B5EF4-FFF2-40B4-BE49-F238E27FC236}">
+                <a16:creationId xmlns:a16="http://schemas.microsoft.com/office/drawing/2014/main" id="{BAAFEF65-4FDC-21B5-C322-A8D234BAB7A9}"/>
+              </a:ext>
+            </a:extLst>
+          </p:cNvPr>
+          <p:cNvCxnSpPr>
+            <a:cxnSpLocks/>
+          </p:cNvCxnSpPr>
+          <p:nvPr/>
+        </p:nvCxnSpPr>
+        <p:spPr>
+          <a:xfrm flipV="1">
+            <a:off x="3641007" y="3142809"/>
+            <a:ext cx="201168" cy="333"/>
+          </a:xfrm>
+          <a:prstGeom prst="line">
+            <a:avLst/>
+          </a:prstGeom>
+          <a:ln w="12700">
+            <a:solidFill>
+              <a:schemeClr val="tx1"/>
+            </a:solidFill>
+          </a:ln>
+        </p:spPr>
+        <p:style>
+          <a:lnRef idx="1">
+            <a:schemeClr val="accent1"/>
+          </a:lnRef>
+          <a:fillRef idx="0">
+            <a:schemeClr val="accent1"/>
+          </a:fillRef>
+          <a:effectRef idx="0">
+            <a:schemeClr val="accent1"/>
+          </a:effectRef>
+          <a:fontRef idx="minor">
+            <a:schemeClr val="tx1"/>
+          </a:fontRef>
+        </p:style>
+      </p:cxnSp>
+      <p:cxnSp>
+        <p:nvCxnSpPr>
+          <p:cNvPr id="12" name="Straight Connector 11">
+            <a:extLst>
+              <a:ext uri="{FF2B5EF4-FFF2-40B4-BE49-F238E27FC236}">
+                <a16:creationId xmlns:a16="http://schemas.microsoft.com/office/drawing/2014/main" id="{1B8D641C-448F-1B11-AA1D-A20023501800}"/>
+              </a:ext>
+            </a:extLst>
+          </p:cNvPr>
+          <p:cNvCxnSpPr>
+            <a:cxnSpLocks/>
+          </p:cNvCxnSpPr>
+          <p:nvPr/>
+        </p:nvCxnSpPr>
+        <p:spPr>
+          <a:xfrm flipV="1">
+            <a:off x="3025311" y="3142809"/>
+            <a:ext cx="201168" cy="333"/>
+          </a:xfrm>
+          <a:prstGeom prst="line">
+            <a:avLst/>
+          </a:prstGeom>
+          <a:ln w="12700">
+            <a:solidFill>
+              <a:schemeClr val="tx1"/>
+            </a:solidFill>
+          </a:ln>
+        </p:spPr>
+        <p:style>
+          <a:lnRef idx="1">
+            <a:schemeClr val="accent1"/>
+          </a:lnRef>
+          <a:fillRef idx="0">
+            <a:schemeClr val="accent1"/>
+          </a:fillRef>
+          <a:effectRef idx="0">
+            <a:schemeClr val="accent1"/>
+          </a:effectRef>
+          <a:fontRef idx="minor">
+            <a:schemeClr val="tx1"/>
+          </a:fontRef>
+        </p:style>
+      </p:cxnSp>
+      <p:sp>
+        <p:nvSpPr>
+          <p:cNvPr id="13" name="TextBox 12">
+            <a:extLst>
+              <a:ext uri="{FF2B5EF4-FFF2-40B4-BE49-F238E27FC236}">
+                <a16:creationId xmlns:a16="http://schemas.microsoft.com/office/drawing/2014/main" id="{43CDACA0-1096-52AA-18AA-4B4E54D7626D}"/>
+              </a:ext>
+            </a:extLst>
+          </p:cNvPr>
+          <p:cNvSpPr txBox="1"/>
+          <p:nvPr/>
+        </p:nvSpPr>
+        <p:spPr>
+          <a:xfrm>
+            <a:off x="2635421" y="3538193"/>
+            <a:ext cx="273812" cy="249352"/>
+          </a:xfrm>
+          <a:prstGeom prst="rect">
+            <a:avLst/>
+          </a:prstGeom>
+          <a:noFill/>
+          <a:ln>
+            <a:solidFill>
+              <a:schemeClr val="tx1"/>
+            </a:solidFill>
+          </a:ln>
+        </p:spPr>
+        <p:txBody>
+          <a:bodyPr wrap="square" rtlCol="0">
+            <a:spAutoFit/>
+          </a:bodyPr>
+          <a:lstStyle/>
+          <a:p>
+            <a:endParaRPr lang="en-US" dirty="0"/>
+          </a:p>
+        </p:txBody>
+      </p:sp>
+      <p:sp>
+        <p:nvSpPr>
+          <p:cNvPr id="14" name="Oval 13">
+            <a:extLst>
+              <a:ext uri="{FF2B5EF4-FFF2-40B4-BE49-F238E27FC236}">
+                <a16:creationId xmlns:a16="http://schemas.microsoft.com/office/drawing/2014/main" id="{0FE48864-9A07-FDE1-8CF4-570744667414}"/>
+              </a:ext>
+            </a:extLst>
+          </p:cNvPr>
+          <p:cNvSpPr/>
+          <p:nvPr/>
+        </p:nvSpPr>
+        <p:spPr>
+          <a:xfrm>
+            <a:off x="2709162" y="3594875"/>
+            <a:ext cx="126330" cy="126330"/>
+          </a:xfrm>
+          <a:prstGeom prst="ellipse">
+            <a:avLst/>
+          </a:prstGeom>
+          <a:solidFill>
+            <a:schemeClr val="tx1"/>
+          </a:solidFill>
+          <a:ln>
+            <a:noFill/>
+          </a:ln>
+        </p:spPr>
+        <p:style>
+          <a:lnRef idx="2">
+            <a:schemeClr val="accent1">
+              <a:shade val="15000"/>
+            </a:schemeClr>
+          </a:lnRef>
+          <a:fillRef idx="1">
+            <a:schemeClr val="accent1"/>
+          </a:fillRef>
+          <a:effectRef idx="0">
+            <a:schemeClr val="accent1"/>
+          </a:effectRef>
+          <a:fontRef idx="minor">
+            <a:schemeClr val="lt1"/>
+          </a:fontRef>
+        </p:style>
+        <p:txBody>
+          <a:bodyPr rtlCol="0" anchor="ctr"/>
+          <a:lstStyle/>
+          <a:p>
+            <a:pPr algn="ctr"/>
+            <a:endParaRPr lang="en-US"/>
+          </a:p>
+        </p:txBody>
+      </p:sp>
+      <p:sp>
+        <p:nvSpPr>
+          <p:cNvPr id="15" name="TextBox 14">
+            <a:extLst>
+              <a:ext uri="{FF2B5EF4-FFF2-40B4-BE49-F238E27FC236}">
+                <a16:creationId xmlns:a16="http://schemas.microsoft.com/office/drawing/2014/main" id="{B8CDE9B8-96D7-F361-EDBD-A16339A64D0C}"/>
+              </a:ext>
+            </a:extLst>
+          </p:cNvPr>
+          <p:cNvSpPr txBox="1"/>
+          <p:nvPr/>
+        </p:nvSpPr>
+        <p:spPr>
+          <a:xfrm>
+            <a:off x="925239" y="3466052"/>
+            <a:ext cx="1655064" cy="338554"/>
+          </a:xfrm>
+          <a:prstGeom prst="rect">
+            <a:avLst/>
+          </a:prstGeom>
+          <a:noFill/>
+        </p:spPr>
+        <p:txBody>
+          <a:bodyPr wrap="square" rtlCol="0">
+            <a:spAutoFit/>
+          </a:bodyPr>
+          <a:lstStyle/>
+          <a:p>
+            <a:pPr algn="r"/>
+            <a:r>
+              <a:rPr lang="en-US" sz="1600" dirty="0"/>
+              <a:t>Stop program</a:t>
+            </a:r>
+          </a:p>
+        </p:txBody>
+      </p:sp>
+      <p:sp>
+        <p:nvSpPr>
+          <p:cNvPr id="28" name="TextBox 27">
+            <a:extLst>
+              <a:ext uri="{FF2B5EF4-FFF2-40B4-BE49-F238E27FC236}">
+                <a16:creationId xmlns:a16="http://schemas.microsoft.com/office/drawing/2014/main" id="{233EBCC9-8CE2-9F0B-E05B-8EDF21117DA9}"/>
+              </a:ext>
+            </a:extLst>
+          </p:cNvPr>
+          <p:cNvSpPr txBox="1"/>
+          <p:nvPr/>
+        </p:nvSpPr>
+        <p:spPr>
+          <a:xfrm>
+            <a:off x="1062573" y="4305904"/>
+            <a:ext cx="1564865" cy="369332"/>
+          </a:xfrm>
+          <a:prstGeom prst="rect">
+            <a:avLst/>
+          </a:prstGeom>
+          <a:noFill/>
+          <a:ln>
+            <a:solidFill>
+              <a:schemeClr val="tx1"/>
+            </a:solidFill>
+          </a:ln>
+        </p:spPr>
+        <p:txBody>
+          <a:bodyPr wrap="square" rtlCol="0">
+            <a:spAutoFit/>
+          </a:bodyPr>
+          <a:lstStyle/>
+          <a:p>
+            <a:pPr algn="ctr"/>
+            <a:r>
+              <a:rPr lang="en-US" b="1" dirty="0"/>
+              <a:t>Edit word list</a:t>
+            </a:r>
+          </a:p>
+        </p:txBody>
+      </p:sp>
+      <p:sp>
+        <p:nvSpPr>
+          <p:cNvPr id="29" name="Rectangle 28">
+            <a:extLst>
+              <a:ext uri="{FF2B5EF4-FFF2-40B4-BE49-F238E27FC236}">
+                <a16:creationId xmlns:a16="http://schemas.microsoft.com/office/drawing/2014/main" id="{9F412299-D769-78A0-F67D-B706725CAA10}"/>
+              </a:ext>
+            </a:extLst>
+          </p:cNvPr>
+          <p:cNvSpPr/>
+          <p:nvPr/>
+        </p:nvSpPr>
+        <p:spPr>
+          <a:xfrm>
+            <a:off x="6493245" y="1461808"/>
+            <a:ext cx="4859177" cy="3336435"/>
+          </a:xfrm>
+          <a:prstGeom prst="rect">
+            <a:avLst/>
+          </a:prstGeom>
+          <a:noFill/>
+          <a:ln w="28575">
+            <a:solidFill>
+              <a:schemeClr val="tx1"/>
+            </a:solidFill>
+          </a:ln>
+        </p:spPr>
+        <p:style>
+          <a:lnRef idx="2">
+            <a:schemeClr val="accent1">
+              <a:shade val="15000"/>
+            </a:schemeClr>
+          </a:lnRef>
+          <a:fillRef idx="1">
+            <a:schemeClr val="accent1"/>
+          </a:fillRef>
+          <a:effectRef idx="0">
+            <a:schemeClr val="accent1"/>
+          </a:effectRef>
+          <a:fontRef idx="minor">
+            <a:schemeClr val="lt1"/>
+          </a:fontRef>
+        </p:style>
+        <p:txBody>
+          <a:bodyPr rtlCol="0" anchor="ctr"/>
+          <a:lstStyle/>
+          <a:p>
+            <a:pPr algn="ctr"/>
+            <a:endParaRPr lang="en-US"/>
+          </a:p>
+        </p:txBody>
+      </p:sp>
+      <p:sp>
+        <p:nvSpPr>
+          <p:cNvPr id="30" name="TextBox 29">
+            <a:extLst>
+              <a:ext uri="{FF2B5EF4-FFF2-40B4-BE49-F238E27FC236}">
+                <a16:creationId xmlns:a16="http://schemas.microsoft.com/office/drawing/2014/main" id="{039497FC-4325-1DD2-0DA8-CE130A5C4165}"/>
+              </a:ext>
+            </a:extLst>
+          </p:cNvPr>
+          <p:cNvSpPr txBox="1"/>
+          <p:nvPr/>
+        </p:nvSpPr>
+        <p:spPr>
+          <a:xfrm>
+            <a:off x="7243577" y="1533490"/>
+            <a:ext cx="3358513" cy="369332"/>
+          </a:xfrm>
+          <a:prstGeom prst="rect">
+            <a:avLst/>
+          </a:prstGeom>
+          <a:noFill/>
+        </p:spPr>
+        <p:txBody>
+          <a:bodyPr wrap="square" rtlCol="0">
+            <a:spAutoFit/>
+          </a:bodyPr>
+          <a:lstStyle/>
+          <a:p>
+            <a:pPr algn="ctr"/>
+            <a:r>
+              <a:rPr lang="en-US" i="1" dirty="0"/>
+              <a:t>Program not currently running</a:t>
+            </a:r>
+          </a:p>
+        </p:txBody>
+      </p:sp>
+      <p:sp>
+        <p:nvSpPr>
+          <p:cNvPr id="42" name="TextBox 41">
+            <a:extLst>
+              <a:ext uri="{FF2B5EF4-FFF2-40B4-BE49-F238E27FC236}">
+                <a16:creationId xmlns:a16="http://schemas.microsoft.com/office/drawing/2014/main" id="{E238A94D-D0A1-C49A-C668-A851E806CE5A}"/>
+              </a:ext>
+            </a:extLst>
+          </p:cNvPr>
+          <p:cNvSpPr txBox="1"/>
+          <p:nvPr/>
+        </p:nvSpPr>
+        <p:spPr>
+          <a:xfrm>
+            <a:off x="6668288" y="4315330"/>
+            <a:ext cx="1564865" cy="369332"/>
+          </a:xfrm>
+          <a:prstGeom prst="rect">
+            <a:avLst/>
+          </a:prstGeom>
+          <a:noFill/>
+          <a:ln>
+            <a:solidFill>
+              <a:schemeClr val="tx1"/>
+            </a:solidFill>
+          </a:ln>
+        </p:spPr>
+        <p:txBody>
+          <a:bodyPr wrap="square" rtlCol="0">
+            <a:spAutoFit/>
+          </a:bodyPr>
+          <a:lstStyle/>
+          <a:p>
+            <a:pPr algn="ctr"/>
+            <a:r>
+              <a:rPr lang="en-US" b="1" dirty="0"/>
+              <a:t>Edit word list</a:t>
+            </a:r>
+          </a:p>
+        </p:txBody>
+      </p:sp>
+      <p:sp>
+        <p:nvSpPr>
+          <p:cNvPr id="43" name="TextBox 42">
+            <a:extLst>
+              <a:ext uri="{FF2B5EF4-FFF2-40B4-BE49-F238E27FC236}">
+                <a16:creationId xmlns:a16="http://schemas.microsoft.com/office/drawing/2014/main" id="{80962876-3C2F-3D6C-0428-484BB10F81A7}"/>
+              </a:ext>
+            </a:extLst>
+          </p:cNvPr>
+          <p:cNvSpPr txBox="1"/>
+          <p:nvPr/>
+        </p:nvSpPr>
+        <p:spPr>
+          <a:xfrm>
+            <a:off x="6466259" y="2126435"/>
+            <a:ext cx="3467934" cy="584775"/>
+          </a:xfrm>
+          <a:prstGeom prst="rect">
+            <a:avLst/>
+          </a:prstGeom>
+          <a:noFill/>
+        </p:spPr>
+        <p:txBody>
+          <a:bodyPr wrap="square" rtlCol="0">
+            <a:spAutoFit/>
+          </a:bodyPr>
+          <a:lstStyle/>
+          <a:p>
+            <a:pPr algn="r"/>
+            <a:r>
+              <a:rPr lang="en-US" sz="1600" dirty="0"/>
+              <a:t>Choose time for daily word definition to appear (24 hour clock):</a:t>
+            </a:r>
+          </a:p>
+        </p:txBody>
+      </p:sp>
+      <p:sp>
+        <p:nvSpPr>
+          <p:cNvPr id="44" name="TextBox 43">
+            <a:extLst>
+              <a:ext uri="{FF2B5EF4-FFF2-40B4-BE49-F238E27FC236}">
+                <a16:creationId xmlns:a16="http://schemas.microsoft.com/office/drawing/2014/main" id="{4D33FB6D-0D85-B265-FA1A-9B4388163D7F}"/>
+              </a:ext>
+            </a:extLst>
+          </p:cNvPr>
+          <p:cNvSpPr txBox="1"/>
+          <p:nvPr/>
+        </p:nvSpPr>
+        <p:spPr>
+          <a:xfrm>
+            <a:off x="10037180" y="2221228"/>
+            <a:ext cx="429768" cy="369332"/>
+          </a:xfrm>
+          <a:prstGeom prst="rect">
+            <a:avLst/>
+          </a:prstGeom>
+          <a:noFill/>
+          <a:ln>
+            <a:solidFill>
+              <a:schemeClr val="tx1"/>
+            </a:solidFill>
+          </a:ln>
+        </p:spPr>
+        <p:txBody>
+          <a:bodyPr wrap="square" rtlCol="0">
+            <a:spAutoFit/>
+          </a:bodyPr>
+          <a:lstStyle/>
+          <a:p>
+            <a:r>
+              <a:rPr lang="en-US" dirty="0"/>
+              <a:t>00</a:t>
+            </a:r>
+          </a:p>
+        </p:txBody>
+      </p:sp>
+      <p:sp>
+        <p:nvSpPr>
+          <p:cNvPr id="45" name="TextBox 44">
+            <a:extLst>
+              <a:ext uri="{FF2B5EF4-FFF2-40B4-BE49-F238E27FC236}">
+                <a16:creationId xmlns:a16="http://schemas.microsoft.com/office/drawing/2014/main" id="{5E307CC2-F2F3-BB82-FF00-72F29FDB5F8C}"/>
+              </a:ext>
+            </a:extLst>
+          </p:cNvPr>
+          <p:cNvSpPr txBox="1"/>
+          <p:nvPr/>
+        </p:nvSpPr>
+        <p:spPr>
+          <a:xfrm>
+            <a:off x="10719932" y="2221228"/>
+            <a:ext cx="429768" cy="369332"/>
+          </a:xfrm>
+          <a:prstGeom prst="rect">
+            <a:avLst/>
+          </a:prstGeom>
+          <a:noFill/>
+          <a:ln>
+            <a:solidFill>
+              <a:schemeClr val="tx1"/>
+            </a:solidFill>
+          </a:ln>
+        </p:spPr>
+        <p:txBody>
+          <a:bodyPr wrap="square" rtlCol="0">
+            <a:spAutoFit/>
+          </a:bodyPr>
+          <a:lstStyle/>
+          <a:p>
+            <a:r>
+              <a:rPr lang="en-US" dirty="0"/>
+              <a:t>00</a:t>
+            </a:r>
+          </a:p>
+        </p:txBody>
+      </p:sp>
+      <p:sp>
+        <p:nvSpPr>
+          <p:cNvPr id="46" name="TextBox 45">
+            <a:extLst>
+              <a:ext uri="{FF2B5EF4-FFF2-40B4-BE49-F238E27FC236}">
+                <a16:creationId xmlns:a16="http://schemas.microsoft.com/office/drawing/2014/main" id="{652C3AD2-38D0-E4CF-FE81-C8FE94E79ABC}"/>
+              </a:ext>
+            </a:extLst>
+          </p:cNvPr>
+          <p:cNvSpPr txBox="1"/>
+          <p:nvPr/>
+        </p:nvSpPr>
+        <p:spPr>
+          <a:xfrm>
+            <a:off x="10441421" y="2195828"/>
+            <a:ext cx="304038" cy="369332"/>
+          </a:xfrm>
+          <a:prstGeom prst="rect">
+            <a:avLst/>
+          </a:prstGeom>
+          <a:noFill/>
+        </p:spPr>
+        <p:txBody>
+          <a:bodyPr wrap="square" rtlCol="0">
+            <a:spAutoFit/>
+          </a:bodyPr>
+          <a:lstStyle/>
+          <a:p>
+            <a:pPr algn="ctr"/>
+            <a:r>
+              <a:rPr lang="en-US" dirty="0"/>
+              <a:t>:</a:t>
+            </a:r>
+          </a:p>
+        </p:txBody>
+      </p:sp>
+      <p:sp>
+        <p:nvSpPr>
+          <p:cNvPr id="47" name="TextBox 46">
+            <a:extLst>
+              <a:ext uri="{FF2B5EF4-FFF2-40B4-BE49-F238E27FC236}">
+                <a16:creationId xmlns:a16="http://schemas.microsoft.com/office/drawing/2014/main" id="{E2799BD8-339F-4CC0-A2CB-F58FEB19895E}"/>
+              </a:ext>
+            </a:extLst>
+          </p:cNvPr>
+          <p:cNvSpPr txBox="1"/>
+          <p:nvPr/>
+        </p:nvSpPr>
+        <p:spPr>
+          <a:xfrm>
+            <a:off x="9950376" y="2565160"/>
+            <a:ext cx="595566" cy="307777"/>
+          </a:xfrm>
+          <a:prstGeom prst="rect">
+            <a:avLst/>
+          </a:prstGeom>
+          <a:noFill/>
+        </p:spPr>
+        <p:txBody>
+          <a:bodyPr wrap="square" rtlCol="0">
+            <a:spAutoFit/>
+          </a:bodyPr>
+          <a:lstStyle/>
+          <a:p>
+            <a:pPr algn="ctr"/>
+            <a:r>
+              <a:rPr lang="en-US" sz="1400" dirty="0"/>
+              <a:t>Hour</a:t>
+            </a:r>
+          </a:p>
+        </p:txBody>
+      </p:sp>
+      <p:sp>
+        <p:nvSpPr>
+          <p:cNvPr id="48" name="TextBox 47">
+            <a:extLst>
+              <a:ext uri="{FF2B5EF4-FFF2-40B4-BE49-F238E27FC236}">
+                <a16:creationId xmlns:a16="http://schemas.microsoft.com/office/drawing/2014/main" id="{4B566C4F-851C-C6D3-078A-05DC0FC6D80D}"/>
+              </a:ext>
+            </a:extLst>
+          </p:cNvPr>
+          <p:cNvSpPr txBox="1"/>
+          <p:nvPr/>
+        </p:nvSpPr>
+        <p:spPr>
+          <a:xfrm>
+            <a:off x="10637033" y="2565160"/>
+            <a:ext cx="595566" cy="307777"/>
+          </a:xfrm>
+          <a:prstGeom prst="rect">
+            <a:avLst/>
+          </a:prstGeom>
+          <a:noFill/>
+        </p:spPr>
+        <p:txBody>
+          <a:bodyPr wrap="square" rtlCol="0">
+            <a:spAutoFit/>
+          </a:bodyPr>
+          <a:lstStyle/>
+          <a:p>
+            <a:pPr algn="ctr"/>
+            <a:r>
+              <a:rPr lang="en-US" sz="1400" dirty="0"/>
+              <a:t>Min</a:t>
+            </a:r>
+          </a:p>
+        </p:txBody>
+      </p:sp>
+      <p:sp>
+        <p:nvSpPr>
+          <p:cNvPr id="49" name="TextBox 48">
+            <a:extLst>
+              <a:ext uri="{FF2B5EF4-FFF2-40B4-BE49-F238E27FC236}">
+                <a16:creationId xmlns:a16="http://schemas.microsoft.com/office/drawing/2014/main" id="{E1363E9D-4528-6B47-B11D-326C1CFA5ADA}"/>
+              </a:ext>
+            </a:extLst>
+          </p:cNvPr>
+          <p:cNvSpPr txBox="1"/>
+          <p:nvPr/>
+        </p:nvSpPr>
+        <p:spPr>
+          <a:xfrm>
+            <a:off x="10531130" y="4315330"/>
+            <a:ext cx="675132" cy="369332"/>
+          </a:xfrm>
+          <a:prstGeom prst="rect">
+            <a:avLst/>
+          </a:prstGeom>
+          <a:noFill/>
+          <a:ln>
+            <a:solidFill>
+              <a:schemeClr val="tx1"/>
+            </a:solidFill>
+          </a:ln>
+        </p:spPr>
+        <p:txBody>
+          <a:bodyPr wrap="square" rtlCol="0">
+            <a:spAutoFit/>
+          </a:bodyPr>
+          <a:lstStyle/>
+          <a:p>
+            <a:r>
+              <a:rPr lang="en-US" b="1" dirty="0"/>
+              <a:t>Start</a:t>
+            </a:r>
+          </a:p>
+        </p:txBody>
+      </p:sp>
+      <p:sp>
+        <p:nvSpPr>
+          <p:cNvPr id="50" name="TextBox 49">
+            <a:extLst>
+              <a:ext uri="{FF2B5EF4-FFF2-40B4-BE49-F238E27FC236}">
+                <a16:creationId xmlns:a16="http://schemas.microsoft.com/office/drawing/2014/main" id="{3EF24F28-E4F4-C7D4-ACD0-6B7BC7DE5DF3}"/>
+              </a:ext>
+            </a:extLst>
+          </p:cNvPr>
+          <p:cNvSpPr txBox="1"/>
+          <p:nvPr/>
+        </p:nvSpPr>
+        <p:spPr>
+          <a:xfrm>
+            <a:off x="6735572" y="3146144"/>
+            <a:ext cx="273812" cy="249352"/>
+          </a:xfrm>
+          <a:prstGeom prst="rect">
+            <a:avLst/>
+          </a:prstGeom>
+          <a:noFill/>
+          <a:ln>
+            <a:solidFill>
+              <a:schemeClr val="tx1"/>
+            </a:solidFill>
+          </a:ln>
+        </p:spPr>
+        <p:txBody>
+          <a:bodyPr wrap="square" rtlCol="0">
+            <a:spAutoFit/>
+          </a:bodyPr>
+          <a:lstStyle/>
+          <a:p>
+            <a:endParaRPr lang="en-US" dirty="0"/>
+          </a:p>
+        </p:txBody>
+      </p:sp>
+      <p:sp>
+        <p:nvSpPr>
+          <p:cNvPr id="51" name="Oval 50">
+            <a:extLst>
+              <a:ext uri="{FF2B5EF4-FFF2-40B4-BE49-F238E27FC236}">
+                <a16:creationId xmlns:a16="http://schemas.microsoft.com/office/drawing/2014/main" id="{0381E715-C026-519E-932C-F14FFAC1D91F}"/>
+              </a:ext>
+            </a:extLst>
+          </p:cNvPr>
+          <p:cNvSpPr/>
+          <p:nvPr/>
+        </p:nvSpPr>
+        <p:spPr>
+          <a:xfrm>
+            <a:off x="6809313" y="3202826"/>
+            <a:ext cx="126330" cy="126330"/>
+          </a:xfrm>
+          <a:prstGeom prst="ellipse">
+            <a:avLst/>
+          </a:prstGeom>
+          <a:solidFill>
+            <a:schemeClr val="tx1"/>
+          </a:solidFill>
+          <a:ln>
+            <a:noFill/>
+          </a:ln>
+        </p:spPr>
+        <p:style>
+          <a:lnRef idx="2">
+            <a:schemeClr val="accent1">
+              <a:shade val="15000"/>
+            </a:schemeClr>
+          </a:lnRef>
+          <a:fillRef idx="1">
+            <a:schemeClr val="accent1"/>
+          </a:fillRef>
+          <a:effectRef idx="0">
+            <a:schemeClr val="accent1"/>
+          </a:effectRef>
+          <a:fontRef idx="minor">
+            <a:schemeClr val="lt1"/>
+          </a:fontRef>
+        </p:style>
+        <p:txBody>
+          <a:bodyPr rtlCol="0" anchor="ctr"/>
+          <a:lstStyle/>
+          <a:p>
+            <a:pPr algn="ctr"/>
+            <a:endParaRPr lang="en-US"/>
+          </a:p>
+        </p:txBody>
+      </p:sp>
+      <p:sp>
+        <p:nvSpPr>
+          <p:cNvPr id="52" name="TextBox 51">
+            <a:extLst>
+              <a:ext uri="{FF2B5EF4-FFF2-40B4-BE49-F238E27FC236}">
+                <a16:creationId xmlns:a16="http://schemas.microsoft.com/office/drawing/2014/main" id="{C7F0B1B0-1F2A-7F89-E767-4EE4EF86916B}"/>
+              </a:ext>
+            </a:extLst>
+          </p:cNvPr>
+          <p:cNvSpPr txBox="1"/>
+          <p:nvPr/>
+        </p:nvSpPr>
+        <p:spPr>
+          <a:xfrm>
+            <a:off x="6990461" y="2946258"/>
+            <a:ext cx="2387473" cy="646331"/>
+          </a:xfrm>
+          <a:prstGeom prst="rect">
+            <a:avLst/>
+          </a:prstGeom>
+          <a:noFill/>
+        </p:spPr>
+        <p:txBody>
+          <a:bodyPr wrap="square" rtlCol="0">
+            <a:spAutoFit/>
+          </a:bodyPr>
+          <a:lstStyle/>
+          <a:p>
+            <a:r>
+              <a:rPr lang="en-US" sz="1200" dirty="0"/>
+              <a:t>Add program to startup folder (needed to keep program running after computer reboot)</a:t>
+            </a:r>
+          </a:p>
+        </p:txBody>
+      </p:sp>
+      <p:sp>
+        <p:nvSpPr>
+          <p:cNvPr id="54" name="TextBox 53">
+            <a:extLst>
+              <a:ext uri="{FF2B5EF4-FFF2-40B4-BE49-F238E27FC236}">
+                <a16:creationId xmlns:a16="http://schemas.microsoft.com/office/drawing/2014/main" id="{E31D9762-F676-186F-4328-A0F7230A8273}"/>
+              </a:ext>
+            </a:extLst>
+          </p:cNvPr>
+          <p:cNvSpPr txBox="1"/>
+          <p:nvPr/>
+        </p:nvSpPr>
+        <p:spPr>
+          <a:xfrm>
+            <a:off x="6641084" y="3773641"/>
+            <a:ext cx="3003931" cy="253916"/>
+          </a:xfrm>
+          <a:prstGeom prst="rect">
+            <a:avLst/>
+          </a:prstGeom>
+          <a:noFill/>
+        </p:spPr>
+        <p:txBody>
+          <a:bodyPr wrap="square" rtlCol="0">
+            <a:spAutoFit/>
+          </a:bodyPr>
+          <a:lstStyle/>
+          <a:p>
+            <a:r>
+              <a:rPr kumimoji="0" lang="en-US" altLang="en-US" sz="1050" b="0" i="0" u="none" strike="noStrike" cap="none" normalizeH="0" baseline="0" dirty="0">
+                <a:ln>
+                  <a:noFill/>
+                </a:ln>
+                <a:solidFill>
+                  <a:schemeClr val="tx1"/>
+                </a:solidFill>
+                <a:effectLst/>
+                <a:latin typeface="Arial Unicode MS"/>
+              </a:rPr>
+              <a:t>:\Users\username\</a:t>
+            </a:r>
+            <a:r>
+              <a:rPr kumimoji="0" lang="en-US" altLang="en-US" sz="1050" b="0" i="0" u="none" strike="noStrike" cap="none" normalizeH="0" baseline="0" dirty="0" err="1">
+                <a:ln>
+                  <a:noFill/>
+                </a:ln>
+                <a:solidFill>
+                  <a:schemeClr val="tx1"/>
+                </a:solidFill>
+                <a:effectLst/>
+                <a:latin typeface="Arial Unicode MS"/>
+              </a:rPr>
+              <a:t>AppData</a:t>
+            </a:r>
+            <a:r>
+              <a:rPr kumimoji="0" lang="en-US" altLang="en-US" sz="1050" b="0" i="0" u="none" strike="noStrike" cap="none" normalizeH="0" baseline="0" dirty="0">
+                <a:ln>
+                  <a:noFill/>
+                </a:ln>
+                <a:solidFill>
+                  <a:schemeClr val="tx1"/>
+                </a:solidFill>
+                <a:effectLst/>
+                <a:latin typeface="Arial Unicode MS"/>
+              </a:rPr>
+              <a:t>\path……</a:t>
+            </a:r>
+            <a:endParaRPr kumimoji="0" lang="en-US" altLang="en-US" sz="2000" b="0" i="0" u="none" strike="noStrike" cap="none" normalizeH="0" baseline="0" dirty="0">
+              <a:ln>
+                <a:noFill/>
+              </a:ln>
+              <a:solidFill>
+                <a:schemeClr val="tx1"/>
+              </a:solidFill>
+              <a:effectLst/>
+              <a:latin typeface="Arial" panose="020B0604020202020204" pitchFamily="34" charset="0"/>
+            </a:endParaRPr>
+          </a:p>
+        </p:txBody>
+      </p:sp>
+      <p:sp>
+        <p:nvSpPr>
+          <p:cNvPr id="55" name="TextBox 54">
+            <a:extLst>
+              <a:ext uri="{FF2B5EF4-FFF2-40B4-BE49-F238E27FC236}">
+                <a16:creationId xmlns:a16="http://schemas.microsoft.com/office/drawing/2014/main" id="{8C838517-DF1C-AECE-3F92-238606CF55A4}"/>
+              </a:ext>
+            </a:extLst>
+          </p:cNvPr>
+          <p:cNvSpPr txBox="1"/>
+          <p:nvPr/>
+        </p:nvSpPr>
+        <p:spPr>
+          <a:xfrm>
+            <a:off x="9072942" y="3765665"/>
+            <a:ext cx="668989" cy="276999"/>
+          </a:xfrm>
+          <a:prstGeom prst="rect">
+            <a:avLst/>
+          </a:prstGeom>
+          <a:noFill/>
+          <a:ln>
+            <a:solidFill>
+              <a:schemeClr val="tx1"/>
+            </a:solidFill>
+          </a:ln>
+        </p:spPr>
+        <p:txBody>
+          <a:bodyPr wrap="square" rtlCol="0">
+            <a:spAutoFit/>
+          </a:bodyPr>
+          <a:lstStyle/>
+          <a:p>
+            <a:pPr algn="ctr"/>
+            <a:r>
+              <a:rPr lang="en-US" sz="1200" dirty="0"/>
+              <a:t>Change</a:t>
+            </a:r>
+          </a:p>
+        </p:txBody>
+      </p:sp>
+      <p:sp>
+        <p:nvSpPr>
+          <p:cNvPr id="56" name="TextBox 55">
+            <a:extLst>
+              <a:ext uri="{FF2B5EF4-FFF2-40B4-BE49-F238E27FC236}">
+                <a16:creationId xmlns:a16="http://schemas.microsoft.com/office/drawing/2014/main" id="{5FDC3589-9073-8C99-8040-2AA8A48F5053}"/>
+              </a:ext>
+            </a:extLst>
+          </p:cNvPr>
+          <p:cNvSpPr txBox="1"/>
+          <p:nvPr/>
+        </p:nvSpPr>
+        <p:spPr>
+          <a:xfrm>
+            <a:off x="6641084" y="3585096"/>
+            <a:ext cx="1033589" cy="253916"/>
+          </a:xfrm>
+          <a:prstGeom prst="rect">
+            <a:avLst/>
+          </a:prstGeom>
+          <a:noFill/>
+        </p:spPr>
+        <p:txBody>
+          <a:bodyPr wrap="square" rtlCol="0">
+            <a:spAutoFit/>
+          </a:bodyPr>
+          <a:lstStyle/>
+          <a:p>
+            <a:r>
+              <a:rPr lang="en-US" altLang="en-US" sz="1050" dirty="0">
+                <a:latin typeface="Arial Unicode MS"/>
+              </a:rPr>
+              <a:t>Startup folder</a:t>
+            </a:r>
+            <a:endParaRPr kumimoji="0" lang="en-US" altLang="en-US" sz="2000" b="0" i="0" u="none" strike="noStrike" cap="none" normalizeH="0" baseline="0" dirty="0">
+              <a:ln>
+                <a:noFill/>
+              </a:ln>
+              <a:solidFill>
+                <a:schemeClr val="tx1"/>
+              </a:solidFill>
+              <a:effectLst/>
+              <a:latin typeface="Arial" panose="020B0604020202020204" pitchFamily="34" charset="0"/>
+            </a:endParaRPr>
+          </a:p>
+        </p:txBody>
+      </p:sp>
+    </p:spTree>
+    <p:extLst>
+      <p:ext uri="{BB962C8B-B14F-4D97-AF65-F5344CB8AC3E}">
+        <p14:creationId xmlns:p14="http://schemas.microsoft.com/office/powerpoint/2010/main" val="277825501"/>
+      </p:ext>
+    </p:extLst>
+  </p:cSld>
+  <p:clrMapOvr>
+    <a:masterClrMapping/>
+  </p:clrMapOvr>
+</p:sld>
+</file>
+
 <file path=ppt/theme/theme1.xml><?xml version="1.0" encoding="utf-8"?>
 <a:theme xmlns:a="http://schemas.openxmlformats.org/drawingml/2006/main" name="Office Theme">
   <a:themeElements>

</xml_diff>

<commit_message>
Finished with the add/edit API (mainly).  Moving onto the scheduling stuff
</commit_message>
<xml_diff>
--- a/extra/design.pptx
+++ b/extra/design.pptx
@@ -10,6 +10,7 @@
     <p:sldId id="258" r:id="rId4"/>
     <p:sldId id="259" r:id="rId5"/>
     <p:sldId id="260" r:id="rId6"/>
+    <p:sldId id="261" r:id="rId7"/>
   </p:sldIdLst>
   <p:sldSz cx="12192000" cy="6858000"/>
   <p:notesSz cx="6858000" cy="9144000"/>
@@ -263,7 +264,7 @@
           <a:p>
             <a:fld id="{A280E058-95FB-4393-BC10-FF598184573D}" type="datetimeFigureOut">
               <a:rPr lang="en-US" smtClean="0"/>
-              <a:t>10/29/2024</a:t>
+              <a:t>11/8/2024</a:t>
             </a:fld>
             <a:endParaRPr lang="en-US"/>
           </a:p>
@@ -461,7 +462,7 @@
           <a:p>
             <a:fld id="{A280E058-95FB-4393-BC10-FF598184573D}" type="datetimeFigureOut">
               <a:rPr lang="en-US" smtClean="0"/>
-              <a:t>10/29/2024</a:t>
+              <a:t>11/8/2024</a:t>
             </a:fld>
             <a:endParaRPr lang="en-US"/>
           </a:p>
@@ -669,7 +670,7 @@
           <a:p>
             <a:fld id="{A280E058-95FB-4393-BC10-FF598184573D}" type="datetimeFigureOut">
               <a:rPr lang="en-US" smtClean="0"/>
-              <a:t>10/29/2024</a:t>
+              <a:t>11/8/2024</a:t>
             </a:fld>
             <a:endParaRPr lang="en-US"/>
           </a:p>
@@ -867,7 +868,7 @@
           <a:p>
             <a:fld id="{A280E058-95FB-4393-BC10-FF598184573D}" type="datetimeFigureOut">
               <a:rPr lang="en-US" smtClean="0"/>
-              <a:t>10/29/2024</a:t>
+              <a:t>11/8/2024</a:t>
             </a:fld>
             <a:endParaRPr lang="en-US"/>
           </a:p>
@@ -1142,7 +1143,7 @@
           <a:p>
             <a:fld id="{A280E058-95FB-4393-BC10-FF598184573D}" type="datetimeFigureOut">
               <a:rPr lang="en-US" smtClean="0"/>
-              <a:t>10/29/2024</a:t>
+              <a:t>11/8/2024</a:t>
             </a:fld>
             <a:endParaRPr lang="en-US"/>
           </a:p>
@@ -1407,7 +1408,7 @@
           <a:p>
             <a:fld id="{A280E058-95FB-4393-BC10-FF598184573D}" type="datetimeFigureOut">
               <a:rPr lang="en-US" smtClean="0"/>
-              <a:t>10/29/2024</a:t>
+              <a:t>11/8/2024</a:t>
             </a:fld>
             <a:endParaRPr lang="en-US"/>
           </a:p>
@@ -1819,7 +1820,7 @@
           <a:p>
             <a:fld id="{A280E058-95FB-4393-BC10-FF598184573D}" type="datetimeFigureOut">
               <a:rPr lang="en-US" smtClean="0"/>
-              <a:t>10/29/2024</a:t>
+              <a:t>11/8/2024</a:t>
             </a:fld>
             <a:endParaRPr lang="en-US"/>
           </a:p>
@@ -1960,7 +1961,7 @@
           <a:p>
             <a:fld id="{A280E058-95FB-4393-BC10-FF598184573D}" type="datetimeFigureOut">
               <a:rPr lang="en-US" smtClean="0"/>
-              <a:t>10/29/2024</a:t>
+              <a:t>11/8/2024</a:t>
             </a:fld>
             <a:endParaRPr lang="en-US"/>
           </a:p>
@@ -2073,7 +2074,7 @@
           <a:p>
             <a:fld id="{A280E058-95FB-4393-BC10-FF598184573D}" type="datetimeFigureOut">
               <a:rPr lang="en-US" smtClean="0"/>
-              <a:t>10/29/2024</a:t>
+              <a:t>11/8/2024</a:t>
             </a:fld>
             <a:endParaRPr lang="en-US"/>
           </a:p>
@@ -2384,7 +2385,7 @@
           <a:p>
             <a:fld id="{A280E058-95FB-4393-BC10-FF598184573D}" type="datetimeFigureOut">
               <a:rPr lang="en-US" smtClean="0"/>
-              <a:t>10/29/2024</a:t>
+              <a:t>11/8/2024</a:t>
             </a:fld>
             <a:endParaRPr lang="en-US"/>
           </a:p>
@@ -2672,7 +2673,7 @@
           <a:p>
             <a:fld id="{A280E058-95FB-4393-BC10-FF598184573D}" type="datetimeFigureOut">
               <a:rPr lang="en-US" smtClean="0"/>
-              <a:t>10/29/2024</a:t>
+              <a:t>11/8/2024</a:t>
             </a:fld>
             <a:endParaRPr lang="en-US"/>
           </a:p>
@@ -2913,7 +2914,7 @@
           <a:p>
             <a:fld id="{A280E058-95FB-4393-BC10-FF598184573D}" type="datetimeFigureOut">
               <a:rPr lang="en-US" smtClean="0"/>
-              <a:t>10/29/2024</a:t>
+              <a:t>11/8/2024</a:t>
             </a:fld>
             <a:endParaRPr lang="en-US"/>
           </a:p>
@@ -8316,6 +8317,36 @@
 </p:sld>
 </file>
 
+<file path=ppt/slides/slide6.xml><?xml version="1.0" encoding="utf-8"?>
+<p:sld xmlns:a="http://schemas.openxmlformats.org/drawingml/2006/main" xmlns:r="http://schemas.openxmlformats.org/officeDocument/2006/relationships" xmlns:p="http://schemas.openxmlformats.org/presentationml/2006/main">
+  <p:cSld>
+    <p:spTree>
+      <p:nvGrpSpPr>
+        <p:cNvPr id="1" name=""/>
+        <p:cNvGrpSpPr/>
+        <p:nvPr/>
+      </p:nvGrpSpPr>
+      <p:grpSpPr>
+        <a:xfrm>
+          <a:off x="0" y="0"/>
+          <a:ext cx="0" cy="0"/>
+          <a:chOff x="0" y="0"/>
+          <a:chExt cx="0" cy="0"/>
+        </a:xfrm>
+      </p:grpSpPr>
+    </p:spTree>
+    <p:extLst>
+      <p:ext uri="{BB962C8B-B14F-4D97-AF65-F5344CB8AC3E}">
+        <p14:creationId xmlns:p14="http://schemas.microsoft.com/office/powerpoint/2010/main" val="996310445"/>
+      </p:ext>
+    </p:extLst>
+  </p:cSld>
+  <p:clrMapOvr>
+    <a:masterClrMapping/>
+  </p:clrMapOvr>
+</p:sld>
+</file>
+
 <file path=ppt/theme/theme1.xml><?xml version="1.0" encoding="utf-8"?>
 <a:theme xmlns:a="http://schemas.openxmlformats.org/drawingml/2006/main" name="Office Theme">
   <a:themeElements>

</xml_diff>

<commit_message>
Making headway on bringing everything together
</commit_message>
<xml_diff>
--- a/extra/design.pptx
+++ b/extra/design.pptx
@@ -264,7 +264,7 @@
           <a:p>
             <a:fld id="{A280E058-95FB-4393-BC10-FF598184573D}" type="datetimeFigureOut">
               <a:rPr lang="en-US" smtClean="0"/>
-              <a:t>11/8/2024</a:t>
+              <a:t>11/11/2024</a:t>
             </a:fld>
             <a:endParaRPr lang="en-US"/>
           </a:p>
@@ -462,7 +462,7 @@
           <a:p>
             <a:fld id="{A280E058-95FB-4393-BC10-FF598184573D}" type="datetimeFigureOut">
               <a:rPr lang="en-US" smtClean="0"/>
-              <a:t>11/8/2024</a:t>
+              <a:t>11/11/2024</a:t>
             </a:fld>
             <a:endParaRPr lang="en-US"/>
           </a:p>
@@ -670,7 +670,7 @@
           <a:p>
             <a:fld id="{A280E058-95FB-4393-BC10-FF598184573D}" type="datetimeFigureOut">
               <a:rPr lang="en-US" smtClean="0"/>
-              <a:t>11/8/2024</a:t>
+              <a:t>11/11/2024</a:t>
             </a:fld>
             <a:endParaRPr lang="en-US"/>
           </a:p>
@@ -868,7 +868,7 @@
           <a:p>
             <a:fld id="{A280E058-95FB-4393-BC10-FF598184573D}" type="datetimeFigureOut">
               <a:rPr lang="en-US" smtClean="0"/>
-              <a:t>11/8/2024</a:t>
+              <a:t>11/11/2024</a:t>
             </a:fld>
             <a:endParaRPr lang="en-US"/>
           </a:p>
@@ -1143,7 +1143,7 @@
           <a:p>
             <a:fld id="{A280E058-95FB-4393-BC10-FF598184573D}" type="datetimeFigureOut">
               <a:rPr lang="en-US" smtClean="0"/>
-              <a:t>11/8/2024</a:t>
+              <a:t>11/11/2024</a:t>
             </a:fld>
             <a:endParaRPr lang="en-US"/>
           </a:p>
@@ -1408,7 +1408,7 @@
           <a:p>
             <a:fld id="{A280E058-95FB-4393-BC10-FF598184573D}" type="datetimeFigureOut">
               <a:rPr lang="en-US" smtClean="0"/>
-              <a:t>11/8/2024</a:t>
+              <a:t>11/11/2024</a:t>
             </a:fld>
             <a:endParaRPr lang="en-US"/>
           </a:p>
@@ -1820,7 +1820,7 @@
           <a:p>
             <a:fld id="{A280E058-95FB-4393-BC10-FF598184573D}" type="datetimeFigureOut">
               <a:rPr lang="en-US" smtClean="0"/>
-              <a:t>11/8/2024</a:t>
+              <a:t>11/11/2024</a:t>
             </a:fld>
             <a:endParaRPr lang="en-US"/>
           </a:p>
@@ -1961,7 +1961,7 @@
           <a:p>
             <a:fld id="{A280E058-95FB-4393-BC10-FF598184573D}" type="datetimeFigureOut">
               <a:rPr lang="en-US" smtClean="0"/>
-              <a:t>11/8/2024</a:t>
+              <a:t>11/11/2024</a:t>
             </a:fld>
             <a:endParaRPr lang="en-US"/>
           </a:p>
@@ -2074,7 +2074,7 @@
           <a:p>
             <a:fld id="{A280E058-95FB-4393-BC10-FF598184573D}" type="datetimeFigureOut">
               <a:rPr lang="en-US" smtClean="0"/>
-              <a:t>11/8/2024</a:t>
+              <a:t>11/11/2024</a:t>
             </a:fld>
             <a:endParaRPr lang="en-US"/>
           </a:p>
@@ -2385,7 +2385,7 @@
           <a:p>
             <a:fld id="{A280E058-95FB-4393-BC10-FF598184573D}" type="datetimeFigureOut">
               <a:rPr lang="en-US" smtClean="0"/>
-              <a:t>11/8/2024</a:t>
+              <a:t>11/11/2024</a:t>
             </a:fld>
             <a:endParaRPr lang="en-US"/>
           </a:p>
@@ -2673,7 +2673,7 @@
           <a:p>
             <a:fld id="{A280E058-95FB-4393-BC10-FF598184573D}" type="datetimeFigureOut">
               <a:rPr lang="en-US" smtClean="0"/>
-              <a:t>11/8/2024</a:t>
+              <a:t>11/11/2024</a:t>
             </a:fld>
             <a:endParaRPr lang="en-US"/>
           </a:p>
@@ -2914,7 +2914,7 @@
           <a:p>
             <a:fld id="{A280E058-95FB-4393-BC10-FF598184573D}" type="datetimeFigureOut">
               <a:rPr lang="en-US" smtClean="0"/>
-              <a:t>11/8/2024</a:t>
+              <a:t>11/11/2024</a:t>
             </a:fld>
             <a:endParaRPr lang="en-US"/>
           </a:p>
@@ -8334,6 +8334,146 @@
           <a:chExt cx="0" cy="0"/>
         </a:xfrm>
       </p:grpSpPr>
+      <p:sp>
+        <p:nvSpPr>
+          <p:cNvPr id="2" name="TextBox 1">
+            <a:extLst>
+              <a:ext uri="{FF2B5EF4-FFF2-40B4-BE49-F238E27FC236}">
+                <a16:creationId xmlns:a16="http://schemas.microsoft.com/office/drawing/2014/main" id="{8F657421-4805-9563-518D-5796BAA78E8C}"/>
+              </a:ext>
+            </a:extLst>
+          </p:cNvPr>
+          <p:cNvSpPr txBox="1"/>
+          <p:nvPr/>
+        </p:nvSpPr>
+        <p:spPr>
+          <a:xfrm>
+            <a:off x="838605" y="1563040"/>
+            <a:ext cx="3130079" cy="2862322"/>
+          </a:xfrm>
+          <a:prstGeom prst="rect">
+            <a:avLst/>
+          </a:prstGeom>
+          <a:noFill/>
+        </p:spPr>
+        <p:txBody>
+          <a:bodyPr wrap="square" rtlCol="0">
+            <a:spAutoFit/>
+          </a:bodyPr>
+          <a:lstStyle/>
+          <a:p>
+            <a:r>
+              <a:rPr lang="en-US" b="1" dirty="0"/>
+              <a:t>User input main</a:t>
+            </a:r>
+            <a:r>
+              <a:rPr lang="en-US" dirty="0"/>
+              <a:t>.  Will be run when the icon, or its exe file, is clicked on.  When run, it figures out if the program is running or not, and then brings up the appropriate API (start or stop program).  The edit words API is started via a button in the start and stop APIs.</a:t>
+            </a:r>
+          </a:p>
+          <a:p>
+            <a:pPr marL="285750" indent="-285750">
+              <a:buFont typeface="Arial" panose="020B0604020202020204" pitchFamily="34" charset="0"/>
+              <a:buChar char="•"/>
+            </a:pPr>
+            <a:endParaRPr lang="en-US" dirty="0"/>
+          </a:p>
+        </p:txBody>
+      </p:sp>
+      <p:sp>
+        <p:nvSpPr>
+          <p:cNvPr id="3" name="TextBox 2">
+            <a:extLst>
+              <a:ext uri="{FF2B5EF4-FFF2-40B4-BE49-F238E27FC236}">
+                <a16:creationId xmlns:a16="http://schemas.microsoft.com/office/drawing/2014/main" id="{AB8600F5-0F29-D0D0-FDE4-EC2DF01F0F49}"/>
+              </a:ext>
+            </a:extLst>
+          </p:cNvPr>
+          <p:cNvSpPr txBox="1"/>
+          <p:nvPr/>
+        </p:nvSpPr>
+        <p:spPr>
+          <a:xfrm>
+            <a:off x="6564010" y="1606338"/>
+            <a:ext cx="3130079" cy="3139321"/>
+          </a:xfrm>
+          <a:prstGeom prst="rect">
+            <a:avLst/>
+          </a:prstGeom>
+          <a:noFill/>
+        </p:spPr>
+        <p:txBody>
+          <a:bodyPr wrap="square" rtlCol="0">
+            <a:spAutoFit/>
+          </a:bodyPr>
+          <a:lstStyle/>
+          <a:p>
+            <a:r>
+              <a:rPr lang="en-US" b="1" dirty="0"/>
+              <a:t>Main running</a:t>
+            </a:r>
+            <a:r>
+              <a:rPr lang="en-US" dirty="0"/>
+              <a:t>.  This is the code that runs the API to present the daily word.  Some additional things that it needs are:</a:t>
+            </a:r>
+          </a:p>
+          <a:p>
+            <a:pPr marL="285750" indent="-285750">
+              <a:buFont typeface="Arial" panose="020B0604020202020204" pitchFamily="34" charset="0"/>
+              <a:buChar char="•"/>
+            </a:pPr>
+            <a:r>
+              <a:rPr lang="en-US" dirty="0"/>
+              <a:t>Something to make it run present the API at the desired time.</a:t>
+            </a:r>
+          </a:p>
+          <a:p>
+            <a:pPr marL="285750" indent="-285750">
+              <a:buFont typeface="Arial" panose="020B0604020202020204" pitchFamily="34" charset="0"/>
+              <a:buChar char="•"/>
+            </a:pPr>
+            <a:r>
+              <a:rPr lang="en-US" dirty="0"/>
+              <a:t>Something that checks it the API is already open, and closes it before opening up the new day’s word API.</a:t>
+            </a:r>
+          </a:p>
+        </p:txBody>
+      </p:sp>
+      <p:sp>
+        <p:nvSpPr>
+          <p:cNvPr id="4" name="TextBox 3">
+            <a:extLst>
+              <a:ext uri="{FF2B5EF4-FFF2-40B4-BE49-F238E27FC236}">
+                <a16:creationId xmlns:a16="http://schemas.microsoft.com/office/drawing/2014/main" id="{55BF8C59-84A4-CACE-18D7-DB82BB06D82E}"/>
+              </a:ext>
+            </a:extLst>
+          </p:cNvPr>
+          <p:cNvSpPr txBox="1"/>
+          <p:nvPr/>
+        </p:nvSpPr>
+        <p:spPr>
+          <a:xfrm>
+            <a:off x="3666836" y="267855"/>
+            <a:ext cx="3655681" cy="369332"/>
+          </a:xfrm>
+          <a:prstGeom prst="rect">
+            <a:avLst/>
+          </a:prstGeom>
+          <a:noFill/>
+        </p:spPr>
+        <p:txBody>
+          <a:bodyPr wrap="none" rtlCol="0">
+            <a:spAutoFit/>
+          </a:bodyPr>
+          <a:lstStyle/>
+          <a:p>
+            <a:r>
+              <a:rPr lang="en-US" dirty="0"/>
+              <a:t>Each one will require its own exe file</a:t>
+            </a:r>
+          </a:p>
+        </p:txBody>
+      </p:sp>
     </p:spTree>
     <p:extLst>
       <p:ext uri="{BB962C8B-B14F-4D97-AF65-F5344CB8AC3E}">

</xml_diff>

<commit_message>
Making more headway on putting everything together.  The 'Edit word list' button is included in the start and stop APIs
</commit_message>
<xml_diff>
--- a/extra/design.pptx
+++ b/extra/design.pptx
@@ -8395,7 +8395,7 @@
         <p:spPr>
           <a:xfrm>
             <a:off x="6564010" y="1606338"/>
-            <a:ext cx="3130079" cy="3139321"/>
+            <a:ext cx="3130079" cy="1200329"/>
           </a:xfrm>
           <a:prstGeom prst="rect">
             <a:avLst/>
@@ -8414,28 +8414,13 @@
             </a:r>
             <a:r>
               <a:rPr lang="en-US" dirty="0"/>
-              <a:t>.  This is the code that runs the API to present the daily word.  Some additional things that it needs are:</a:t>
-            </a:r>
-          </a:p>
-          <a:p>
-            <a:pPr marL="285750" indent="-285750">
-              <a:buFont typeface="Arial" panose="020B0604020202020204" pitchFamily="34" charset="0"/>
-              <a:buChar char="•"/>
-            </a:pPr>
-            <a:r>
-              <a:rPr lang="en-US" dirty="0"/>
-              <a:t>Something to make it run present the API at the desired time.</a:t>
-            </a:r>
-          </a:p>
-          <a:p>
-            <a:pPr marL="285750" indent="-285750">
-              <a:buFont typeface="Arial" panose="020B0604020202020204" pitchFamily="34" charset="0"/>
-              <a:buChar char="•"/>
-            </a:pPr>
-            <a:r>
-              <a:rPr lang="en-US" dirty="0"/>
-              <a:t>Something that checks it the API is already open, and closes it before opening up the new day’s word API.</a:t>
-            </a:r>
+              <a:t>.  This is the code that runs the API to present the daily word.  Some additional things that it </a:t>
+            </a:r>
+            <a:r>
+              <a:rPr lang="en-US"/>
+              <a:t>needs are.</a:t>
+            </a:r>
+            <a:endParaRPr lang="en-US" dirty="0"/>
           </a:p>
         </p:txBody>
       </p:sp>

</xml_diff>

<commit_message>
Starting on making the loop to constantly run the Present words/definitions API
</commit_message>
<xml_diff>
--- a/extra/design.pptx
+++ b/extra/design.pptx
@@ -8414,13 +8414,8 @@
             </a:r>
             <a:r>
               <a:rPr lang="en-US" dirty="0"/>
-              <a:t>.  This is the code that runs the API to present the daily word.  Some additional things that it </a:t>
-            </a:r>
-            <a:r>
-              <a:rPr lang="en-US"/>
-              <a:t>needs are.</a:t>
-            </a:r>
-            <a:endParaRPr lang="en-US" dirty="0"/>
+              <a:t>.  This is the code that runs the API to present the daily word.  Some additional things that it needs are.</a:t>
+            </a:r>
           </a:p>
         </p:txBody>
       </p:sp>

</xml_diff>

<commit_message>
Finally fixed the scroll with variable text area issue
</commit_message>
<xml_diff>
--- a/extra/design.pptx
+++ b/extra/design.pptx
@@ -264,7 +264,7 @@
           <a:p>
             <a:fld id="{A280E058-95FB-4393-BC10-FF598184573D}" type="datetimeFigureOut">
               <a:rPr lang="en-US" smtClean="0"/>
-              <a:t>11/11/2024</a:t>
+              <a:t>11/26/2024</a:t>
             </a:fld>
             <a:endParaRPr lang="en-US"/>
           </a:p>
@@ -462,7 +462,7 @@
           <a:p>
             <a:fld id="{A280E058-95FB-4393-BC10-FF598184573D}" type="datetimeFigureOut">
               <a:rPr lang="en-US" smtClean="0"/>
-              <a:t>11/11/2024</a:t>
+              <a:t>11/26/2024</a:t>
             </a:fld>
             <a:endParaRPr lang="en-US"/>
           </a:p>
@@ -670,7 +670,7 @@
           <a:p>
             <a:fld id="{A280E058-95FB-4393-BC10-FF598184573D}" type="datetimeFigureOut">
               <a:rPr lang="en-US" smtClean="0"/>
-              <a:t>11/11/2024</a:t>
+              <a:t>11/26/2024</a:t>
             </a:fld>
             <a:endParaRPr lang="en-US"/>
           </a:p>
@@ -868,7 +868,7 @@
           <a:p>
             <a:fld id="{A280E058-95FB-4393-BC10-FF598184573D}" type="datetimeFigureOut">
               <a:rPr lang="en-US" smtClean="0"/>
-              <a:t>11/11/2024</a:t>
+              <a:t>11/26/2024</a:t>
             </a:fld>
             <a:endParaRPr lang="en-US"/>
           </a:p>
@@ -1143,7 +1143,7 @@
           <a:p>
             <a:fld id="{A280E058-95FB-4393-BC10-FF598184573D}" type="datetimeFigureOut">
               <a:rPr lang="en-US" smtClean="0"/>
-              <a:t>11/11/2024</a:t>
+              <a:t>11/26/2024</a:t>
             </a:fld>
             <a:endParaRPr lang="en-US"/>
           </a:p>
@@ -1408,7 +1408,7 @@
           <a:p>
             <a:fld id="{A280E058-95FB-4393-BC10-FF598184573D}" type="datetimeFigureOut">
               <a:rPr lang="en-US" smtClean="0"/>
-              <a:t>11/11/2024</a:t>
+              <a:t>11/26/2024</a:t>
             </a:fld>
             <a:endParaRPr lang="en-US"/>
           </a:p>
@@ -1820,7 +1820,7 @@
           <a:p>
             <a:fld id="{A280E058-95FB-4393-BC10-FF598184573D}" type="datetimeFigureOut">
               <a:rPr lang="en-US" smtClean="0"/>
-              <a:t>11/11/2024</a:t>
+              <a:t>11/26/2024</a:t>
             </a:fld>
             <a:endParaRPr lang="en-US"/>
           </a:p>
@@ -1961,7 +1961,7 @@
           <a:p>
             <a:fld id="{A280E058-95FB-4393-BC10-FF598184573D}" type="datetimeFigureOut">
               <a:rPr lang="en-US" smtClean="0"/>
-              <a:t>11/11/2024</a:t>
+              <a:t>11/26/2024</a:t>
             </a:fld>
             <a:endParaRPr lang="en-US"/>
           </a:p>
@@ -2074,7 +2074,7 @@
           <a:p>
             <a:fld id="{A280E058-95FB-4393-BC10-FF598184573D}" type="datetimeFigureOut">
               <a:rPr lang="en-US" smtClean="0"/>
-              <a:t>11/11/2024</a:t>
+              <a:t>11/26/2024</a:t>
             </a:fld>
             <a:endParaRPr lang="en-US"/>
           </a:p>
@@ -2385,7 +2385,7 @@
           <a:p>
             <a:fld id="{A280E058-95FB-4393-BC10-FF598184573D}" type="datetimeFigureOut">
               <a:rPr lang="en-US" smtClean="0"/>
-              <a:t>11/11/2024</a:t>
+              <a:t>11/26/2024</a:t>
             </a:fld>
             <a:endParaRPr lang="en-US"/>
           </a:p>
@@ -2673,7 +2673,7 @@
           <a:p>
             <a:fld id="{A280E058-95FB-4393-BC10-FF598184573D}" type="datetimeFigureOut">
               <a:rPr lang="en-US" smtClean="0"/>
-              <a:t>11/11/2024</a:t>
+              <a:t>11/26/2024</a:t>
             </a:fld>
             <a:endParaRPr lang="en-US"/>
           </a:p>
@@ -2914,7 +2914,7 @@
           <a:p>
             <a:fld id="{A280E058-95FB-4393-BC10-FF598184573D}" type="datetimeFigureOut">
               <a:rPr lang="en-US" smtClean="0"/>
-              <a:t>11/11/2024</a:t>
+              <a:t>11/26/2024</a:t>
             </a:fld>
             <a:endParaRPr lang="en-US"/>
           </a:p>
@@ -5211,7 +5211,7 @@
         <p:spPr>
           <a:xfrm>
             <a:off x="3576639" y="1040155"/>
-            <a:ext cx="3894009" cy="1015663"/>
+            <a:ext cx="3894009" cy="1723549"/>
           </a:xfrm>
           <a:prstGeom prst="rect">
             <a:avLst/>
@@ -5225,8 +5225,28 @@
           <a:lstStyle/>
           <a:p>
             <a:r>
+              <a:rPr lang="en-US" sz="1200" dirty="0"/>
+              <a:t>Word:</a:t>
+            </a:r>
+            <a:endParaRPr lang="en-US" sz="2000" dirty="0"/>
+          </a:p>
+          <a:p>
+            <a:r>
               <a:rPr lang="en-US" sz="2000" dirty="0"/>
-              <a:t>Word:  definition, definition, definition, definition, definition, definition, definition, definition</a:t>
+              <a:t>Word </a:t>
+            </a:r>
+          </a:p>
+          <a:p>
+            <a:r>
+              <a:rPr lang="en-US" sz="1200" dirty="0"/>
+              <a:t>Definition:</a:t>
+            </a:r>
+            <a:endParaRPr lang="en-US" sz="3200" dirty="0"/>
+          </a:p>
+          <a:p>
+            <a:r>
+              <a:rPr lang="en-US" sz="2000" dirty="0"/>
+              <a:t>Definition, definition, definition, definition, definition, definition, definition, definition</a:t>
             </a:r>
           </a:p>
         </p:txBody>
@@ -5245,7 +5265,7 @@
         </p:nvSpPr>
         <p:spPr>
           <a:xfrm>
-            <a:off x="3576638" y="2240329"/>
+            <a:off x="3623309" y="4944261"/>
             <a:ext cx="2604706" cy="400110"/>
           </a:xfrm>
           <a:prstGeom prst="rect">
@@ -5360,7 +5380,7 @@
         </p:nvSpPr>
         <p:spPr>
           <a:xfrm>
-            <a:off x="4341686" y="2918206"/>
+            <a:off x="4341686" y="3108336"/>
             <a:ext cx="2760153" cy="1323439"/>
           </a:xfrm>
           <a:prstGeom prst="rect">
@@ -5391,10 +5411,105 @@
       </p:sp>
       <p:sp>
         <p:nvSpPr>
-          <p:cNvPr id="11" name="Rectangle 10">
-            <a:extLst>
-              <a:ext uri="{FF2B5EF4-FFF2-40B4-BE49-F238E27FC236}">
-                <a16:creationId xmlns:a16="http://schemas.microsoft.com/office/drawing/2014/main" id="{860161E2-280E-5A74-3AA7-6D652615875B}"/>
+          <p:cNvPr id="13" name="TextBox 12">
+            <a:extLst>
+              <a:ext uri="{FF2B5EF4-FFF2-40B4-BE49-F238E27FC236}">
+                <a16:creationId xmlns:a16="http://schemas.microsoft.com/office/drawing/2014/main" id="{50F7CEFD-71DA-4567-1225-4869705CF223}"/>
+              </a:ext>
+            </a:extLst>
+          </p:cNvPr>
+          <p:cNvSpPr txBox="1"/>
+          <p:nvPr/>
+        </p:nvSpPr>
+        <p:spPr>
+          <a:xfrm>
+            <a:off x="8452104" y="3112276"/>
+            <a:ext cx="2760153" cy="1569660"/>
+          </a:xfrm>
+          <a:prstGeom prst="rect">
+            <a:avLst/>
+          </a:prstGeom>
+          <a:noFill/>
+        </p:spPr>
+        <p:txBody>
+          <a:bodyPr wrap="square" rtlCol="0">
+            <a:spAutoFit/>
+          </a:bodyPr>
+          <a:lstStyle/>
+          <a:p>
+            <a:pPr algn="ctr"/>
+            <a:r>
+              <a:rPr lang="en-US" sz="1600" dirty="0"/>
+              <a:t>If there are no words in the priority word list, print this instead:</a:t>
+            </a:r>
+          </a:p>
+          <a:p>
+            <a:pPr algn="ctr"/>
+            <a:endParaRPr lang="en-US" sz="1600" b="1" i="1" dirty="0"/>
+          </a:p>
+          <a:p>
+            <a:pPr algn="ctr"/>
+            <a:r>
+              <a:rPr lang="en-US" sz="1600" b="1" i="1" dirty="0"/>
+              <a:t>Daily priority word</a:t>
+            </a:r>
+          </a:p>
+          <a:p>
+            <a:pPr algn="ctr"/>
+            <a:r>
+              <a:rPr lang="en-US" sz="1600" i="1" dirty="0"/>
+              <a:t>Currently no words</a:t>
+            </a:r>
+          </a:p>
+        </p:txBody>
+      </p:sp>
+      <p:cxnSp>
+        <p:nvCxnSpPr>
+          <p:cNvPr id="15" name="Straight Arrow Connector 14">
+            <a:extLst>
+              <a:ext uri="{FF2B5EF4-FFF2-40B4-BE49-F238E27FC236}">
+                <a16:creationId xmlns:a16="http://schemas.microsoft.com/office/drawing/2014/main" id="{BC43A57F-B54B-F02D-6A75-A64031C1A6EB}"/>
+              </a:ext>
+            </a:extLst>
+          </p:cNvPr>
+          <p:cNvCxnSpPr>
+            <a:cxnSpLocks/>
+          </p:cNvCxnSpPr>
+          <p:nvPr/>
+        </p:nvCxnSpPr>
+        <p:spPr>
+          <a:xfrm>
+            <a:off x="6647688" y="3278022"/>
+            <a:ext cx="1984248" cy="0"/>
+          </a:xfrm>
+          <a:prstGeom prst="straightConnector1">
+            <a:avLst/>
+          </a:prstGeom>
+          <a:ln>
+            <a:tailEnd type="triangle"/>
+          </a:ln>
+        </p:spPr>
+        <p:style>
+          <a:lnRef idx="1">
+            <a:schemeClr val="dk1"/>
+          </a:lnRef>
+          <a:fillRef idx="0">
+            <a:schemeClr val="dk1"/>
+          </a:fillRef>
+          <a:effectRef idx="0">
+            <a:schemeClr val="dk1"/>
+          </a:effectRef>
+          <a:fontRef idx="minor">
+            <a:schemeClr val="tx1"/>
+          </a:fontRef>
+        </p:style>
+      </p:cxnSp>
+      <p:sp>
+        <p:nvSpPr>
+          <p:cNvPr id="21" name="Rectangle 20">
+            <a:extLst>
+              <a:ext uri="{FF2B5EF4-FFF2-40B4-BE49-F238E27FC236}">
+                <a16:creationId xmlns:a16="http://schemas.microsoft.com/office/drawing/2014/main" id="{64021489-EFFE-1552-D6E8-27D14D3B8FE3}"/>
               </a:ext>
             </a:extLst>
           </p:cNvPr>
@@ -5403,7 +5518,7 @@
         </p:nvSpPr>
         <p:spPr>
           <a:xfrm>
-            <a:off x="7501127" y="3403720"/>
+            <a:off x="7501126" y="1385996"/>
             <a:ext cx="339852" cy="318458"/>
           </a:xfrm>
           <a:prstGeom prst="rect">
@@ -5438,10 +5553,10 @@
       </p:sp>
       <p:sp>
         <p:nvSpPr>
-          <p:cNvPr id="12" name="Oval 11">
-            <a:extLst>
-              <a:ext uri="{FF2B5EF4-FFF2-40B4-BE49-F238E27FC236}">
-                <a16:creationId xmlns:a16="http://schemas.microsoft.com/office/drawing/2014/main" id="{595C0787-C266-9C19-8DF1-F9F7FF2D64F3}"/>
+          <p:cNvPr id="22" name="Oval 21">
+            <a:extLst>
+              <a:ext uri="{FF2B5EF4-FFF2-40B4-BE49-F238E27FC236}">
+                <a16:creationId xmlns:a16="http://schemas.microsoft.com/office/drawing/2014/main" id="{AB7E6832-4BB9-37EC-F0B1-D5266E16E28E}"/>
               </a:ext>
             </a:extLst>
           </p:cNvPr>
@@ -5450,7 +5565,7 @@
         </p:nvSpPr>
         <p:spPr>
           <a:xfrm>
-            <a:off x="7543037" y="3449440"/>
+            <a:off x="7543036" y="1431716"/>
             <a:ext cx="237744" cy="237744"/>
           </a:xfrm>
           <a:prstGeom prst="ellipse">
@@ -5487,10 +5602,10 @@
       </p:sp>
       <p:sp>
         <p:nvSpPr>
-          <p:cNvPr id="13" name="TextBox 12">
-            <a:extLst>
-              <a:ext uri="{FF2B5EF4-FFF2-40B4-BE49-F238E27FC236}">
-                <a16:creationId xmlns:a16="http://schemas.microsoft.com/office/drawing/2014/main" id="{50F7CEFD-71DA-4567-1225-4869705CF223}"/>
+          <p:cNvPr id="23" name="TextBox 22">
+            <a:extLst>
+              <a:ext uri="{FF2B5EF4-FFF2-40B4-BE49-F238E27FC236}">
+                <a16:creationId xmlns:a16="http://schemas.microsoft.com/office/drawing/2014/main" id="{87DC048E-718B-3F15-A4FE-020DE3773BA6}"/>
               </a:ext>
             </a:extLst>
           </p:cNvPr>
@@ -5499,8 +5614,8 @@
         </p:nvSpPr>
         <p:spPr>
           <a:xfrm>
-            <a:off x="8452104" y="2942590"/>
-            <a:ext cx="2760153" cy="1569660"/>
+            <a:off x="7202423" y="1692223"/>
+            <a:ext cx="944881" cy="646331"/>
           </a:xfrm>
           <a:prstGeom prst="rect">
             <a:avLst/>
@@ -5515,354 +5630,8 @@
           <a:p>
             <a:pPr algn="ctr"/>
             <a:r>
-              <a:rPr lang="en-US" sz="1600" dirty="0"/>
-              <a:t>If there are no words in the priority word list, print this instead:</a:t>
-            </a:r>
-          </a:p>
-          <a:p>
-            <a:pPr algn="ctr"/>
-            <a:endParaRPr lang="en-US" sz="1600" b="1" i="1" dirty="0"/>
-          </a:p>
-          <a:p>
-            <a:pPr algn="ctr"/>
-            <a:r>
-              <a:rPr lang="en-US" sz="1600" b="1" i="1" dirty="0"/>
-              <a:t>Daily priority word</a:t>
-            </a:r>
-          </a:p>
-          <a:p>
-            <a:pPr algn="ctr"/>
-            <a:r>
-              <a:rPr lang="en-US" sz="1600" i="1" dirty="0"/>
-              <a:t>Currently no words</a:t>
-            </a:r>
-          </a:p>
-        </p:txBody>
-      </p:sp>
-      <p:sp>
-        <p:nvSpPr>
-          <p:cNvPr id="14" name="TextBox 13">
-            <a:extLst>
-              <a:ext uri="{FF2B5EF4-FFF2-40B4-BE49-F238E27FC236}">
-                <a16:creationId xmlns:a16="http://schemas.microsoft.com/office/drawing/2014/main" id="{FDCB3C9E-64A1-4B2A-4868-09B80BA7FAB7}"/>
-              </a:ext>
-            </a:extLst>
-          </p:cNvPr>
-          <p:cNvSpPr txBox="1"/>
-          <p:nvPr/>
-        </p:nvSpPr>
-        <p:spPr>
-          <a:xfrm>
-            <a:off x="7101840" y="3709947"/>
-            <a:ext cx="1120140" cy="646331"/>
-          </a:xfrm>
-          <a:prstGeom prst="rect">
-            <a:avLst/>
-          </a:prstGeom>
-          <a:noFill/>
-        </p:spPr>
-        <p:txBody>
-          <a:bodyPr wrap="square" rtlCol="0">
-            <a:spAutoFit/>
-          </a:bodyPr>
-          <a:lstStyle/>
-          <a:p>
-            <a:pPr algn="ctr"/>
-            <a:r>
-              <a:rPr lang="en-US" sz="1200" dirty="0"/>
-              <a:t>Remove word from priority word list</a:t>
-            </a:r>
-          </a:p>
-        </p:txBody>
-      </p:sp>
-      <p:cxnSp>
-        <p:nvCxnSpPr>
-          <p:cNvPr id="15" name="Straight Arrow Connector 14">
-            <a:extLst>
-              <a:ext uri="{FF2B5EF4-FFF2-40B4-BE49-F238E27FC236}">
-                <a16:creationId xmlns:a16="http://schemas.microsoft.com/office/drawing/2014/main" id="{BC43A57F-B54B-F02D-6A75-A64031C1A6EB}"/>
-              </a:ext>
-            </a:extLst>
-          </p:cNvPr>
-          <p:cNvCxnSpPr>
-            <a:cxnSpLocks/>
-          </p:cNvCxnSpPr>
-          <p:nvPr/>
-        </p:nvCxnSpPr>
-        <p:spPr>
-          <a:xfrm>
-            <a:off x="6647688" y="3108336"/>
-            <a:ext cx="1984248" cy="0"/>
-          </a:xfrm>
-          <a:prstGeom prst="straightConnector1">
-            <a:avLst/>
-          </a:prstGeom>
-          <a:ln>
-            <a:tailEnd type="triangle"/>
-          </a:ln>
-        </p:spPr>
-        <p:style>
-          <a:lnRef idx="1">
-            <a:schemeClr val="dk1"/>
-          </a:lnRef>
-          <a:fillRef idx="0">
-            <a:schemeClr val="dk1"/>
-          </a:fillRef>
-          <a:effectRef idx="0">
-            <a:schemeClr val="dk1"/>
-          </a:effectRef>
-          <a:fontRef idx="minor">
-            <a:schemeClr val="tx1"/>
-          </a:fontRef>
-        </p:style>
-      </p:cxnSp>
-      <p:sp>
-        <p:nvSpPr>
-          <p:cNvPr id="17" name="TextBox 16">
-            <a:extLst>
-              <a:ext uri="{FF2B5EF4-FFF2-40B4-BE49-F238E27FC236}">
-                <a16:creationId xmlns:a16="http://schemas.microsoft.com/office/drawing/2014/main" id="{3079BFEA-28C1-81F4-2E70-2DAF261BFFAE}"/>
-              </a:ext>
-            </a:extLst>
-          </p:cNvPr>
-          <p:cNvSpPr txBox="1"/>
-          <p:nvPr/>
-        </p:nvSpPr>
-        <p:spPr>
-          <a:xfrm>
-            <a:off x="8424672" y="5504688"/>
-            <a:ext cx="2760153" cy="830997"/>
-          </a:xfrm>
-          <a:prstGeom prst="rect">
-            <a:avLst/>
-          </a:prstGeom>
-          <a:noFill/>
-        </p:spPr>
-        <p:txBody>
-          <a:bodyPr wrap="square" rtlCol="0">
-            <a:spAutoFit/>
-          </a:bodyPr>
-          <a:lstStyle/>
-          <a:p>
-            <a:pPr algn="ctr"/>
-            <a:r>
-              <a:rPr lang="en-US" sz="1600" dirty="0"/>
-              <a:t>Only appear if there is a priority word on the list, and therefore presented.</a:t>
-            </a:r>
-            <a:endParaRPr lang="en-US" sz="1600" i="1" dirty="0"/>
-          </a:p>
-        </p:txBody>
-      </p:sp>
-      <p:cxnSp>
-        <p:nvCxnSpPr>
-          <p:cNvPr id="18" name="Straight Arrow Connector 17">
-            <a:extLst>
-              <a:ext uri="{FF2B5EF4-FFF2-40B4-BE49-F238E27FC236}">
-                <a16:creationId xmlns:a16="http://schemas.microsoft.com/office/drawing/2014/main" id="{2F16BFF7-E4D0-1837-9268-3B0E3335AA2D}"/>
-              </a:ext>
-            </a:extLst>
-          </p:cNvPr>
-          <p:cNvCxnSpPr>
-            <a:cxnSpLocks/>
-          </p:cNvCxnSpPr>
-          <p:nvPr/>
-        </p:nvCxnSpPr>
-        <p:spPr>
-          <a:xfrm flipH="1" flipV="1">
-            <a:off x="7870761" y="4334256"/>
-            <a:ext cx="880047" cy="1225296"/>
-          </a:xfrm>
-          <a:prstGeom prst="straightConnector1">
-            <a:avLst/>
-          </a:prstGeom>
-          <a:ln>
-            <a:tailEnd type="triangle"/>
-          </a:ln>
-        </p:spPr>
-        <p:style>
-          <a:lnRef idx="1">
-            <a:schemeClr val="dk1"/>
-          </a:lnRef>
-          <a:fillRef idx="0">
-            <a:schemeClr val="dk1"/>
-          </a:fillRef>
-          <a:effectRef idx="0">
-            <a:schemeClr val="dk1"/>
-          </a:effectRef>
-          <a:fontRef idx="minor">
-            <a:schemeClr val="tx1"/>
-          </a:fontRef>
-        </p:style>
-      </p:cxnSp>
-      <p:sp>
-        <p:nvSpPr>
-          <p:cNvPr id="21" name="Rectangle 20">
-            <a:extLst>
-              <a:ext uri="{FF2B5EF4-FFF2-40B4-BE49-F238E27FC236}">
-                <a16:creationId xmlns:a16="http://schemas.microsoft.com/office/drawing/2014/main" id="{64021489-EFFE-1552-D6E8-27D14D3B8FE3}"/>
-              </a:ext>
-            </a:extLst>
-          </p:cNvPr>
-          <p:cNvSpPr/>
-          <p:nvPr/>
-        </p:nvSpPr>
-        <p:spPr>
-          <a:xfrm>
-            <a:off x="7501126" y="1385996"/>
-            <a:ext cx="339852" cy="318458"/>
-          </a:xfrm>
-          <a:prstGeom prst="rect">
-            <a:avLst/>
-          </a:prstGeom>
-          <a:noFill/>
-        </p:spPr>
-        <p:style>
-          <a:lnRef idx="2">
-            <a:schemeClr val="accent1">
-              <a:shade val="15000"/>
-            </a:schemeClr>
-          </a:lnRef>
-          <a:fillRef idx="1">
-            <a:schemeClr val="accent1"/>
-          </a:fillRef>
-          <a:effectRef idx="0">
-            <a:schemeClr val="accent1"/>
-          </a:effectRef>
-          <a:fontRef idx="minor">
-            <a:schemeClr val="lt1"/>
-          </a:fontRef>
-        </p:style>
-        <p:txBody>
-          <a:bodyPr rtlCol="0" anchor="ctr"/>
-          <a:lstStyle/>
-          <a:p>
-            <a:pPr algn="ctr"/>
-            <a:endParaRPr lang="en-US"/>
-          </a:p>
-        </p:txBody>
-      </p:sp>
-      <p:sp>
-        <p:nvSpPr>
-          <p:cNvPr id="22" name="Oval 21">
-            <a:extLst>
-              <a:ext uri="{FF2B5EF4-FFF2-40B4-BE49-F238E27FC236}">
-                <a16:creationId xmlns:a16="http://schemas.microsoft.com/office/drawing/2014/main" id="{AB7E6832-4BB9-37EC-F0B1-D5266E16E28E}"/>
-              </a:ext>
-            </a:extLst>
-          </p:cNvPr>
-          <p:cNvSpPr/>
-          <p:nvPr/>
-        </p:nvSpPr>
-        <p:spPr>
-          <a:xfrm>
-            <a:off x="7543036" y="1431716"/>
-            <a:ext cx="237744" cy="237744"/>
-          </a:xfrm>
-          <a:prstGeom prst="ellipse">
-            <a:avLst/>
-          </a:prstGeom>
-          <a:solidFill>
-            <a:schemeClr val="tx1"/>
-          </a:solidFill>
-        </p:spPr>
-        <p:style>
-          <a:lnRef idx="2">
-            <a:schemeClr val="accent1">
-              <a:shade val="15000"/>
-            </a:schemeClr>
-          </a:lnRef>
-          <a:fillRef idx="1">
-            <a:schemeClr val="accent1"/>
-          </a:fillRef>
-          <a:effectRef idx="0">
-            <a:schemeClr val="accent1"/>
-          </a:effectRef>
-          <a:fontRef idx="minor">
-            <a:schemeClr val="lt1"/>
-          </a:fontRef>
-        </p:style>
-        <p:txBody>
-          <a:bodyPr rtlCol="0" anchor="ctr"/>
-          <a:lstStyle/>
-          <a:p>
-            <a:pPr algn="ctr"/>
-            <a:endParaRPr lang="en-US"/>
-          </a:p>
-        </p:txBody>
-      </p:sp>
-      <p:sp>
-        <p:nvSpPr>
-          <p:cNvPr id="23" name="TextBox 22">
-            <a:extLst>
-              <a:ext uri="{FF2B5EF4-FFF2-40B4-BE49-F238E27FC236}">
-                <a16:creationId xmlns:a16="http://schemas.microsoft.com/office/drawing/2014/main" id="{87DC048E-718B-3F15-A4FE-020DE3773BA6}"/>
-              </a:ext>
-            </a:extLst>
-          </p:cNvPr>
-          <p:cNvSpPr txBox="1"/>
-          <p:nvPr/>
-        </p:nvSpPr>
-        <p:spPr>
-          <a:xfrm>
-            <a:off x="7202423" y="1692223"/>
-            <a:ext cx="944881" cy="646331"/>
-          </a:xfrm>
-          <a:prstGeom prst="rect">
-            <a:avLst/>
-          </a:prstGeom>
-          <a:noFill/>
-        </p:spPr>
-        <p:txBody>
-          <a:bodyPr wrap="square" rtlCol="0">
-            <a:spAutoFit/>
-          </a:bodyPr>
-          <a:lstStyle/>
-          <a:p>
-            <a:pPr algn="ctr"/>
-            <a:r>
               <a:rPr lang="en-US" sz="1200" dirty="0"/>
               <a:t>Add word to priority word list</a:t>
-            </a:r>
-          </a:p>
-        </p:txBody>
-      </p:sp>
-      <p:sp>
-        <p:nvSpPr>
-          <p:cNvPr id="7" name="TextBox 6">
-            <a:extLst>
-              <a:ext uri="{FF2B5EF4-FFF2-40B4-BE49-F238E27FC236}">
-                <a16:creationId xmlns:a16="http://schemas.microsoft.com/office/drawing/2014/main" id="{10D1FD36-EA7E-19AD-FFEC-AD8EDE22AACC}"/>
-              </a:ext>
-            </a:extLst>
-          </p:cNvPr>
-          <p:cNvSpPr txBox="1"/>
-          <p:nvPr/>
-        </p:nvSpPr>
-        <p:spPr>
-          <a:xfrm>
-            <a:off x="6204871" y="4685739"/>
-            <a:ext cx="1756504" cy="400110"/>
-          </a:xfrm>
-          <a:prstGeom prst="rect">
-            <a:avLst/>
-          </a:prstGeom>
-          <a:noFill/>
-          <a:ln>
-            <a:solidFill>
-              <a:schemeClr val="tx1"/>
-            </a:solidFill>
-          </a:ln>
-        </p:spPr>
-        <p:txBody>
-          <a:bodyPr wrap="square" rtlCol="0">
-            <a:spAutoFit/>
-          </a:bodyPr>
-          <a:lstStyle/>
-          <a:p>
-            <a:pPr algn="ctr"/>
-            <a:r>
-              <a:rPr lang="en-US" sz="2000" dirty="0"/>
-              <a:t>Save choices</a:t>
             </a:r>
           </a:p>
         </p:txBody>

</xml_diff>

<commit_message>
SAVING JUST BEFORE FIXING PATHS TO BE RELEVANT FOR MY INSTALLED PROGRAM (FROM INSTALLER)
</commit_message>
<xml_diff>
--- a/extra/design.pptx
+++ b/extra/design.pptx
@@ -11,6 +11,7 @@
     <p:sldId id="259" r:id="rId5"/>
     <p:sldId id="260" r:id="rId6"/>
     <p:sldId id="261" r:id="rId7"/>
+    <p:sldId id="262" r:id="rId8"/>
   </p:sldIdLst>
   <p:sldSz cx="12192000" cy="6858000"/>
   <p:notesSz cx="6858000" cy="9144000"/>
@@ -264,7 +265,7 @@
           <a:p>
             <a:fld id="{A280E058-95FB-4393-BC10-FF598184573D}" type="datetimeFigureOut">
               <a:rPr lang="en-US" smtClean="0"/>
-              <a:t>11/26/2024</a:t>
+              <a:t>12/12/2024</a:t>
             </a:fld>
             <a:endParaRPr lang="en-US"/>
           </a:p>
@@ -462,7 +463,7 @@
           <a:p>
             <a:fld id="{A280E058-95FB-4393-BC10-FF598184573D}" type="datetimeFigureOut">
               <a:rPr lang="en-US" smtClean="0"/>
-              <a:t>11/26/2024</a:t>
+              <a:t>12/12/2024</a:t>
             </a:fld>
             <a:endParaRPr lang="en-US"/>
           </a:p>
@@ -670,7 +671,7 @@
           <a:p>
             <a:fld id="{A280E058-95FB-4393-BC10-FF598184573D}" type="datetimeFigureOut">
               <a:rPr lang="en-US" smtClean="0"/>
-              <a:t>11/26/2024</a:t>
+              <a:t>12/12/2024</a:t>
             </a:fld>
             <a:endParaRPr lang="en-US"/>
           </a:p>
@@ -868,7 +869,7 @@
           <a:p>
             <a:fld id="{A280E058-95FB-4393-BC10-FF598184573D}" type="datetimeFigureOut">
               <a:rPr lang="en-US" smtClean="0"/>
-              <a:t>11/26/2024</a:t>
+              <a:t>12/12/2024</a:t>
             </a:fld>
             <a:endParaRPr lang="en-US"/>
           </a:p>
@@ -1143,7 +1144,7 @@
           <a:p>
             <a:fld id="{A280E058-95FB-4393-BC10-FF598184573D}" type="datetimeFigureOut">
               <a:rPr lang="en-US" smtClean="0"/>
-              <a:t>11/26/2024</a:t>
+              <a:t>12/12/2024</a:t>
             </a:fld>
             <a:endParaRPr lang="en-US"/>
           </a:p>
@@ -1408,7 +1409,7 @@
           <a:p>
             <a:fld id="{A280E058-95FB-4393-BC10-FF598184573D}" type="datetimeFigureOut">
               <a:rPr lang="en-US" smtClean="0"/>
-              <a:t>11/26/2024</a:t>
+              <a:t>12/12/2024</a:t>
             </a:fld>
             <a:endParaRPr lang="en-US"/>
           </a:p>
@@ -1820,7 +1821,7 @@
           <a:p>
             <a:fld id="{A280E058-95FB-4393-BC10-FF598184573D}" type="datetimeFigureOut">
               <a:rPr lang="en-US" smtClean="0"/>
-              <a:t>11/26/2024</a:t>
+              <a:t>12/12/2024</a:t>
             </a:fld>
             <a:endParaRPr lang="en-US"/>
           </a:p>
@@ -1961,7 +1962,7 @@
           <a:p>
             <a:fld id="{A280E058-95FB-4393-BC10-FF598184573D}" type="datetimeFigureOut">
               <a:rPr lang="en-US" smtClean="0"/>
-              <a:t>11/26/2024</a:t>
+              <a:t>12/12/2024</a:t>
             </a:fld>
             <a:endParaRPr lang="en-US"/>
           </a:p>
@@ -2074,7 +2075,7 @@
           <a:p>
             <a:fld id="{A280E058-95FB-4393-BC10-FF598184573D}" type="datetimeFigureOut">
               <a:rPr lang="en-US" smtClean="0"/>
-              <a:t>11/26/2024</a:t>
+              <a:t>12/12/2024</a:t>
             </a:fld>
             <a:endParaRPr lang="en-US"/>
           </a:p>
@@ -2385,7 +2386,7 @@
           <a:p>
             <a:fld id="{A280E058-95FB-4393-BC10-FF598184573D}" type="datetimeFigureOut">
               <a:rPr lang="en-US" smtClean="0"/>
-              <a:t>11/26/2024</a:t>
+              <a:t>12/12/2024</a:t>
             </a:fld>
             <a:endParaRPr lang="en-US"/>
           </a:p>
@@ -2673,7 +2674,7 @@
           <a:p>
             <a:fld id="{A280E058-95FB-4393-BC10-FF598184573D}" type="datetimeFigureOut">
               <a:rPr lang="en-US" smtClean="0"/>
-              <a:t>11/26/2024</a:t>
+              <a:t>12/12/2024</a:t>
             </a:fld>
             <a:endParaRPr lang="en-US"/>
           </a:p>
@@ -2914,7 +2915,7 @@
           <a:p>
             <a:fld id="{A280E058-95FB-4393-BC10-FF598184573D}" type="datetimeFigureOut">
               <a:rPr lang="en-US" smtClean="0"/>
-              <a:t>11/26/2024</a:t>
+              <a:t>12/12/2024</a:t>
             </a:fld>
             <a:endParaRPr lang="en-US"/>
           </a:p>
@@ -8236,6 +8237,101 @@
 </p:sld>
 </file>
 
+<file path=ppt/slides/slide7.xml><?xml version="1.0" encoding="utf-8"?>
+<p:sld xmlns:a="http://schemas.openxmlformats.org/drawingml/2006/main" xmlns:r="http://schemas.openxmlformats.org/officeDocument/2006/relationships" xmlns:p="http://schemas.openxmlformats.org/presentationml/2006/main">
+  <p:cSld>
+    <p:spTree>
+      <p:nvGrpSpPr>
+        <p:cNvPr id="1" name=""/>
+        <p:cNvGrpSpPr/>
+        <p:nvPr/>
+      </p:nvGrpSpPr>
+      <p:grpSpPr>
+        <a:xfrm>
+          <a:off x="0" y="0"/>
+          <a:ext cx="0" cy="0"/>
+          <a:chOff x="0" y="0"/>
+          <a:chExt cx="0" cy="0"/>
+        </a:xfrm>
+      </p:grpSpPr>
+      <p:pic>
+        <p:nvPicPr>
+          <p:cNvPr id="3" name="Picture 2">
+            <a:extLst>
+              <a:ext uri="{FF2B5EF4-FFF2-40B4-BE49-F238E27FC236}">
+                <a16:creationId xmlns:a16="http://schemas.microsoft.com/office/drawing/2014/main" id="{6D46BD8E-3BC9-A59C-97C4-4C60867A7DC8}"/>
+              </a:ext>
+            </a:extLst>
+          </p:cNvPr>
+          <p:cNvPicPr>
+            <a:picLocks noChangeAspect="1"/>
+          </p:cNvPicPr>
+          <p:nvPr/>
+        </p:nvPicPr>
+        <p:blipFill>
+          <a:blip r:embed="rId2"/>
+          <a:stretch>
+            <a:fillRect/>
+          </a:stretch>
+        </p:blipFill>
+        <p:spPr>
+          <a:xfrm>
+            <a:off x="2004441" y="1328444"/>
+            <a:ext cx="8183117" cy="4201111"/>
+          </a:xfrm>
+          <a:prstGeom prst="rect">
+            <a:avLst/>
+          </a:prstGeom>
+        </p:spPr>
+      </p:pic>
+      <p:sp>
+        <p:nvSpPr>
+          <p:cNvPr id="4" name="TextBox 3">
+            <a:extLst>
+              <a:ext uri="{FF2B5EF4-FFF2-40B4-BE49-F238E27FC236}">
+                <a16:creationId xmlns:a16="http://schemas.microsoft.com/office/drawing/2014/main" id="{A8D4C252-C8D5-3450-EFF2-31AA67AEC7CC}"/>
+              </a:ext>
+            </a:extLst>
+          </p:cNvPr>
+          <p:cNvSpPr txBox="1"/>
+          <p:nvPr/>
+        </p:nvSpPr>
+        <p:spPr>
+          <a:xfrm>
+            <a:off x="3906982" y="600364"/>
+            <a:ext cx="2603085" cy="369332"/>
+          </a:xfrm>
+          <a:prstGeom prst="rect">
+            <a:avLst/>
+          </a:prstGeom>
+          <a:noFill/>
+        </p:spPr>
+        <p:txBody>
+          <a:bodyPr wrap="none" rtlCol="0">
+            <a:spAutoFit/>
+          </a:bodyPr>
+          <a:lstStyle/>
+          <a:p>
+            <a:r>
+              <a:rPr lang="en-US" dirty="0"/>
+              <a:t>For when making installer</a:t>
+            </a:r>
+          </a:p>
+        </p:txBody>
+      </p:sp>
+    </p:spTree>
+    <p:extLst>
+      <p:ext uri="{BB962C8B-B14F-4D97-AF65-F5344CB8AC3E}">
+        <p14:creationId xmlns:p14="http://schemas.microsoft.com/office/powerpoint/2010/main" val="3227680119"/>
+      </p:ext>
+    </p:extLst>
+  </p:cSld>
+  <p:clrMapOvr>
+    <a:masterClrMapping/>
+  </p:clrMapOvr>
+</p:sld>
+</file>
+
 <file path=ppt/theme/theme1.xml><?xml version="1.0" encoding="utf-8"?>
 <a:theme xmlns:a="http://schemas.openxmlformats.org/drawingml/2006/main" name="Office Theme">
   <a:themeElements>

</xml_diff>